<commit_message>
updated design session deck
</commit_message>
<xml_diff>
--- a/DesignSession/Azure DevDay – Whiteboard Design Session.pptx
+++ b/DesignSession/Azure DevDay – Whiteboard Design Session.pptx
@@ -9,7 +9,7 @@
     <p:notesMasterId r:id="rId19"/>
   </p:notesMasterIdLst>
   <p:sldIdLst>
-    <p:sldId id="1571" r:id="rId6"/>
+    <p:sldId id="1860" r:id="rId6"/>
     <p:sldId id="1502" r:id="rId7"/>
     <p:sldId id="259" r:id="rId8"/>
     <p:sldId id="268" r:id="rId9"/>
@@ -136,236 +136,6 @@
 </p1510:revInfo>
 </file>
 
-<file path=ppt/changesInfos/changesInfo1.xml><?xml version="1.0" encoding="utf-8"?>
-<pc:chgInfo xmlns:a="http://schemas.openxmlformats.org/drawingml/2006/main" xmlns:r="http://schemas.openxmlformats.org/officeDocument/2006/relationships" xmlns:ac="http://schemas.microsoft.com/office/drawing/2013/main/command" xmlns:pc="http://schemas.microsoft.com/office/powerpoint/2013/main/command">
-  <pc:docChgLst>
-    <pc:chgData name="Naveed Zaheer" userId="1536ee0f-f6f6-46d4-9425-7b909ef88aea" providerId="ADAL" clId="{CCC256A8-3560-4E13-888F-A50E249B7A8E}"/>
-    <pc:docChg chg="modSld">
-      <pc:chgData name="Naveed Zaheer" userId="1536ee0f-f6f6-46d4-9425-7b909ef88aea" providerId="ADAL" clId="{CCC256A8-3560-4E13-888F-A50E249B7A8E}" dt="2018-08-02T16:24:11.201" v="4" actId="20577"/>
-      <pc:docMkLst>
-        <pc:docMk/>
-      </pc:docMkLst>
-    </pc:docChg>
-  </pc:docChgLst>
-  <pc:docChgLst>
-    <pc:chgData name="Michael Querimit" userId="024c7e4b-80c2-4979-bfa3-08ca958317bb" providerId="ADAL" clId="{6AB5B937-32B5-4A8E-877A-AFB2287F5660}"/>
-    <pc:docChg chg="modSld">
-      <pc:chgData name="Michael Querimit" userId="024c7e4b-80c2-4979-bfa3-08ca958317bb" providerId="ADAL" clId="{6AB5B937-32B5-4A8E-877A-AFB2287F5660}" dt="2018-09-05T19:41:38.521" v="0"/>
-      <pc:docMkLst>
-        <pc:docMk/>
-      </pc:docMkLst>
-    </pc:docChg>
-  </pc:docChgLst>
-  <pc:docChgLst>
-    <pc:chgData name="Naveed Zaheer" userId="1536ee0f-f6f6-46d4-9425-7b909ef88aea" providerId="ADAL" clId="{DCF6CAFB-D375-4105-B90E-B81F77C2126D}"/>
-    <pc:docChg chg="custSel addSld delSld modSld sldOrd">
-      <pc:chgData name="Naveed Zaheer" userId="1536ee0f-f6f6-46d4-9425-7b909ef88aea" providerId="ADAL" clId="{DCF6CAFB-D375-4105-B90E-B81F77C2126D}" dt="2018-09-07T13:42:11.841" v="160" actId="2696"/>
-      <pc:docMkLst>
-        <pc:docMk/>
-      </pc:docMkLst>
-      <pc:sldChg chg="addSp delSp modSp">
-        <pc:chgData name="Naveed Zaheer" userId="1536ee0f-f6f6-46d4-9425-7b909ef88aea" providerId="ADAL" clId="{DCF6CAFB-D375-4105-B90E-B81F77C2126D}" dt="2018-08-28T17:36:57.374" v="109"/>
-        <pc:sldMkLst>
-          <pc:docMk/>
-          <pc:sldMk cId="2627238050" sldId="259"/>
-        </pc:sldMkLst>
-        <pc:spChg chg="mod">
-          <ac:chgData name="Naveed Zaheer" userId="1536ee0f-f6f6-46d4-9425-7b909ef88aea" providerId="ADAL" clId="{DCF6CAFB-D375-4105-B90E-B81F77C2126D}" dt="2018-08-28T17:28:46.289" v="12" actId="113"/>
-          <ac:spMkLst>
-            <pc:docMk/>
-            <pc:sldMk cId="2627238050" sldId="259"/>
-            <ac:spMk id="3" creationId="{EC9637E9-90A2-4586-8446-2EFCC611E5AC}"/>
-          </ac:spMkLst>
-        </pc:spChg>
-        <pc:spChg chg="add del mod">
-          <ac:chgData name="Naveed Zaheer" userId="1536ee0f-f6f6-46d4-9425-7b909ef88aea" providerId="ADAL" clId="{DCF6CAFB-D375-4105-B90E-B81F77C2126D}" dt="2018-08-28T17:36:57.374" v="109"/>
-          <ac:spMkLst>
-            <pc:docMk/>
-            <pc:sldMk cId="2627238050" sldId="259"/>
-            <ac:spMk id="4" creationId="{EB8E9E17-0DD8-410C-B91F-D07BE2DFFADB}"/>
-          </ac:spMkLst>
-        </pc:spChg>
-        <pc:spChg chg="add del mod">
-          <ac:chgData name="Naveed Zaheer" userId="1536ee0f-f6f6-46d4-9425-7b909ef88aea" providerId="ADAL" clId="{DCF6CAFB-D375-4105-B90E-B81F77C2126D}" dt="2018-08-28T17:36:57.374" v="109"/>
-          <ac:spMkLst>
-            <pc:docMk/>
-            <pc:sldMk cId="2627238050" sldId="259"/>
-            <ac:spMk id="5" creationId="{9D3E8F0C-7357-49DB-89D3-ADDBAEFB45F9}"/>
-          </ac:spMkLst>
-        </pc:spChg>
-      </pc:sldChg>
-      <pc:sldChg chg="ord">
-        <pc:chgData name="Naveed Zaheer" userId="1536ee0f-f6f6-46d4-9425-7b909ef88aea" providerId="ADAL" clId="{DCF6CAFB-D375-4105-B90E-B81F77C2126D}" dt="2018-08-28T17:30:05.907" v="100"/>
-        <pc:sldMkLst>
-          <pc:docMk/>
-          <pc:sldMk cId="3596581931" sldId="262"/>
-        </pc:sldMkLst>
-      </pc:sldChg>
-      <pc:sldChg chg="modSp ord">
-        <pc:chgData name="Naveed Zaheer" userId="1536ee0f-f6f6-46d4-9425-7b909ef88aea" providerId="ADAL" clId="{DCF6CAFB-D375-4105-B90E-B81F77C2126D}" dt="2018-08-28T17:39:00.093" v="110"/>
-        <pc:sldMkLst>
-          <pc:docMk/>
-          <pc:sldMk cId="2413656073" sldId="263"/>
-        </pc:sldMkLst>
-        <pc:spChg chg="mod">
-          <ac:chgData name="Naveed Zaheer" userId="1536ee0f-f6f6-46d4-9425-7b909ef88aea" providerId="ADAL" clId="{DCF6CAFB-D375-4105-B90E-B81F77C2126D}" dt="2018-08-28T17:39:00.093" v="110"/>
-          <ac:spMkLst>
-            <pc:docMk/>
-            <pc:sldMk cId="2413656073" sldId="263"/>
-            <ac:spMk id="3" creationId="{9A3FE095-A211-4F60-AB5E-3EB49C4EF2A9}"/>
-          </ac:spMkLst>
-        </pc:spChg>
-      </pc:sldChg>
-      <pc:sldChg chg="ord">
-        <pc:chgData name="Naveed Zaheer" userId="1536ee0f-f6f6-46d4-9425-7b909ef88aea" providerId="ADAL" clId="{DCF6CAFB-D375-4105-B90E-B81F77C2126D}" dt="2018-08-28T17:32:24.338" v="102"/>
-        <pc:sldMkLst>
-          <pc:docMk/>
-          <pc:sldMk cId="1561715250" sldId="265"/>
-        </pc:sldMkLst>
-      </pc:sldChg>
-      <pc:sldChg chg="modSp modTransition modNotesTx">
-        <pc:chgData name="Naveed Zaheer" userId="1536ee0f-f6f6-46d4-9425-7b909ef88aea" providerId="ADAL" clId="{DCF6CAFB-D375-4105-B90E-B81F77C2126D}" dt="2018-09-05T18:13:15.686" v="141"/>
-        <pc:sldMkLst>
-          <pc:docMk/>
-          <pc:sldMk cId="2627349086" sldId="266"/>
-        </pc:sldMkLst>
-        <pc:spChg chg="mod">
-          <ac:chgData name="Naveed Zaheer" userId="1536ee0f-f6f6-46d4-9425-7b909ef88aea" providerId="ADAL" clId="{DCF6CAFB-D375-4105-B90E-B81F77C2126D}" dt="2018-08-28T17:26:54.844" v="11" actId="20577"/>
-          <ac:spMkLst>
-            <pc:docMk/>
-            <pc:sldMk cId="2627349086" sldId="266"/>
-            <ac:spMk id="118" creationId="{BF5B451D-32A4-4F64-9019-659025F47ADA}"/>
-          </ac:spMkLst>
-        </pc:spChg>
-      </pc:sldChg>
-      <pc:sldChg chg="modSp add ord">
-        <pc:chgData name="Naveed Zaheer" userId="1536ee0f-f6f6-46d4-9425-7b909ef88aea" providerId="ADAL" clId="{DCF6CAFB-D375-4105-B90E-B81F77C2126D}" dt="2018-08-28T17:29:56.389" v="99"/>
-        <pc:sldMkLst>
-          <pc:docMk/>
-          <pc:sldMk cId="3327932734" sldId="268"/>
-        </pc:sldMkLst>
-        <pc:spChg chg="mod">
-          <ac:chgData name="Naveed Zaheer" userId="1536ee0f-f6f6-46d4-9425-7b909ef88aea" providerId="ADAL" clId="{DCF6CAFB-D375-4105-B90E-B81F77C2126D}" dt="2018-08-28T17:29:17.531" v="31" actId="20577"/>
-          <ac:spMkLst>
-            <pc:docMk/>
-            <pc:sldMk cId="3327932734" sldId="268"/>
-            <ac:spMk id="2" creationId="{3CA97470-55FF-4F6A-AADA-EC025A35E902}"/>
-          </ac:spMkLst>
-        </pc:spChg>
-        <pc:spChg chg="mod">
-          <ac:chgData name="Naveed Zaheer" userId="1536ee0f-f6f6-46d4-9425-7b909ef88aea" providerId="ADAL" clId="{DCF6CAFB-D375-4105-B90E-B81F77C2126D}" dt="2018-08-28T17:29:40.930" v="97" actId="20577"/>
-          <ac:spMkLst>
-            <pc:docMk/>
-            <pc:sldMk cId="3327932734" sldId="268"/>
-            <ac:spMk id="3" creationId="{41EE69EA-7FEC-45AF-9CB7-48838D2831DB}"/>
-          </ac:spMkLst>
-        </pc:spChg>
-      </pc:sldChg>
-      <pc:sldChg chg="delSp modSp">
-        <pc:chgData name="Naveed Zaheer" userId="1536ee0f-f6f6-46d4-9425-7b909ef88aea" providerId="ADAL" clId="{DCF6CAFB-D375-4105-B90E-B81F77C2126D}" dt="2018-08-28T17:36:14.171" v="106" actId="20577"/>
-        <pc:sldMkLst>
-          <pc:docMk/>
-          <pc:sldMk cId="3788647698" sldId="1502"/>
-        </pc:sldMkLst>
-        <pc:spChg chg="mod">
-          <ac:chgData name="Naveed Zaheer" userId="1536ee0f-f6f6-46d4-9425-7b909ef88aea" providerId="ADAL" clId="{DCF6CAFB-D375-4105-B90E-B81F77C2126D}" dt="2018-08-28T17:36:14.171" v="106" actId="20577"/>
-          <ac:spMkLst>
-            <pc:docMk/>
-            <pc:sldMk cId="3788647698" sldId="1502"/>
-            <ac:spMk id="4" creationId="{00000000-0000-0000-0000-000000000000}"/>
-          </ac:spMkLst>
-        </pc:spChg>
-        <pc:spChg chg="del mod">
-          <ac:chgData name="Naveed Zaheer" userId="1536ee0f-f6f6-46d4-9425-7b909ef88aea" providerId="ADAL" clId="{DCF6CAFB-D375-4105-B90E-B81F77C2126D}" dt="2018-08-28T17:36:08.828" v="105" actId="478"/>
-          <ac:spMkLst>
-            <pc:docMk/>
-            <pc:sldMk cId="3788647698" sldId="1502"/>
-            <ac:spMk id="5" creationId="{00000000-0000-0000-0000-000000000000}"/>
-          </ac:spMkLst>
-        </pc:spChg>
-      </pc:sldChg>
-      <pc:sldChg chg="addSp delSp modSp add del modTransition setBg">
-        <pc:chgData name="Naveed Zaheer" userId="1536ee0f-f6f6-46d4-9425-7b909ef88aea" providerId="ADAL" clId="{DCF6CAFB-D375-4105-B90E-B81F77C2126D}" dt="2018-09-07T13:42:11.841" v="160" actId="2696"/>
-        <pc:sldMkLst>
-          <pc:docMk/>
-          <pc:sldMk cId="2028979666" sldId="1572"/>
-        </pc:sldMkLst>
-        <pc:spChg chg="del">
-          <ac:chgData name="Naveed Zaheer" userId="1536ee0f-f6f6-46d4-9425-7b909ef88aea" providerId="ADAL" clId="{DCF6CAFB-D375-4105-B90E-B81F77C2126D}" dt="2018-08-31T18:13:20.143" v="128" actId="478"/>
-          <ac:spMkLst>
-            <pc:docMk/>
-            <pc:sldMk cId="2028979666" sldId="1572"/>
-            <ac:spMk id="2" creationId="{C21D6AEF-0CF9-42E9-ABF9-E0EDE9ADF9F4}"/>
-          </ac:spMkLst>
-        </pc:spChg>
-        <pc:spChg chg="add mod">
-          <ac:chgData name="Naveed Zaheer" userId="1536ee0f-f6f6-46d4-9425-7b909ef88aea" providerId="ADAL" clId="{DCF6CAFB-D375-4105-B90E-B81F77C2126D}" dt="2018-09-05T18:13:08.035" v="140" actId="14100"/>
-          <ac:spMkLst>
-            <pc:docMk/>
-            <pc:sldMk cId="2028979666" sldId="1572"/>
-            <ac:spMk id="3" creationId="{E097154D-57A0-4AE5-9EA7-C0B7A89F88E5}"/>
-          </ac:spMkLst>
-        </pc:spChg>
-        <pc:picChg chg="add del">
-          <ac:chgData name="Naveed Zaheer" userId="1536ee0f-f6f6-46d4-9425-7b909ef88aea" providerId="ADAL" clId="{DCF6CAFB-D375-4105-B90E-B81F77C2126D}" dt="2018-09-07T13:39:04.589" v="145"/>
-          <ac:picMkLst>
-            <pc:docMk/>
-            <pc:sldMk cId="2028979666" sldId="1572"/>
-            <ac:picMk id="2" creationId="{8CA5C3DD-DAA6-4219-842E-46B444CE8083}"/>
-          </ac:picMkLst>
-        </pc:picChg>
-        <pc:picChg chg="add del">
-          <ac:chgData name="Naveed Zaheer" userId="1536ee0f-f6f6-46d4-9425-7b909ef88aea" providerId="ADAL" clId="{DCF6CAFB-D375-4105-B90E-B81F77C2126D}" dt="2018-08-31T18:13:26.833" v="130"/>
-          <ac:picMkLst>
-            <pc:docMk/>
-            <pc:sldMk cId="2028979666" sldId="1572"/>
-            <ac:picMk id="3" creationId="{03F92459-253C-48FD-938A-3DA5D187CFA8}"/>
-          </ac:picMkLst>
-        </pc:picChg>
-        <pc:picChg chg="add mod">
-          <ac:chgData name="Naveed Zaheer" userId="1536ee0f-f6f6-46d4-9425-7b909ef88aea" providerId="ADAL" clId="{DCF6CAFB-D375-4105-B90E-B81F77C2126D}" dt="2018-08-31T18:14:37.734" v="138" actId="14100"/>
-          <ac:picMkLst>
-            <pc:docMk/>
-            <pc:sldMk cId="2028979666" sldId="1572"/>
-            <ac:picMk id="4" creationId="{2BD104BB-12B1-4B19-9F14-E6644966B4E5}"/>
-          </ac:picMkLst>
-        </pc:picChg>
-      </pc:sldChg>
-      <pc:sldChg chg="add">
-        <pc:chgData name="Naveed Zaheer" userId="1536ee0f-f6f6-46d4-9425-7b909ef88aea" providerId="ADAL" clId="{DCF6CAFB-D375-4105-B90E-B81F77C2126D}" dt="2018-09-05T18:13:40.724" v="143"/>
-        <pc:sldMkLst>
-          <pc:docMk/>
-          <pc:sldMk cId="3279857214" sldId="1573"/>
-        </pc:sldMkLst>
-      </pc:sldChg>
-      <pc:sldChg chg="addSp delSp modSp add">
-        <pc:chgData name="Naveed Zaheer" userId="1536ee0f-f6f6-46d4-9425-7b909ef88aea" providerId="ADAL" clId="{DCF6CAFB-D375-4105-B90E-B81F77C2126D}" dt="2018-09-07T13:39:55.810" v="159" actId="14100"/>
-        <pc:sldMkLst>
-          <pc:docMk/>
-          <pc:sldMk cId="985215954" sldId="1574"/>
-        </pc:sldMkLst>
-        <pc:picChg chg="add mod">
-          <ac:chgData name="Naveed Zaheer" userId="1536ee0f-f6f6-46d4-9425-7b909ef88aea" providerId="ADAL" clId="{DCF6CAFB-D375-4105-B90E-B81F77C2126D}" dt="2018-09-07T13:39:55.810" v="159" actId="14100"/>
-          <ac:picMkLst>
-            <pc:docMk/>
-            <pc:sldMk cId="985215954" sldId="1574"/>
-            <ac:picMk id="2" creationId="{C2259D29-EA36-47E4-8FC7-F9888E22C21D}"/>
-          </ac:picMkLst>
-        </pc:picChg>
-        <pc:picChg chg="del">
-          <ac:chgData name="Naveed Zaheer" userId="1536ee0f-f6f6-46d4-9425-7b909ef88aea" providerId="ADAL" clId="{DCF6CAFB-D375-4105-B90E-B81F77C2126D}" dt="2018-09-07T13:39:14.482" v="147" actId="478"/>
-          <ac:picMkLst>
-            <pc:docMk/>
-            <pc:sldMk cId="985215954" sldId="1574"/>
-            <ac:picMk id="4" creationId="{2BD104BB-12B1-4B19-9F14-E6644966B4E5}"/>
-          </ac:picMkLst>
-        </pc:picChg>
-      </pc:sldChg>
-    </pc:docChg>
-  </pc:docChgLst>
-</pc:chgInfo>
-</file>
-
 <file path=ppt/notesMasters/notesMaster1.xml><?xml version="1.0" encoding="utf-8"?>
 <p:notesMaster xmlns:a="http://schemas.openxmlformats.org/drawingml/2006/main" xmlns:r="http://schemas.openxmlformats.org/officeDocument/2006/relationships" xmlns:p="http://schemas.openxmlformats.org/presentationml/2006/main">
   <p:cSld>
@@ -448,7 +218,7 @@
           <a:p>
             <a:fld id="{DBDDAED8-0708-4003-8271-82287D7F428C}" type="datetimeFigureOut">
               <a:rPr lang="en-US" smtClean="0"/>
-              <a:t>9/7/2018</a:t>
+              <a:t>12/5/2018</a:t>
             </a:fld>
             <a:endParaRPr lang="en-US"/>
           </a:p>
@@ -778,6 +548,171 @@
           <a:bodyPr/>
           <a:lstStyle/>
           <a:p>
+            <a:endParaRPr lang="en-US"/>
+          </a:p>
+        </p:txBody>
+      </p:sp>
+      <p:sp>
+        <p:nvSpPr>
+          <p:cNvPr id="5" name="Footer Placeholder 4"/>
+          <p:cNvSpPr>
+            <a:spLocks noGrp="1"/>
+          </p:cNvSpPr>
+          <p:nvPr>
+            <p:ph type="ftr" sz="quarter" idx="11"/>
+          </p:nvPr>
+        </p:nvSpPr>
+        <p:spPr/>
+        <p:txBody>
+          <a:bodyPr/>
+          <a:lstStyle/>
+          <a:p>
+            <a:pPr defTabSz="914099" eaLnBrk="0" hangingPunct="0"/>
+            <a:r>
+              <a:rPr lang="en-US" sz="400">
+                <a:gradFill>
+                  <a:gsLst>
+                    <a:gs pos="0">
+                      <a:prstClr val="black"/>
+                    </a:gs>
+                    <a:gs pos="100000">
+                      <a:prstClr val="black"/>
+                    </a:gs>
+                  </a:gsLst>
+                  <a:lin ang="5400000" scaled="0"/>
+                </a:gradFill>
+                <a:latin typeface="Segoe UI" pitchFamily="34" charset="0"/>
+                <a:ea typeface="Segoe UI" pitchFamily="34" charset="0"/>
+                <a:cs typeface="Segoe UI" pitchFamily="34" charset="0"/>
+              </a:rPr>
+              <a:t>© Microsoft Corporation. All rights reserved. MICROSOFT MAKES NO WARRANTIES, EXPRESS, IMPLIED OR STATUTORY, AS TO THE INFORMATION IN THIS PRESENTATION.</a:t>
+            </a:r>
+          </a:p>
+        </p:txBody>
+      </p:sp>
+      <p:sp>
+        <p:nvSpPr>
+          <p:cNvPr id="6" name="Date Placeholder 5"/>
+          <p:cNvSpPr>
+            <a:spLocks noGrp="1"/>
+          </p:cNvSpPr>
+          <p:nvPr>
+            <p:ph type="dt" idx="12"/>
+          </p:nvPr>
+        </p:nvSpPr>
+        <p:spPr/>
+        <p:txBody>
+          <a:bodyPr/>
+          <a:lstStyle/>
+          <a:p>
+            <a:fld id="{386CE63F-9E7F-4C04-9D0D-FCA25A8E9E86}" type="datetime8">
+              <a:rPr lang="en-US" smtClean="0"/>
+              <a:t>12/5/2018 10:36 AM</a:t>
+            </a:fld>
+            <a:endParaRPr lang="en-US"/>
+          </a:p>
+        </p:txBody>
+      </p:sp>
+      <p:sp>
+        <p:nvSpPr>
+          <p:cNvPr id="7" name="Slide Number Placeholder 6"/>
+          <p:cNvSpPr>
+            <a:spLocks noGrp="1"/>
+          </p:cNvSpPr>
+          <p:nvPr>
+            <p:ph type="sldNum" sz="quarter" idx="13"/>
+          </p:nvPr>
+        </p:nvSpPr>
+        <p:spPr/>
+        <p:txBody>
+          <a:bodyPr/>
+          <a:lstStyle/>
+          <a:p>
+            <a:fld id="{B4008EB6-D09E-4580-8CD6-DDB14511944F}" type="slidenum">
+              <a:rPr lang="en-US" smtClean="0"/>
+              <a:pPr/>
+              <a:t>1</a:t>
+            </a:fld>
+            <a:endParaRPr lang="en-US"/>
+          </a:p>
+        </p:txBody>
+      </p:sp>
+    </p:spTree>
+    <p:extLst>
+      <p:ext uri="{BB962C8B-B14F-4D97-AF65-F5344CB8AC3E}">
+        <p14:creationId xmlns:p14="http://schemas.microsoft.com/office/powerpoint/2010/main" val="4110165152"/>
+      </p:ext>
+    </p:extLst>
+  </p:cSld>
+  <p:clrMapOvr>
+    <a:masterClrMapping/>
+  </p:clrMapOvr>
+</p:notes>
+</file>
+
+<file path=ppt/notesSlides/notesSlide2.xml><?xml version="1.0" encoding="utf-8"?>
+<p:notes xmlns:a="http://schemas.openxmlformats.org/drawingml/2006/main" xmlns:r="http://schemas.openxmlformats.org/officeDocument/2006/relationships" xmlns:p="http://schemas.openxmlformats.org/presentationml/2006/main">
+  <p:cSld>
+    <p:spTree>
+      <p:nvGrpSpPr>
+        <p:cNvPr id="1" name=""/>
+        <p:cNvGrpSpPr/>
+        <p:nvPr/>
+      </p:nvGrpSpPr>
+      <p:grpSpPr>
+        <a:xfrm>
+          <a:off x="0" y="0"/>
+          <a:ext cx="0" cy="0"/>
+          <a:chOff x="0" y="0"/>
+          <a:chExt cx="0" cy="0"/>
+        </a:xfrm>
+      </p:grpSpPr>
+      <p:sp>
+        <p:nvSpPr>
+          <p:cNvPr id="2" name="Slide Image Placeholder 1"/>
+          <p:cNvSpPr>
+            <a:spLocks noGrp="1" noRot="1" noChangeAspect="1"/>
+          </p:cNvSpPr>
+          <p:nvPr>
+            <p:ph type="sldImg"/>
+          </p:nvPr>
+        </p:nvSpPr>
+        <p:spPr/>
+      </p:sp>
+      <p:sp>
+        <p:nvSpPr>
+          <p:cNvPr id="3" name="Notes Placeholder 2"/>
+          <p:cNvSpPr>
+            <a:spLocks noGrp="1"/>
+          </p:cNvSpPr>
+          <p:nvPr>
+            <p:ph type="body" idx="1"/>
+          </p:nvPr>
+        </p:nvSpPr>
+        <p:spPr/>
+        <p:txBody>
+          <a:bodyPr/>
+          <a:lstStyle/>
+          <a:p>
+            <a:endParaRPr lang="en-US" dirty="0"/>
+          </a:p>
+        </p:txBody>
+      </p:sp>
+      <p:sp>
+        <p:nvSpPr>
+          <p:cNvPr id="4" name="Header Placeholder 3"/>
+          <p:cNvSpPr>
+            <a:spLocks noGrp="1"/>
+          </p:cNvSpPr>
+          <p:nvPr>
+            <p:ph type="hdr" sz="quarter" idx="10"/>
+          </p:nvPr>
+        </p:nvSpPr>
+        <p:spPr/>
+        <p:txBody>
+          <a:bodyPr/>
+          <a:lstStyle/>
+          <a:p>
             <a:pPr marL="0" marR="0" lvl="0" indent="0" algn="l" defTabSz="932742" rtl="0" eaLnBrk="1" fontAlgn="auto" latinLnBrk="0" hangingPunct="1">
               <a:lnSpc>
                 <a:spcPct val="100000"/>
@@ -936,7 +871,7 @@
                 <a:tabLst/>
                 <a:defRPr/>
               </a:pPr>
-              <a:t>9/7/2018 8:53 AM</a:t>
+              <a:t>12/5/2018 10:36 AM</a:t>
             </a:fld>
             <a:endParaRPr kumimoji="0" lang="en-US" sz="1200" b="0" i="0" u="none" strike="noStrike" kern="1200" cap="none" spc="0" normalizeH="0" baseline="0" noProof="0" dirty="0">
               <a:ln>
@@ -1051,90 +986,6 @@
 </p:notes>
 </file>
 
-<file path=ppt/notesSlides/notesSlide2.xml><?xml version="1.0" encoding="utf-8"?>
-<p:notes xmlns:a="http://schemas.openxmlformats.org/drawingml/2006/main" xmlns:r="http://schemas.openxmlformats.org/officeDocument/2006/relationships" xmlns:p="http://schemas.openxmlformats.org/presentationml/2006/main">
-  <p:cSld>
-    <p:spTree>
-      <p:nvGrpSpPr>
-        <p:cNvPr id="1" name=""/>
-        <p:cNvGrpSpPr/>
-        <p:nvPr/>
-      </p:nvGrpSpPr>
-      <p:grpSpPr>
-        <a:xfrm>
-          <a:off x="0" y="0"/>
-          <a:ext cx="0" cy="0"/>
-          <a:chOff x="0" y="0"/>
-          <a:chExt cx="0" cy="0"/>
-        </a:xfrm>
-      </p:grpSpPr>
-      <p:sp>
-        <p:nvSpPr>
-          <p:cNvPr id="2" name="Slide Image Placeholder 1"/>
-          <p:cNvSpPr>
-            <a:spLocks noGrp="1" noRot="1" noChangeAspect="1"/>
-          </p:cNvSpPr>
-          <p:nvPr>
-            <p:ph type="sldImg"/>
-          </p:nvPr>
-        </p:nvSpPr>
-        <p:spPr/>
-      </p:sp>
-      <p:sp>
-        <p:nvSpPr>
-          <p:cNvPr id="3" name="Notes Placeholder 2"/>
-          <p:cNvSpPr>
-            <a:spLocks noGrp="1"/>
-          </p:cNvSpPr>
-          <p:nvPr>
-            <p:ph type="body" idx="1"/>
-          </p:nvPr>
-        </p:nvSpPr>
-        <p:spPr/>
-        <p:txBody>
-          <a:bodyPr/>
-          <a:lstStyle/>
-          <a:p>
-            <a:endParaRPr lang="en-US" dirty="0"/>
-          </a:p>
-        </p:txBody>
-      </p:sp>
-      <p:sp>
-        <p:nvSpPr>
-          <p:cNvPr id="4" name="Slide Number Placeholder 3"/>
-          <p:cNvSpPr>
-            <a:spLocks noGrp="1"/>
-          </p:cNvSpPr>
-          <p:nvPr>
-            <p:ph type="sldNum" sz="quarter" idx="5"/>
-          </p:nvPr>
-        </p:nvSpPr>
-        <p:spPr/>
-        <p:txBody>
-          <a:bodyPr/>
-          <a:lstStyle/>
-          <a:p>
-            <a:fld id="{048B2CCB-0717-404A-9DED-C7E88593F555}" type="slidenum">
-              <a:rPr lang="en-US" smtClean="0"/>
-              <a:t>8</a:t>
-            </a:fld>
-            <a:endParaRPr lang="en-US"/>
-          </a:p>
-        </p:txBody>
-      </p:sp>
-    </p:spTree>
-    <p:extLst>
-      <p:ext uri="{BB962C8B-B14F-4D97-AF65-F5344CB8AC3E}">
-        <p14:creationId xmlns:p14="http://schemas.microsoft.com/office/powerpoint/2010/main" val="1741128738"/>
-      </p:ext>
-    </p:extLst>
-  </p:cSld>
-  <p:clrMapOvr>
-    <a:masterClrMapping/>
-  </p:clrMapOvr>
-</p:notes>
-</file>
-
 <file path=ppt/notesSlides/notesSlide3.xml><?xml version="1.0" encoding="utf-8"?>
 <p:notes xmlns:a="http://schemas.openxmlformats.org/drawingml/2006/main" xmlns:r="http://schemas.openxmlformats.org/officeDocument/2006/relationships" xmlns:p="http://schemas.openxmlformats.org/presentationml/2006/main">
   <p:cSld>
@@ -1154,6 +1005,90 @@
       </p:grpSpPr>
       <p:sp>
         <p:nvSpPr>
+          <p:cNvPr id="2" name="Slide Image Placeholder 1"/>
+          <p:cNvSpPr>
+            <a:spLocks noGrp="1" noRot="1" noChangeAspect="1"/>
+          </p:cNvSpPr>
+          <p:nvPr>
+            <p:ph type="sldImg"/>
+          </p:nvPr>
+        </p:nvSpPr>
+        <p:spPr/>
+      </p:sp>
+      <p:sp>
+        <p:nvSpPr>
+          <p:cNvPr id="3" name="Notes Placeholder 2"/>
+          <p:cNvSpPr>
+            <a:spLocks noGrp="1"/>
+          </p:cNvSpPr>
+          <p:nvPr>
+            <p:ph type="body" idx="1"/>
+          </p:nvPr>
+        </p:nvSpPr>
+        <p:spPr/>
+        <p:txBody>
+          <a:bodyPr/>
+          <a:lstStyle/>
+          <a:p>
+            <a:endParaRPr lang="en-US" dirty="0"/>
+          </a:p>
+        </p:txBody>
+      </p:sp>
+      <p:sp>
+        <p:nvSpPr>
+          <p:cNvPr id="4" name="Slide Number Placeholder 3"/>
+          <p:cNvSpPr>
+            <a:spLocks noGrp="1"/>
+          </p:cNvSpPr>
+          <p:nvPr>
+            <p:ph type="sldNum" sz="quarter" idx="5"/>
+          </p:nvPr>
+        </p:nvSpPr>
+        <p:spPr/>
+        <p:txBody>
+          <a:bodyPr/>
+          <a:lstStyle/>
+          <a:p>
+            <a:fld id="{048B2CCB-0717-404A-9DED-C7E88593F555}" type="slidenum">
+              <a:rPr lang="en-US" smtClean="0"/>
+              <a:t>8</a:t>
+            </a:fld>
+            <a:endParaRPr lang="en-US"/>
+          </a:p>
+        </p:txBody>
+      </p:sp>
+    </p:spTree>
+    <p:extLst>
+      <p:ext uri="{BB962C8B-B14F-4D97-AF65-F5344CB8AC3E}">
+        <p14:creationId xmlns:p14="http://schemas.microsoft.com/office/powerpoint/2010/main" val="1741128738"/>
+      </p:ext>
+    </p:extLst>
+  </p:cSld>
+  <p:clrMapOvr>
+    <a:masterClrMapping/>
+  </p:clrMapOvr>
+</p:notes>
+</file>
+
+<file path=ppt/notesSlides/notesSlide4.xml><?xml version="1.0" encoding="utf-8"?>
+<p:notes xmlns:a="http://schemas.openxmlformats.org/drawingml/2006/main" xmlns:r="http://schemas.openxmlformats.org/officeDocument/2006/relationships" xmlns:p="http://schemas.openxmlformats.org/presentationml/2006/main">
+  <p:cSld>
+    <p:spTree>
+      <p:nvGrpSpPr>
+        <p:cNvPr id="1" name=""/>
+        <p:cNvGrpSpPr/>
+        <p:nvPr/>
+      </p:nvGrpSpPr>
+      <p:grpSpPr>
+        <a:xfrm>
+          <a:off x="0" y="0"/>
+          <a:ext cx="0" cy="0"/>
+          <a:chOff x="0" y="0"/>
+          <a:chExt cx="0" cy="0"/>
+        </a:xfrm>
+      </p:grpSpPr>
+      <p:sp>
+        <p:nvSpPr>
           <p:cNvPr id="41985" name="Slide Image Placeholder 1"/>
           <p:cNvSpPr>
             <a:spLocks noGrp="1" noRot="1" noChangeAspect="1"/>
@@ -1174,14 +1109,14 @@
           </a:ln>
           <a:extLst>
             <a:ext uri="{909E8E84-426E-40dd-AFC4-6F175D3DCCD1}">
-              <a14:hiddenFill xmlns:a14="http://schemas.microsoft.com/office/drawing/2010/main" xmlns="">
+              <a14:hiddenFill xmlns="" xmlns:a14="http://schemas.microsoft.com/office/drawing/2010/main">
                 <a:solidFill>
                   <a:srgbClr val="FFFFFF"/>
                 </a:solidFill>
               </a14:hiddenFill>
             </a:ext>
             <a:ext uri="{FAA26D3D-D897-4be2-8F04-BA451C77F1D7}">
-              <ma14:placeholderFlag xmlns:ma14="http://schemas.microsoft.com/office/mac/drawingml/2011/main" xmlns="" val="1"/>
+              <ma14:placeholderFlag xmlns="" xmlns:ma14="http://schemas.microsoft.com/office/mac/drawingml/2011/main" val="1"/>
             </a:ext>
           </a:extLst>
         </p:spPr>
@@ -1492,7 +1427,7 @@
                 <a:tabLst/>
                 <a:defRPr/>
               </a:pPr>
-              <a:t>9/7/2018</a:t>
+              <a:t>12/5/2018</a:t>
             </a:fld>
             <a:endParaRPr kumimoji="0" lang="en-US" sz="1200" b="0" i="0" u="none" strike="noStrike" kern="1200" cap="none" spc="0" normalizeH="0" baseline="0" noProof="0">
               <a:ln>
@@ -1719,7 +1654,7 @@
 </p:notes>
 </file>
 
-<file path=ppt/notesSlides/notesSlide4.xml><?xml version="1.0" encoding="utf-8"?>
+<file path=ppt/notesSlides/notesSlide5.xml><?xml version="1.0" encoding="utf-8"?>
 <p:notes xmlns:a="http://schemas.openxmlformats.org/drawingml/2006/main" xmlns:r="http://schemas.openxmlformats.org/officeDocument/2006/relationships" xmlns:p="http://schemas.openxmlformats.org/presentationml/2006/main">
   <p:cSld>
     <p:spTree>
@@ -1957,7 +1892,7 @@
           <a:p>
             <a:fld id="{AC1490E7-1871-46B7-B3E9-09661F334C53}" type="datetimeFigureOut">
               <a:rPr lang="en-US" smtClean="0"/>
-              <a:t>9/7/2018</a:t>
+              <a:t>12/5/2018</a:t>
             </a:fld>
             <a:endParaRPr lang="en-US"/>
           </a:p>
@@ -2155,7 +2090,7 @@
           <a:p>
             <a:fld id="{AC1490E7-1871-46B7-B3E9-09661F334C53}" type="datetimeFigureOut">
               <a:rPr lang="en-US" smtClean="0"/>
-              <a:t>9/7/2018</a:t>
+              <a:t>12/5/2018</a:t>
             </a:fld>
             <a:endParaRPr lang="en-US"/>
           </a:p>
@@ -2363,7 +2298,7 @@
           <a:p>
             <a:fld id="{AC1490E7-1871-46B7-B3E9-09661F334C53}" type="datetimeFigureOut">
               <a:rPr lang="en-US" smtClean="0"/>
-              <a:t>9/7/2018</a:t>
+              <a:t>12/5/2018</a:t>
             </a:fld>
             <a:endParaRPr lang="en-US"/>
           </a:p>
@@ -4342,7 +4277,7 @@
           <a:p>
             <a:fld id="{AC1490E7-1871-46B7-B3E9-09661F334C53}" type="datetimeFigureOut">
               <a:rPr lang="en-US" smtClean="0"/>
-              <a:t>9/7/2018</a:t>
+              <a:t>12/5/2018</a:t>
             </a:fld>
             <a:endParaRPr lang="en-US"/>
           </a:p>
@@ -5867,14 +5802,14 @@
           </a:ln>
           <a:extLst>
             <a:ext uri="{909E8E84-426E-40dd-AFC4-6F175D3DCCD1}">
-              <a14:hiddenFill xmlns:a14="http://schemas.microsoft.com/office/drawing/2010/main" xmlns="">
+              <a14:hiddenFill xmlns="" xmlns:a14="http://schemas.microsoft.com/office/drawing/2010/main">
                 <a:solidFill>
                   <a:srgbClr val="FFFFFF"/>
                 </a:solidFill>
               </a14:hiddenFill>
             </a:ext>
             <a:ext uri="{91240B29-F687-4f45-9708-019B960494DF}">
-              <a14:hiddenLine xmlns:a14="http://schemas.microsoft.com/office/drawing/2010/main" xmlns="" w="9525">
+              <a14:hiddenLine xmlns="" xmlns:a14="http://schemas.microsoft.com/office/drawing/2010/main" w="9525">
                 <a:solidFill>
                   <a:srgbClr val="000000"/>
                 </a:solidFill>
@@ -6262,7 +6197,7 @@
           <a:p>
             <a:fld id="{AC1490E7-1871-46B7-B3E9-09661F334C53}" type="datetimeFigureOut">
               <a:rPr lang="en-US" smtClean="0"/>
-              <a:t>9/7/2018</a:t>
+              <a:t>12/5/2018</a:t>
             </a:fld>
             <a:endParaRPr lang="en-US"/>
           </a:p>
@@ -6332,6 +6267,243 @@
   <p:clrMapOvr>
     <a:masterClrMapping/>
   </p:clrMapOvr>
+</p:sldLayout>
+</file>
+
+<file path=ppt/slideLayouts/slideLayout30.xml><?xml version="1.0" encoding="utf-8"?>
+<p:sldLayout xmlns:a="http://schemas.openxmlformats.org/drawingml/2006/main" xmlns:r="http://schemas.openxmlformats.org/officeDocument/2006/relationships" xmlns:p="http://schemas.openxmlformats.org/presentationml/2006/main" userDrawn="1">
+  <p:cSld name="Walk-in">
+    <p:bg>
+      <p:bgRef idx="1001">
+        <a:schemeClr val="bg2"/>
+      </p:bgRef>
+    </p:bg>
+    <p:spTree>
+      <p:nvGrpSpPr>
+        <p:cNvPr id="1" name=""/>
+        <p:cNvGrpSpPr/>
+        <p:nvPr/>
+      </p:nvGrpSpPr>
+      <p:grpSpPr>
+        <a:xfrm>
+          <a:off x="0" y="0"/>
+          <a:ext cx="0" cy="0"/>
+          <a:chOff x="0" y="0"/>
+          <a:chExt cx="0" cy="0"/>
+        </a:xfrm>
+      </p:grpSpPr>
+      <p:pic>
+        <p:nvPicPr>
+          <p:cNvPr id="4" name="Picture 3" descr="A sky view looking up at the camera&#10;&#10;Description generated with high confidence">
+            <a:extLst>
+              <a:ext uri="{FF2B5EF4-FFF2-40B4-BE49-F238E27FC236}">
+                <a16:creationId xmlns:a16="http://schemas.microsoft.com/office/drawing/2014/main" id="{E0143243-EBF8-42DF-AFA8-808B9A70F959}"/>
+              </a:ext>
+            </a:extLst>
+          </p:cNvPr>
+          <p:cNvPicPr>
+            <a:picLocks noChangeAspect="1"/>
+          </p:cNvPicPr>
+          <p:nvPr userDrawn="1"/>
+        </p:nvPicPr>
+        <p:blipFill>
+          <a:blip r:embed="rId2"/>
+          <a:stretch>
+            <a:fillRect/>
+          </a:stretch>
+        </p:blipFill>
+        <p:spPr>
+          <a:xfrm>
+            <a:off x="0" y="338"/>
+            <a:ext cx="12192000" cy="6857323"/>
+          </a:xfrm>
+          <a:prstGeom prst="rect">
+            <a:avLst/>
+          </a:prstGeom>
+        </p:spPr>
+      </p:pic>
+      <p:sp>
+        <p:nvSpPr>
+          <p:cNvPr id="54" name="Rectangle 53">
+            <a:extLst>
+              <a:ext uri="{FF2B5EF4-FFF2-40B4-BE49-F238E27FC236}">
+                <a16:creationId xmlns:a16="http://schemas.microsoft.com/office/drawing/2014/main" id="{4899085C-4B16-41A5-A2CB-5D4798A0322E}"/>
+              </a:ext>
+            </a:extLst>
+          </p:cNvPr>
+          <p:cNvSpPr/>
+          <p:nvPr userDrawn="1"/>
+        </p:nvSpPr>
+        <p:spPr bwMode="white">
+          <a:xfrm>
+            <a:off x="10092825" y="4781344"/>
+            <a:ext cx="2321486" cy="1405513"/>
+          </a:xfrm>
+          <a:prstGeom prst="rect">
+            <a:avLst/>
+          </a:prstGeom>
+        </p:spPr>
+        <p:txBody>
+          <a:bodyPr wrap="square" lIns="0" tIns="0" rIns="0" bIns="0">
+            <a:spAutoFit/>
+          </a:bodyPr>
+          <a:lstStyle/>
+          <a:p>
+            <a:pPr marL="0" marR="0" lvl="0" indent="0" algn="l" defTabSz="932742" rtl="0" eaLnBrk="1" fontAlgn="auto" latinLnBrk="0" hangingPunct="1">
+              <a:lnSpc>
+                <a:spcPct val="100000"/>
+              </a:lnSpc>
+              <a:spcBef>
+                <a:spcPts val="800"/>
+              </a:spcBef>
+              <a:spcAft>
+                <a:spcPts val="0"/>
+              </a:spcAft>
+              <a:buClrTx/>
+              <a:buSzTx/>
+              <a:buFontTx/>
+              <a:buNone/>
+              <a:tabLst/>
+              <a:defRPr/>
+            </a:pPr>
+            <a:r>
+              <a:rPr kumimoji="0" lang="en-US" sz="2600" b="0" i="0" u="none" strike="noStrike" kern="1200" cap="none" normalizeH="0" baseline="0" noProof="0">
+                <a:ln w="3175">
+                  <a:noFill/>
+                </a:ln>
+                <a:gradFill>
+                  <a:gsLst>
+                    <a:gs pos="14801">
+                      <a:schemeClr val="bg1"/>
+                    </a:gs>
+                    <a:gs pos="75000">
+                      <a:schemeClr val="bg1"/>
+                    </a:gs>
+                  </a:gsLst>
+                  <a:lin ang="5400000" scaled="1"/>
+                </a:gradFill>
+                <a:effectLst/>
+                <a:uLnTx/>
+                <a:uFillTx/>
+                <a:latin typeface="Segoe UI Semibold"/>
+                <a:ea typeface="+mn-ea"/>
+                <a:cs typeface="Segoe UI" pitchFamily="34" charset="0"/>
+              </a:rPr>
+              <a:t>Learn.</a:t>
+            </a:r>
+          </a:p>
+          <a:p>
+            <a:pPr marL="0" marR="0" lvl="0" indent="0" algn="l" defTabSz="932742" rtl="0" eaLnBrk="1" fontAlgn="auto" latinLnBrk="0" hangingPunct="1">
+              <a:lnSpc>
+                <a:spcPct val="100000"/>
+              </a:lnSpc>
+              <a:spcBef>
+                <a:spcPts val="800"/>
+              </a:spcBef>
+              <a:spcAft>
+                <a:spcPts val="0"/>
+              </a:spcAft>
+              <a:buClrTx/>
+              <a:buSzTx/>
+              <a:buFontTx/>
+              <a:buNone/>
+              <a:tabLst/>
+              <a:defRPr/>
+            </a:pPr>
+            <a:r>
+              <a:rPr kumimoji="0" lang="en-US" sz="2600" b="0" i="0" u="none" strike="noStrike" kern="1200" cap="none" normalizeH="0" baseline="0" noProof="0">
+                <a:ln w="3175">
+                  <a:noFill/>
+                </a:ln>
+                <a:gradFill>
+                  <a:gsLst>
+                    <a:gs pos="14801">
+                      <a:schemeClr val="bg1"/>
+                    </a:gs>
+                    <a:gs pos="75000">
+                      <a:schemeClr val="bg1"/>
+                    </a:gs>
+                  </a:gsLst>
+                  <a:lin ang="5400000" scaled="1"/>
+                </a:gradFill>
+                <a:effectLst/>
+                <a:uLnTx/>
+                <a:uFillTx/>
+                <a:latin typeface="Segoe UI Semibold"/>
+                <a:ea typeface="+mn-ea"/>
+                <a:cs typeface="Segoe UI" pitchFamily="34" charset="0"/>
+              </a:rPr>
+              <a:t>Connect.</a:t>
+            </a:r>
+          </a:p>
+          <a:p>
+            <a:pPr marL="0" marR="0" lvl="0" indent="0" algn="l" defTabSz="932742" rtl="0" eaLnBrk="1" fontAlgn="auto" latinLnBrk="0" hangingPunct="1">
+              <a:lnSpc>
+                <a:spcPct val="100000"/>
+              </a:lnSpc>
+              <a:spcBef>
+                <a:spcPts val="800"/>
+              </a:spcBef>
+              <a:spcAft>
+                <a:spcPts val="0"/>
+              </a:spcAft>
+              <a:buClrTx/>
+              <a:buSzTx/>
+              <a:buFontTx/>
+              <a:buNone/>
+              <a:tabLst/>
+              <a:defRPr/>
+            </a:pPr>
+            <a:r>
+              <a:rPr kumimoji="0" lang="en-US" sz="2600" b="0" i="0" u="none" strike="noStrike" kern="1200" cap="none" normalizeH="0" baseline="0" noProof="0">
+                <a:ln w="3175">
+                  <a:noFill/>
+                </a:ln>
+                <a:gradFill>
+                  <a:gsLst>
+                    <a:gs pos="14801">
+                      <a:schemeClr val="bg1"/>
+                    </a:gs>
+                    <a:gs pos="75000">
+                      <a:schemeClr val="bg1"/>
+                    </a:gs>
+                  </a:gsLst>
+                  <a:lin ang="5400000" scaled="1"/>
+                </a:gradFill>
+                <a:effectLst/>
+                <a:uLnTx/>
+                <a:uFillTx/>
+                <a:latin typeface="Segoe UI Semibold"/>
+                <a:ea typeface="+mn-ea"/>
+                <a:cs typeface="Segoe UI" pitchFamily="34" charset="0"/>
+              </a:rPr>
+              <a:t>Explore.</a:t>
+            </a:r>
+          </a:p>
+        </p:txBody>
+      </p:sp>
+    </p:spTree>
+    <p:extLst>
+      <p:ext uri="{BB962C8B-B14F-4D97-AF65-F5344CB8AC3E}">
+        <p14:creationId xmlns:p14="http://schemas.microsoft.com/office/powerpoint/2010/main" val="2243752953"/>
+      </p:ext>
+    </p:extLst>
+  </p:cSld>
+  <p:clrMapOvr>
+    <a:overrideClrMapping bg1="lt1" tx1="dk1" bg2="lt2" tx2="dk2" accent1="accent1" accent2="accent2" accent3="accent3" accent4="accent4" accent5="accent5" accent6="accent6" hlink="hlink" folHlink="folHlink"/>
+  </p:clrMapOvr>
+  <mc:AlternateContent xmlns:mc="http://schemas.openxmlformats.org/markup-compatibility/2006" xmlns:p159="http://schemas.microsoft.com/office/powerpoint/2015/09/main">
+    <mc:Choice Requires="p159">
+      <p:transition xmlns:p14="http://schemas.microsoft.com/office/powerpoint/2010/main" spd="slow" p14:dur="2000">
+        <p159:morph option="byObject"/>
+      </p:transition>
+    </mc:Choice>
+    <mc:Fallback xmlns="">
+      <p:transition spd="slow">
+        <p:fade/>
+      </p:transition>
+    </mc:Fallback>
+  </mc:AlternateContent>
 </p:sldLayout>
 </file>
 
@@ -6527,7 +6699,7 @@
           <a:p>
             <a:fld id="{AC1490E7-1871-46B7-B3E9-09661F334C53}" type="datetimeFigureOut">
               <a:rPr lang="en-US" smtClean="0"/>
-              <a:t>9/7/2018</a:t>
+              <a:t>12/5/2018</a:t>
             </a:fld>
             <a:endParaRPr lang="en-US"/>
           </a:p>
@@ -6939,7 +7111,7 @@
           <a:p>
             <a:fld id="{AC1490E7-1871-46B7-B3E9-09661F334C53}" type="datetimeFigureOut">
               <a:rPr lang="en-US" smtClean="0"/>
-              <a:t>9/7/2018</a:t>
+              <a:t>12/5/2018</a:t>
             </a:fld>
             <a:endParaRPr lang="en-US"/>
           </a:p>
@@ -7080,7 +7252,7 @@
           <a:p>
             <a:fld id="{AC1490E7-1871-46B7-B3E9-09661F334C53}" type="datetimeFigureOut">
               <a:rPr lang="en-US" smtClean="0"/>
-              <a:t>9/7/2018</a:t>
+              <a:t>12/5/2018</a:t>
             </a:fld>
             <a:endParaRPr lang="en-US"/>
           </a:p>
@@ -7193,7 +7365,7 @@
           <a:p>
             <a:fld id="{AC1490E7-1871-46B7-B3E9-09661F334C53}" type="datetimeFigureOut">
               <a:rPr lang="en-US" smtClean="0"/>
-              <a:t>9/7/2018</a:t>
+              <a:t>12/5/2018</a:t>
             </a:fld>
             <a:endParaRPr lang="en-US"/>
           </a:p>
@@ -7504,7 +7676,7 @@
           <a:p>
             <a:fld id="{AC1490E7-1871-46B7-B3E9-09661F334C53}" type="datetimeFigureOut">
               <a:rPr lang="en-US" smtClean="0"/>
-              <a:t>9/7/2018</a:t>
+              <a:t>12/5/2018</a:t>
             </a:fld>
             <a:endParaRPr lang="en-US"/>
           </a:p>
@@ -7792,7 +7964,7 @@
           <a:p>
             <a:fld id="{AC1490E7-1871-46B7-B3E9-09661F334C53}" type="datetimeFigureOut">
               <a:rPr lang="en-US" smtClean="0"/>
-              <a:t>9/7/2018</a:t>
+              <a:t>12/5/2018</a:t>
             </a:fld>
             <a:endParaRPr lang="en-US"/>
           </a:p>
@@ -8033,7 +8205,7 @@
           <a:p>
             <a:fld id="{AC1490E7-1871-46B7-B3E9-09661F334C53}" type="datetimeFigureOut">
               <a:rPr lang="en-US" smtClean="0"/>
-              <a:t>9/7/2018</a:t>
+              <a:t>12/5/2018</a:t>
             </a:fld>
             <a:endParaRPr lang="en-US"/>
           </a:p>
@@ -8559,7 +8731,7 @@
           <p:nvPr userDrawn="1"/>
         </p:nvPicPr>
         <p:blipFill>
-          <a:blip r:embed="rId20" cstate="screen">
+          <a:blip r:embed="rId21" cstate="screen">
             <a:extLst>
               <a:ext uri="{28A0092B-C50C-407E-A947-70E740481C1C}">
                 <a14:useLocalDpi xmlns:a14="http://schemas.microsoft.com/office/drawing/2010/main"/>
@@ -8607,6 +8779,7 @@
     <p:sldLayoutId id="2147483676" r:id="rId16"/>
     <p:sldLayoutId id="2147483677" r:id="rId17"/>
     <p:sldLayoutId id="2147483678" r:id="rId18"/>
+    <p:sldLayoutId id="2147483679" r:id="rId19"/>
   </p:sldLayoutIdLst>
   <p:transition>
     <p:fade/>
@@ -9103,20 +9276,6 @@
 <file path=ppt/slides/slide1.xml><?xml version="1.0" encoding="utf-8"?>
 <p:sld xmlns:a="http://schemas.openxmlformats.org/drawingml/2006/main" xmlns:r="http://schemas.openxmlformats.org/officeDocument/2006/relationships" xmlns:p="http://schemas.openxmlformats.org/presentationml/2006/main">
   <p:cSld>
-    <p:bg>
-      <p:bgPr>
-        <a:blipFill dpi="0" rotWithShape="1">
-          <a:blip r:embed="rId2">
-            <a:lum/>
-          </a:blip>
-          <a:srcRect/>
-          <a:stretch>
-            <a:fillRect/>
-          </a:stretch>
-        </a:blipFill>
-        <a:effectLst/>
-      </p:bgPr>
-    </p:bg>
     <p:spTree>
       <p:nvGrpSpPr>
         <p:cNvPr id="1" name=""/>
@@ -9131,10 +9290,372 @@
           <a:chExt cx="0" cy="0"/>
         </a:xfrm>
       </p:grpSpPr>
+      <p:sp>
+        <p:nvSpPr>
+          <p:cNvPr id="2" name="TextBox 1">
+            <a:extLst>
+              <a:ext uri="{FF2B5EF4-FFF2-40B4-BE49-F238E27FC236}">
+                <a16:creationId xmlns:a16="http://schemas.microsoft.com/office/drawing/2014/main" id="{5A304928-0F5A-4725-A164-3CEEC03A4BE0}"/>
+              </a:ext>
+            </a:extLst>
+          </p:cNvPr>
+          <p:cNvSpPr txBox="1"/>
+          <p:nvPr/>
+        </p:nvSpPr>
+        <p:spPr>
+          <a:xfrm>
+            <a:off x="5192106" y="4481223"/>
+            <a:ext cx="2402430" cy="307777"/>
+          </a:xfrm>
+          <a:prstGeom prst="rect">
+            <a:avLst/>
+          </a:prstGeom>
+          <a:noFill/>
+        </p:spPr>
+        <p:txBody>
+          <a:bodyPr wrap="square" lIns="0" tIns="0" rIns="0" bIns="0" rtlCol="0">
+            <a:spAutoFit/>
+          </a:bodyPr>
+          <a:lstStyle>
+            <a:defPPr>
+              <a:defRPr lang="en-US"/>
+            </a:defPPr>
+            <a:lvl1pPr marL="0" algn="l" defTabSz="914367" rtl="0" eaLnBrk="1" latinLnBrk="0" hangingPunct="1">
+              <a:defRPr sz="1765" kern="1200">
+                <a:solidFill>
+                  <a:schemeClr val="tx1"/>
+                </a:solidFill>
+                <a:latin typeface="+mn-lt"/>
+                <a:ea typeface="+mn-ea"/>
+                <a:cs typeface="+mn-cs"/>
+              </a:defRPr>
+            </a:lvl1pPr>
+            <a:lvl2pPr marL="457183" algn="l" defTabSz="914367" rtl="0" eaLnBrk="1" latinLnBrk="0" hangingPunct="1">
+              <a:defRPr sz="1765" kern="1200">
+                <a:solidFill>
+                  <a:schemeClr val="tx1"/>
+                </a:solidFill>
+                <a:latin typeface="+mn-lt"/>
+                <a:ea typeface="+mn-ea"/>
+                <a:cs typeface="+mn-cs"/>
+              </a:defRPr>
+            </a:lvl2pPr>
+            <a:lvl3pPr marL="914367" algn="l" defTabSz="914367" rtl="0" eaLnBrk="1" latinLnBrk="0" hangingPunct="1">
+              <a:defRPr sz="1765" kern="1200">
+                <a:solidFill>
+                  <a:schemeClr val="tx1"/>
+                </a:solidFill>
+                <a:latin typeface="+mn-lt"/>
+                <a:ea typeface="+mn-ea"/>
+                <a:cs typeface="+mn-cs"/>
+              </a:defRPr>
+            </a:lvl3pPr>
+            <a:lvl4pPr marL="1371550" algn="l" defTabSz="914367" rtl="0" eaLnBrk="1" latinLnBrk="0" hangingPunct="1">
+              <a:defRPr sz="1765" kern="1200">
+                <a:solidFill>
+                  <a:schemeClr val="tx1"/>
+                </a:solidFill>
+                <a:latin typeface="+mn-lt"/>
+                <a:ea typeface="+mn-ea"/>
+                <a:cs typeface="+mn-cs"/>
+              </a:defRPr>
+            </a:lvl4pPr>
+            <a:lvl5pPr marL="1828734" algn="l" defTabSz="914367" rtl="0" eaLnBrk="1" latinLnBrk="0" hangingPunct="1">
+              <a:defRPr sz="1765" kern="1200">
+                <a:solidFill>
+                  <a:schemeClr val="tx1"/>
+                </a:solidFill>
+                <a:latin typeface="+mn-lt"/>
+                <a:ea typeface="+mn-ea"/>
+                <a:cs typeface="+mn-cs"/>
+              </a:defRPr>
+            </a:lvl5pPr>
+            <a:lvl6pPr marL="2285918" algn="l" defTabSz="914367" rtl="0" eaLnBrk="1" latinLnBrk="0" hangingPunct="1">
+              <a:defRPr sz="1765" kern="1200">
+                <a:solidFill>
+                  <a:schemeClr val="tx1"/>
+                </a:solidFill>
+                <a:latin typeface="+mn-lt"/>
+                <a:ea typeface="+mn-ea"/>
+                <a:cs typeface="+mn-cs"/>
+              </a:defRPr>
+            </a:lvl6pPr>
+            <a:lvl7pPr marL="2743101" algn="l" defTabSz="914367" rtl="0" eaLnBrk="1" latinLnBrk="0" hangingPunct="1">
+              <a:defRPr sz="1765" kern="1200">
+                <a:solidFill>
+                  <a:schemeClr val="tx1"/>
+                </a:solidFill>
+                <a:latin typeface="+mn-lt"/>
+                <a:ea typeface="+mn-ea"/>
+                <a:cs typeface="+mn-cs"/>
+              </a:defRPr>
+            </a:lvl7pPr>
+            <a:lvl8pPr marL="3200284" algn="l" defTabSz="914367" rtl="0" eaLnBrk="1" latinLnBrk="0" hangingPunct="1">
+              <a:defRPr sz="1765" kern="1200">
+                <a:solidFill>
+                  <a:schemeClr val="tx1"/>
+                </a:solidFill>
+                <a:latin typeface="+mn-lt"/>
+                <a:ea typeface="+mn-ea"/>
+                <a:cs typeface="+mn-cs"/>
+              </a:defRPr>
+            </a:lvl8pPr>
+            <a:lvl9pPr marL="3657469" algn="l" defTabSz="914367" rtl="0" eaLnBrk="1" latinLnBrk="0" hangingPunct="1">
+              <a:defRPr sz="1765" kern="1200">
+                <a:solidFill>
+                  <a:schemeClr val="tx1"/>
+                </a:solidFill>
+                <a:latin typeface="+mn-lt"/>
+                <a:ea typeface="+mn-ea"/>
+                <a:cs typeface="+mn-cs"/>
+              </a:defRPr>
+            </a:lvl9pPr>
+          </a:lstStyle>
+          <a:p>
+            <a:pPr algn="l"/>
+            <a:r>
+              <a:rPr lang="en-US" sz="2000" dirty="0">
+                <a:solidFill>
+                  <a:schemeClr val="bg1"/>
+                </a:solidFill>
+              </a:rPr>
+              <a:t>#</a:t>
+            </a:r>
+            <a:r>
+              <a:rPr lang="en-US" sz="2000" dirty="0" err="1">
+                <a:solidFill>
+                  <a:schemeClr val="bg1"/>
+                </a:solidFill>
+              </a:rPr>
+              <a:t>Azuredevdays</a:t>
+            </a:r>
+            <a:endParaRPr lang="en-US" sz="2000" dirty="0">
+              <a:solidFill>
+                <a:schemeClr val="bg1"/>
+              </a:solidFill>
+            </a:endParaRPr>
+          </a:p>
+        </p:txBody>
+      </p:sp>
+      <p:sp>
+        <p:nvSpPr>
+          <p:cNvPr id="3" name="TextBox 2">
+            <a:extLst>
+              <a:ext uri="{FF2B5EF4-FFF2-40B4-BE49-F238E27FC236}">
+                <a16:creationId xmlns:a16="http://schemas.microsoft.com/office/drawing/2014/main" id="{9708FD0C-EE86-4FA0-AF2F-311684644220}"/>
+              </a:ext>
+            </a:extLst>
+          </p:cNvPr>
+          <p:cNvSpPr txBox="1"/>
+          <p:nvPr/>
+        </p:nvSpPr>
+        <p:spPr>
+          <a:xfrm>
+            <a:off x="4810584" y="5340625"/>
+            <a:ext cx="2570832" cy="849463"/>
+          </a:xfrm>
+          <a:prstGeom prst="rect">
+            <a:avLst/>
+          </a:prstGeom>
+          <a:noFill/>
+        </p:spPr>
+        <p:txBody>
+          <a:bodyPr wrap="none" lIns="182880" tIns="146304" rIns="182880" bIns="146304" rtlCol="0">
+            <a:spAutoFit/>
+          </a:bodyPr>
+          <a:lstStyle/>
+          <a:p>
+            <a:pPr>
+              <a:lnSpc>
+                <a:spcPct val="90000"/>
+              </a:lnSpc>
+              <a:spcAft>
+                <a:spcPts val="600"/>
+              </a:spcAft>
+            </a:pPr>
+            <a:r>
+              <a:rPr lang="en-US" sz="4000" dirty="0">
+                <a:solidFill>
+                  <a:schemeClr val="bg1"/>
+                </a:solidFill>
+              </a:rPr>
+              <a:t>Welcome!</a:t>
+            </a:r>
+            <a:endParaRPr lang="en-US" sz="2400" dirty="0">
+              <a:solidFill>
+                <a:schemeClr val="bg1"/>
+              </a:solidFill>
+            </a:endParaRPr>
+          </a:p>
+        </p:txBody>
+      </p:sp>
+      <p:sp>
+        <p:nvSpPr>
+          <p:cNvPr id="5" name="TextBox 4">
+            <a:extLst>
+              <a:ext uri="{FF2B5EF4-FFF2-40B4-BE49-F238E27FC236}">
+                <a16:creationId xmlns:a16="http://schemas.microsoft.com/office/drawing/2014/main" id="{FFCE0488-6166-44D2-B508-1B540B3093A4}"/>
+              </a:ext>
+            </a:extLst>
+          </p:cNvPr>
+          <p:cNvSpPr txBox="1"/>
+          <p:nvPr/>
+        </p:nvSpPr>
+        <p:spPr>
+          <a:xfrm>
+            <a:off x="7491350" y="140189"/>
+            <a:ext cx="4771306" cy="1037207"/>
+          </a:xfrm>
+          <a:prstGeom prst="rect">
+            <a:avLst/>
+          </a:prstGeom>
+          <a:noFill/>
+        </p:spPr>
+        <p:txBody>
+          <a:bodyPr wrap="none" lIns="182880" tIns="146304" rIns="182880" bIns="146304" rtlCol="0">
+            <a:spAutoFit/>
+          </a:bodyPr>
+          <a:lstStyle/>
+          <a:p>
+            <a:pPr>
+              <a:lnSpc>
+                <a:spcPct val="90000"/>
+              </a:lnSpc>
+              <a:spcAft>
+                <a:spcPts val="600"/>
+              </a:spcAft>
+            </a:pPr>
+            <a:r>
+              <a:rPr lang="en-US" sz="2400" dirty="0">
+                <a:solidFill>
+                  <a:schemeClr val="bg1"/>
+                </a:solidFill>
+              </a:rPr>
+              <a:t>Content: aka.ms/</a:t>
+            </a:r>
+            <a:r>
+              <a:rPr lang="en-US" sz="2400" dirty="0" err="1">
+                <a:solidFill>
+                  <a:schemeClr val="bg1"/>
+                </a:solidFill>
+              </a:rPr>
+              <a:t>omahadevdays</a:t>
+            </a:r>
+            <a:endParaRPr lang="en-US" sz="2400" dirty="0">
+              <a:solidFill>
+                <a:schemeClr val="bg1"/>
+              </a:solidFill>
+            </a:endParaRPr>
+          </a:p>
+          <a:p>
+            <a:pPr>
+              <a:lnSpc>
+                <a:spcPct val="90000"/>
+              </a:lnSpc>
+              <a:spcAft>
+                <a:spcPts val="600"/>
+              </a:spcAft>
+            </a:pPr>
+            <a:r>
+              <a:rPr lang="en-US" sz="2400" dirty="0">
+                <a:solidFill>
+                  <a:schemeClr val="bg1"/>
+                </a:solidFill>
+              </a:rPr>
+              <a:t>Survey: aka.ms/</a:t>
+            </a:r>
+            <a:r>
+              <a:rPr lang="en-US" sz="2400" dirty="0" err="1">
+                <a:solidFill>
+                  <a:schemeClr val="bg1"/>
+                </a:solidFill>
+              </a:rPr>
+              <a:t>ncrdevdayssurvey</a:t>
+            </a:r>
+            <a:endParaRPr lang="en-US" sz="1400" dirty="0">
+              <a:solidFill>
+                <a:schemeClr val="bg1"/>
+              </a:solidFill>
+            </a:endParaRPr>
+          </a:p>
+        </p:txBody>
+      </p:sp>
+      <p:pic>
+        <p:nvPicPr>
+          <p:cNvPr id="6" name="Picture 5" descr="A close up of a sign&#10;&#10;Description automatically generated">
+            <a:extLst>
+              <a:ext uri="{FF2B5EF4-FFF2-40B4-BE49-F238E27FC236}">
+                <a16:creationId xmlns:a16="http://schemas.microsoft.com/office/drawing/2014/main" id="{4269E982-04B7-4C1B-8995-F8F6ACCA1FBF}"/>
+              </a:ext>
+            </a:extLst>
+          </p:cNvPr>
+          <p:cNvPicPr>
+            <a:picLocks noChangeAspect="1"/>
+          </p:cNvPicPr>
+          <p:nvPr/>
+        </p:nvPicPr>
+        <p:blipFill>
+          <a:blip r:embed="rId3">
+            <a:extLst>
+              <a:ext uri="{28A0092B-C50C-407E-A947-70E740481C1C}">
+                <a14:useLocalDpi xmlns:a14="http://schemas.microsoft.com/office/drawing/2010/main" val="0"/>
+              </a:ext>
+            </a:extLst>
+          </a:blip>
+          <a:stretch>
+            <a:fillRect/>
+          </a:stretch>
+        </p:blipFill>
+        <p:spPr>
+          <a:xfrm>
+            <a:off x="279563" y="5706662"/>
+            <a:ext cx="3142946" cy="817166"/>
+          </a:xfrm>
+          <a:prstGeom prst="rect">
+            <a:avLst/>
+          </a:prstGeom>
+        </p:spPr>
+      </p:pic>
+      <p:pic>
+        <p:nvPicPr>
+          <p:cNvPr id="8" name="Picture 7" descr="A picture containing clipart&#10;&#10;Description automatically generated">
+            <a:extLst>
+              <a:ext uri="{FF2B5EF4-FFF2-40B4-BE49-F238E27FC236}">
+                <a16:creationId xmlns:a16="http://schemas.microsoft.com/office/drawing/2014/main" id="{7B1CC001-C942-4E74-8259-AE0FC1412011}"/>
+              </a:ext>
+            </a:extLst>
+          </p:cNvPr>
+          <p:cNvPicPr>
+            <a:picLocks noChangeAspect="1"/>
+          </p:cNvPicPr>
+          <p:nvPr/>
+        </p:nvPicPr>
+        <p:blipFill>
+          <a:blip r:embed="rId4">
+            <a:extLst>
+              <a:ext uri="{28A0092B-C50C-407E-A947-70E740481C1C}">
+                <a14:useLocalDpi xmlns:a14="http://schemas.microsoft.com/office/drawing/2010/main" val="0"/>
+              </a:ext>
+            </a:extLst>
+          </a:blip>
+          <a:stretch>
+            <a:fillRect/>
+          </a:stretch>
+        </p:blipFill>
+        <p:spPr>
+          <a:xfrm>
+            <a:off x="1049589" y="4789000"/>
+            <a:ext cx="1872384" cy="895693"/>
+          </a:xfrm>
+          <a:prstGeom prst="rect">
+            <a:avLst/>
+          </a:prstGeom>
+        </p:spPr>
+      </p:pic>
     </p:spTree>
     <p:extLst>
       <p:ext uri="{BB962C8B-B14F-4D97-AF65-F5344CB8AC3E}">
-        <p14:creationId xmlns:p14="http://schemas.microsoft.com/office/powerpoint/2010/main" val="2837667611"/>
+        <p14:creationId xmlns:p14="http://schemas.microsoft.com/office/powerpoint/2010/main" val="653294868"/>
       </p:ext>
     </p:extLst>
   </p:cSld>
@@ -9440,14 +9961,14 @@
           </a:ln>
           <a:extLst>
             <a:ext uri="{909E8E84-426E-40dd-AFC4-6F175D3DCCD1}">
-              <a14:hiddenFill xmlns:a14="http://schemas.microsoft.com/office/drawing/2010/main" xmlns="">
+              <a14:hiddenFill xmlns="" xmlns:a14="http://schemas.microsoft.com/office/drawing/2010/main">
                 <a:solidFill>
                   <a:srgbClr val="FFFFFF"/>
                 </a:solidFill>
               </a14:hiddenFill>
             </a:ext>
             <a:ext uri="{91240B29-F687-4f45-9708-019B960494DF}">
-              <a14:hiddenLine xmlns:a14="http://schemas.microsoft.com/office/drawing/2010/main" xmlns="" w="9525">
+              <a14:hiddenLine xmlns="" xmlns:a14="http://schemas.microsoft.com/office/drawing/2010/main" w="9525">
                 <a:solidFill>
                   <a:srgbClr val="000000"/>
                 </a:solidFill>
@@ -16030,12 +16551,9 @@
 </file>
 
 <file path=customXml/item1.xml><?xml version="1.0" encoding="utf-8"?>
-<?mso-contentType ?>
-<FormTemplates xmlns="http://schemas.microsoft.com/sharepoint/v3/contenttype/forms">
-  <Display>DocumentLibraryForm</Display>
-  <Edit>DocumentLibraryForm</Edit>
-  <New>DocumentLibraryForm</New>
-</FormTemplates>
+<p:properties xmlns:p="http://schemas.microsoft.com/office/2006/metadata/properties" xmlns:xsi="http://www.w3.org/2001/XMLSchema-instance" xmlns:pc="http://schemas.microsoft.com/office/infopath/2007/PartnerControls">
+  <documentManagement/>
+</p:properties>
 </file>
 
 <file path=customXml/item2.xml><?xml version="1.0" encoding="utf-8"?>
@@ -16189,35 +16707,52 @@
 </file>
 
 <file path=customXml/item3.xml><?xml version="1.0" encoding="utf-8"?>
-<p:properties xmlns:p="http://schemas.microsoft.com/office/2006/metadata/properties" xmlns:xsi="http://www.w3.org/2001/XMLSchema-instance" xmlns:pc="http://schemas.microsoft.com/office/infopath/2007/PartnerControls">
-  <documentManagement/>
-</p:properties>
+<?mso-contentType ?>
+<FormTemplates xmlns="http://schemas.microsoft.com/sharepoint/v3/contenttype/forms">
+  <Display>DocumentLibraryForm</Display>
+  <Edit>DocumentLibraryForm</Edit>
+  <New>DocumentLibraryForm</New>
+</FormTemplates>
 </file>
 
 <file path=customXml/itemProps1.xml><?xml version="1.0" encoding="utf-8"?>
+<ds:datastoreItem xmlns:ds="http://schemas.openxmlformats.org/officeDocument/2006/customXml" ds:itemID="{18A72D78-ED71-4D78-B376-C7DF0E32C162}">
+  <ds:schemaRefs>
+    <ds:schemaRef ds:uri="http://schemas.openxmlformats.org/package/2006/metadata/core-properties"/>
+    <ds:schemaRef ds:uri="fac12304-a514-4bf9-8a9b-59948ddf2c1c"/>
+    <ds:schemaRef ds:uri="http://schemas.microsoft.com/office/2006/documentManagement/types"/>
+    <ds:schemaRef ds:uri="http://schemas.microsoft.com/office/infopath/2007/PartnerControls"/>
+    <ds:schemaRef ds:uri="http://purl.org/dc/elements/1.1/"/>
+    <ds:schemaRef ds:uri="http://schemas.microsoft.com/office/2006/metadata/properties"/>
+    <ds:schemaRef ds:uri="http://purl.org/dc/terms/"/>
+    <ds:schemaRef ds:uri="http://www.w3.org/XML/1998/namespace"/>
+    <ds:schemaRef ds:uri="http://purl.org/dc/dcmitype/"/>
+  </ds:schemaRefs>
+</ds:datastoreItem>
+</file>
+
+<file path=customXml/itemProps2.xml><?xml version="1.0" encoding="utf-8"?>
+<ds:datastoreItem xmlns:ds="http://schemas.openxmlformats.org/officeDocument/2006/customXml" ds:itemID="{36F30DA2-6CF5-4311-BFB1-F520FAE3B110}">
+  <ds:schemaRefs>
+    <ds:schemaRef ds:uri="http://schemas.microsoft.com/office/2006/metadata/contentType"/>
+    <ds:schemaRef ds:uri="http://schemas.microsoft.com/office/2006/metadata/properties/metaAttributes"/>
+    <ds:schemaRef ds:uri="http://www.w3.org/2001/XMLSchema"/>
+    <ds:schemaRef ds:uri="http://schemas.microsoft.com/office/2006/metadata/properties"/>
+    <ds:schemaRef ds:uri="fac12304-a514-4bf9-8a9b-59948ddf2c1c"/>
+    <ds:schemaRef ds:uri="http://schemas.microsoft.com/office/2006/documentManagement/types"/>
+    <ds:schemaRef ds:uri="http://schemas.microsoft.com/office/infopath/2007/PartnerControls"/>
+    <ds:schemaRef ds:uri="http://schemas.openxmlformats.org/package/2006/metadata/core-properties"/>
+    <ds:schemaRef ds:uri="http://purl.org/dc/elements/1.1/"/>
+    <ds:schemaRef ds:uri="http://purl.org/dc/terms/"/>
+    <ds:schemaRef ds:uri="http://schemas.microsoft.com/internal/obd"/>
+  </ds:schemaRefs>
+</ds:datastoreItem>
+</file>
+
+<file path=customXml/itemProps3.xml><?xml version="1.0" encoding="utf-8"?>
 <ds:datastoreItem xmlns:ds="http://schemas.openxmlformats.org/officeDocument/2006/customXml" ds:itemID="{C7ED26B3-1852-4382-93C0-9E66BE1A2289}">
   <ds:schemaRefs>
     <ds:schemaRef ds:uri="http://schemas.microsoft.com/sharepoint/v3/contenttype/forms"/>
   </ds:schemaRefs>
 </ds:datastoreItem>
-</file>
-
-<file path=customXml/itemProps2.xml><?xml version="1.0" encoding="utf-8"?>
-<ds:datastoreItem xmlns:ds="http://schemas.openxmlformats.org/officeDocument/2006/customXml" ds:itemID="{36F30DA2-6CF5-4311-BFB1-F520FAE3B110}"/>
-</file>
-
-<file path=customXml/itemProps3.xml><?xml version="1.0" encoding="utf-8"?>
-<ds:datastoreItem xmlns:ds="http://schemas.openxmlformats.org/officeDocument/2006/customXml" ds:itemID="{18A72D78-ED71-4D78-B376-C7DF0E32C162}">
-  <ds:schemaRefs>
-    <ds:schemaRef ds:uri="http://purl.org/dc/terms/"/>
-    <ds:schemaRef ds:uri="http://schemas.openxmlformats.org/package/2006/metadata/core-properties"/>
-    <ds:schemaRef ds:uri="http://schemas.microsoft.com/office/2006/documentManagement/types"/>
-    <ds:schemaRef ds:uri="http://schemas.microsoft.com/office/infopath/2007/PartnerControls"/>
-    <ds:schemaRef ds:uri="http://purl.org/dc/elements/1.1/"/>
-    <ds:schemaRef ds:uri="http://schemas.microsoft.com/office/2006/metadata/properties"/>
-    <ds:schemaRef ds:uri="ff8c65ce-69d1-46eb-849c-d3e0ac4e55d7"/>
-    <ds:schemaRef ds:uri="http://www.w3.org/XML/1998/namespace"/>
-    <ds:schemaRef ds:uri="http://purl.org/dc/dcmitype/"/>
-  </ds:schemaRefs>
-</ds:datastoreItem>
 </file>
</xml_diff>

<commit_message>
deleted the solution from the design session deck
</commit_message>
<xml_diff>
--- a/DesignSession/Azure DevDay – Whiteboard Design Session.pptx
+++ b/DesignSession/Azure DevDay – Whiteboard Design Session.pptx
@@ -6,7 +6,7 @@
     <p:sldMasterId id="2147483660" r:id="rId5"/>
   </p:sldMasterIdLst>
   <p:notesMasterIdLst>
-    <p:notesMasterId r:id="rId19"/>
+    <p:notesMasterId r:id="rId16"/>
   </p:notesMasterIdLst>
   <p:sldIdLst>
     <p:sldId id="1860" r:id="rId6"/>
@@ -19,9 +19,6 @@
     <p:sldId id="265" r:id="rId13"/>
     <p:sldId id="263" r:id="rId14"/>
     <p:sldId id="1573" r:id="rId15"/>
-    <p:sldId id="1574" r:id="rId16"/>
-    <p:sldId id="398" r:id="rId17"/>
-    <p:sldId id="266" r:id="rId18"/>
   </p:sldIdLst>
   <p:sldSz cx="12192000" cy="6858000"/>
   <p:notesSz cx="6858000" cy="9144000"/>
@@ -607,7 +604,7 @@
           <a:p>
             <a:fld id="{386CE63F-9E7F-4C04-9D0D-FCA25A8E9E86}" type="datetime8">
               <a:rPr lang="en-US" smtClean="0"/>
-              <a:t>12/5/2018 10:36 AM</a:t>
+              <a:t>12/5/2018 1:58 PM</a:t>
             </a:fld>
             <a:endParaRPr lang="en-US"/>
           </a:p>
@@ -871,7 +868,7 @@
                 <a:tabLst/>
                 <a:defRPr/>
               </a:pPr>
-              <a:t>12/5/2018 10:36 AM</a:t>
+              <a:t>12/5/2018 1:58 PM</a:t>
             </a:fld>
             <a:endParaRPr kumimoji="0" lang="en-US" sz="1200" b="0" i="0" u="none" strike="noStrike" kern="1200" cap="none" spc="0" normalizeH="0" baseline="0" noProof="0" dirty="0">
               <a:ln>
@@ -1061,681 +1058,6 @@
     <p:extLst>
       <p:ext uri="{BB962C8B-B14F-4D97-AF65-F5344CB8AC3E}">
         <p14:creationId xmlns:p14="http://schemas.microsoft.com/office/powerpoint/2010/main" val="1741128738"/>
-      </p:ext>
-    </p:extLst>
-  </p:cSld>
-  <p:clrMapOvr>
-    <a:masterClrMapping/>
-  </p:clrMapOvr>
-</p:notes>
-</file>
-
-<file path=ppt/notesSlides/notesSlide4.xml><?xml version="1.0" encoding="utf-8"?>
-<p:notes xmlns:a="http://schemas.openxmlformats.org/drawingml/2006/main" xmlns:r="http://schemas.openxmlformats.org/officeDocument/2006/relationships" xmlns:p="http://schemas.openxmlformats.org/presentationml/2006/main">
-  <p:cSld>
-    <p:spTree>
-      <p:nvGrpSpPr>
-        <p:cNvPr id="1" name=""/>
-        <p:cNvGrpSpPr/>
-        <p:nvPr/>
-      </p:nvGrpSpPr>
-      <p:grpSpPr>
-        <a:xfrm>
-          <a:off x="0" y="0"/>
-          <a:ext cx="0" cy="0"/>
-          <a:chOff x="0" y="0"/>
-          <a:chExt cx="0" cy="0"/>
-        </a:xfrm>
-      </p:grpSpPr>
-      <p:sp>
-        <p:nvSpPr>
-          <p:cNvPr id="41985" name="Slide Image Placeholder 1"/>
-          <p:cNvSpPr>
-            <a:spLocks noGrp="1" noRot="1" noChangeAspect="1"/>
-          </p:cNvSpPr>
-          <p:nvPr>
-            <p:ph type="sldImg"/>
-          </p:nvPr>
-        </p:nvSpPr>
-        <p:spPr bwMode="auto">
-          <a:noFill/>
-          <a:ln>
-            <a:solidFill>
-              <a:srgbClr val="000000"/>
-            </a:solidFill>
-            <a:miter lim="800000"/>
-            <a:headEnd/>
-            <a:tailEnd/>
-          </a:ln>
-          <a:extLst>
-            <a:ext uri="{909E8E84-426E-40dd-AFC4-6F175D3DCCD1}">
-              <a14:hiddenFill xmlns="" xmlns:a14="http://schemas.microsoft.com/office/drawing/2010/main">
-                <a:solidFill>
-                  <a:srgbClr val="FFFFFF"/>
-                </a:solidFill>
-              </a14:hiddenFill>
-            </a:ext>
-            <a:ext uri="{FAA26D3D-D897-4be2-8F04-BA451C77F1D7}">
-              <ma14:placeholderFlag xmlns="" xmlns:ma14="http://schemas.microsoft.com/office/mac/drawingml/2011/main" val="1"/>
-            </a:ext>
-          </a:extLst>
-        </p:spPr>
-      </p:sp>
-      <p:sp>
-        <p:nvSpPr>
-          <p:cNvPr id="3" name="Notes Placeholder 2"/>
-          <p:cNvSpPr>
-            <a:spLocks noGrp="1"/>
-          </p:cNvSpPr>
-          <p:nvPr>
-            <p:ph type="body" idx="1"/>
-          </p:nvPr>
-        </p:nvSpPr>
-        <p:spPr/>
-        <p:txBody>
-          <a:bodyPr/>
-          <a:lstStyle/>
-          <a:p>
-            <a:endParaRPr lang="en-US" sz="1400" baseline="0"/>
-          </a:p>
-        </p:txBody>
-      </p:sp>
-      <p:sp>
-        <p:nvSpPr>
-          <p:cNvPr id="4" name="Header Placeholder 3"/>
-          <p:cNvSpPr>
-            <a:spLocks noGrp="1"/>
-          </p:cNvSpPr>
-          <p:nvPr>
-            <p:ph type="hdr" sz="quarter"/>
-          </p:nvPr>
-        </p:nvSpPr>
-        <p:spPr/>
-        <p:txBody>
-          <a:bodyPr/>
-          <a:lstStyle/>
-          <a:p>
-            <a:pPr marL="0" marR="0" lvl="0" indent="0" algn="l" defTabSz="932425" rtl="0" eaLnBrk="1" fontAlgn="auto" latinLnBrk="0" hangingPunct="1">
-              <a:lnSpc>
-                <a:spcPct val="100000"/>
-              </a:lnSpc>
-              <a:spcBef>
-                <a:spcPts val="0"/>
-              </a:spcBef>
-              <a:spcAft>
-                <a:spcPts val="0"/>
-              </a:spcAft>
-              <a:buClrTx/>
-              <a:buSzTx/>
-              <a:buFontTx/>
-              <a:buNone/>
-              <a:tabLst/>
-              <a:defRPr/>
-            </a:pPr>
-            <a:endParaRPr kumimoji="0" lang="en-US" sz="1200" b="0" i="0" u="none" strike="noStrike" kern="1200" cap="none" spc="0" normalizeH="0" baseline="0" noProof="0">
-              <a:ln>
-                <a:noFill/>
-              </a:ln>
-              <a:solidFill>
-                <a:prstClr val="black"/>
-              </a:solidFill>
-              <a:effectLst/>
-              <a:uLnTx/>
-              <a:uFillTx/>
-              <a:latin typeface="Calibri" panose="020F0502020204030204"/>
-              <a:ea typeface="+mn-ea"/>
-              <a:cs typeface="+mn-cs"/>
-            </a:endParaRPr>
-          </a:p>
-        </p:txBody>
-      </p:sp>
-      <p:sp>
-        <p:nvSpPr>
-          <p:cNvPr id="5" name="Footer Placeholder 4"/>
-          <p:cNvSpPr>
-            <a:spLocks noGrp="1"/>
-          </p:cNvSpPr>
-          <p:nvPr>
-            <p:ph type="ftr" sz="quarter" idx="4"/>
-          </p:nvPr>
-        </p:nvSpPr>
-        <p:spPr/>
-        <p:txBody>
-          <a:bodyPr/>
-          <a:lstStyle/>
-          <a:p>
-            <a:pPr marL="0" marR="0" lvl="0" indent="0" algn="l" defTabSz="931093" rtl="0" eaLnBrk="0" fontAlgn="auto" latinLnBrk="0" hangingPunct="0">
-              <a:lnSpc>
-                <a:spcPct val="100000"/>
-              </a:lnSpc>
-              <a:spcBef>
-                <a:spcPts val="0"/>
-              </a:spcBef>
-              <a:spcAft>
-                <a:spcPts val="0"/>
-              </a:spcAft>
-              <a:buClrTx/>
-              <a:buSzTx/>
-              <a:buFontTx/>
-              <a:buNone/>
-              <a:tabLst/>
-              <a:defRPr/>
-            </a:pPr>
-            <a:r>
-              <a:rPr kumimoji="0" lang="en-US" sz="400" b="0" i="0" u="none" strike="noStrike" kern="1200" cap="none" spc="0" normalizeH="0" baseline="0" noProof="0">
-                <a:ln>
-                  <a:noFill/>
-                </a:ln>
-                <a:gradFill>
-                  <a:gsLst>
-                    <a:gs pos="0">
-                      <a:prstClr val="black"/>
-                    </a:gs>
-                    <a:gs pos="100000">
-                      <a:prstClr val="black"/>
-                    </a:gs>
-                  </a:gsLst>
-                  <a:lin ang="5400000" scaled="0"/>
-                </a:gradFill>
-                <a:effectLst/>
-                <a:uLnTx/>
-                <a:uFillTx/>
-                <a:latin typeface="Segoe UI" pitchFamily="34" charset="0"/>
-                <a:ea typeface="Segoe UI" pitchFamily="34" charset="0"/>
-                <a:cs typeface="Segoe UI" pitchFamily="34" charset="0"/>
-              </a:rPr>
-              <a:t>© 2014 Microsoft Corporation. All rights reserved. Microsoft, Windows, and other product names are or may be registered trademarks and/or trademarks in the U.S. and/or other countries. The information herein is for informational purposes only and represents the current view of Microsoft Corporation as of the date of this presentation.  Because Microsoft must respond to changing market conditions, it should not be interpreted to be a commitment on the part of Microsoft, and Microsoft cannot guarantee the accuracy of any information provided after the date of this presentation.  MICROSOFT MAKES NO WARRANTIES, EXPRESS, IMPLIED OR STATUTORY, AS TO THE INFORMATION IN THIS PRESENTATION.</a:t>
-            </a:r>
-          </a:p>
-        </p:txBody>
-      </p:sp>
-      <p:sp>
-        <p:nvSpPr>
-          <p:cNvPr id="6" name="Date Placeholder 5"/>
-          <p:cNvSpPr>
-            <a:spLocks noGrp="1"/>
-          </p:cNvSpPr>
-          <p:nvPr>
-            <p:ph type="dt" sz="quarter" idx="1"/>
-          </p:nvPr>
-        </p:nvSpPr>
-        <p:spPr/>
-        <p:txBody>
-          <a:bodyPr/>
-          <a:lstStyle>
-            <a:lvl1pPr eaLnBrk="0" hangingPunct="0">
-              <a:defRPr sz="2400">
-                <a:solidFill>
-                  <a:schemeClr val="tx1"/>
-                </a:solidFill>
-                <a:latin typeface="Segoe UI" charset="0"/>
-                <a:ea typeface="ＭＳ Ｐゴシック" charset="0"/>
-                <a:cs typeface="MS PGothic" charset="0"/>
-              </a:defRPr>
-            </a:lvl1pPr>
-            <a:lvl2pPr marL="742950" indent="-285750" eaLnBrk="0" hangingPunct="0">
-              <a:defRPr sz="2400">
-                <a:solidFill>
-                  <a:schemeClr val="tx1"/>
-                </a:solidFill>
-                <a:latin typeface="Segoe UI" charset="0"/>
-                <a:ea typeface="MS PGothic" charset="0"/>
-                <a:cs typeface="MS PGothic" charset="0"/>
-              </a:defRPr>
-            </a:lvl2pPr>
-            <a:lvl3pPr marL="1143000" indent="-228600" eaLnBrk="0" hangingPunct="0">
-              <a:defRPr sz="2400">
-                <a:solidFill>
-                  <a:schemeClr val="tx1"/>
-                </a:solidFill>
-                <a:latin typeface="Segoe UI" charset="0"/>
-                <a:ea typeface="MS PGothic" charset="0"/>
-                <a:cs typeface="MS PGothic" charset="0"/>
-              </a:defRPr>
-            </a:lvl3pPr>
-            <a:lvl4pPr marL="1600200" indent="-228600" eaLnBrk="0" hangingPunct="0">
-              <a:defRPr sz="2400">
-                <a:solidFill>
-                  <a:schemeClr val="tx1"/>
-                </a:solidFill>
-                <a:latin typeface="Segoe UI" charset="0"/>
-                <a:ea typeface="MS PGothic" charset="0"/>
-                <a:cs typeface="MS PGothic" charset="0"/>
-              </a:defRPr>
-            </a:lvl4pPr>
-            <a:lvl5pPr marL="2057400" indent="-228600" eaLnBrk="0" hangingPunct="0">
-              <a:defRPr sz="2400">
-                <a:solidFill>
-                  <a:schemeClr val="tx1"/>
-                </a:solidFill>
-                <a:latin typeface="Segoe UI" charset="0"/>
-                <a:ea typeface="MS PGothic" charset="0"/>
-                <a:cs typeface="MS PGothic" charset="0"/>
-              </a:defRPr>
-            </a:lvl5pPr>
-            <a:lvl6pPr marL="2514600" indent="-228600" defTabSz="931863" eaLnBrk="0" fontAlgn="base" hangingPunct="0">
-              <a:spcBef>
-                <a:spcPct val="0"/>
-              </a:spcBef>
-              <a:spcAft>
-                <a:spcPct val="0"/>
-              </a:spcAft>
-              <a:defRPr sz="2400">
-                <a:solidFill>
-                  <a:schemeClr val="tx1"/>
-                </a:solidFill>
-                <a:latin typeface="Segoe UI" charset="0"/>
-                <a:ea typeface="MS PGothic" charset="0"/>
-                <a:cs typeface="MS PGothic" charset="0"/>
-              </a:defRPr>
-            </a:lvl6pPr>
-            <a:lvl7pPr marL="2971800" indent="-228600" defTabSz="931863" eaLnBrk="0" fontAlgn="base" hangingPunct="0">
-              <a:spcBef>
-                <a:spcPct val="0"/>
-              </a:spcBef>
-              <a:spcAft>
-                <a:spcPct val="0"/>
-              </a:spcAft>
-              <a:defRPr sz="2400">
-                <a:solidFill>
-                  <a:schemeClr val="tx1"/>
-                </a:solidFill>
-                <a:latin typeface="Segoe UI" charset="0"/>
-                <a:ea typeface="MS PGothic" charset="0"/>
-                <a:cs typeface="MS PGothic" charset="0"/>
-              </a:defRPr>
-            </a:lvl7pPr>
-            <a:lvl8pPr marL="3429000" indent="-228600" defTabSz="931863" eaLnBrk="0" fontAlgn="base" hangingPunct="0">
-              <a:spcBef>
-                <a:spcPct val="0"/>
-              </a:spcBef>
-              <a:spcAft>
-                <a:spcPct val="0"/>
-              </a:spcAft>
-              <a:defRPr sz="2400">
-                <a:solidFill>
-                  <a:schemeClr val="tx1"/>
-                </a:solidFill>
-                <a:latin typeface="Segoe UI" charset="0"/>
-                <a:ea typeface="MS PGothic" charset="0"/>
-                <a:cs typeface="MS PGothic" charset="0"/>
-              </a:defRPr>
-            </a:lvl8pPr>
-            <a:lvl9pPr marL="3886200" indent="-228600" defTabSz="931863" eaLnBrk="0" fontAlgn="base" hangingPunct="0">
-              <a:spcBef>
-                <a:spcPct val="0"/>
-              </a:spcBef>
-              <a:spcAft>
-                <a:spcPct val="0"/>
-              </a:spcAft>
-              <a:defRPr sz="2400">
-                <a:solidFill>
-                  <a:schemeClr val="tx1"/>
-                </a:solidFill>
-                <a:latin typeface="Segoe UI" charset="0"/>
-                <a:ea typeface="MS PGothic" charset="0"/>
-                <a:cs typeface="MS PGothic" charset="0"/>
-              </a:defRPr>
-            </a:lvl9pPr>
-          </a:lstStyle>
-          <a:p>
-            <a:pPr marL="0" marR="0" lvl="0" indent="0" algn="r" defTabSz="932425" rtl="0" eaLnBrk="1" fontAlgn="auto" latinLnBrk="0" hangingPunct="1">
-              <a:lnSpc>
-                <a:spcPct val="100000"/>
-              </a:lnSpc>
-              <a:spcBef>
-                <a:spcPts val="0"/>
-              </a:spcBef>
-              <a:spcAft>
-                <a:spcPts val="0"/>
-              </a:spcAft>
-              <a:buClrTx/>
-              <a:buSzTx/>
-              <a:buFontTx/>
-              <a:buNone/>
-              <a:tabLst/>
-              <a:defRPr/>
-            </a:pPr>
-            <a:fld id="{F7733D6C-4BFC-AD4C-B77E-9F18E9698CDB}" type="datetime1">
-              <a:rPr kumimoji="0" lang="en-US" sz="1200" b="0" i="0" u="none" strike="noStrike" kern="1200" cap="none" spc="0" normalizeH="0" baseline="0" noProof="0">
-                <a:ln>
-                  <a:noFill/>
-                </a:ln>
-                <a:solidFill>
-                  <a:prstClr val="black"/>
-                </a:solidFill>
-                <a:effectLst/>
-                <a:uLnTx/>
-                <a:uFillTx/>
-                <a:latin typeface="Calibri" charset="0"/>
-                <a:ea typeface="ＭＳ Ｐゴシック" charset="0"/>
-              </a:rPr>
-              <a:pPr marL="0" marR="0" lvl="0" indent="0" algn="r" defTabSz="932425" rtl="0" eaLnBrk="1" fontAlgn="auto" latinLnBrk="0" hangingPunct="1">
-                <a:lnSpc>
-                  <a:spcPct val="100000"/>
-                </a:lnSpc>
-                <a:spcBef>
-                  <a:spcPts val="0"/>
-                </a:spcBef>
-                <a:spcAft>
-                  <a:spcPts val="0"/>
-                </a:spcAft>
-                <a:buClrTx/>
-                <a:buSzTx/>
-                <a:buFontTx/>
-                <a:buNone/>
-                <a:tabLst/>
-                <a:defRPr/>
-              </a:pPr>
-              <a:t>12/5/2018</a:t>
-            </a:fld>
-            <a:endParaRPr kumimoji="0" lang="en-US" sz="1200" b="0" i="0" u="none" strike="noStrike" kern="1200" cap="none" spc="0" normalizeH="0" baseline="0" noProof="0">
-              <a:ln>
-                <a:noFill/>
-              </a:ln>
-              <a:solidFill>
-                <a:prstClr val="black"/>
-              </a:solidFill>
-              <a:effectLst/>
-              <a:uLnTx/>
-              <a:uFillTx/>
-              <a:latin typeface="Calibri" charset="0"/>
-              <a:ea typeface="ＭＳ Ｐゴシック" charset="0"/>
-            </a:endParaRPr>
-          </a:p>
-        </p:txBody>
-      </p:sp>
-      <p:sp>
-        <p:nvSpPr>
-          <p:cNvPr id="7" name="Slide Number Placeholder 6"/>
-          <p:cNvSpPr>
-            <a:spLocks noGrp="1"/>
-          </p:cNvSpPr>
-          <p:nvPr>
-            <p:ph type="sldNum" sz="quarter" idx="5"/>
-          </p:nvPr>
-        </p:nvSpPr>
-        <p:spPr/>
-        <p:txBody>
-          <a:bodyPr/>
-          <a:lstStyle>
-            <a:lvl1pPr eaLnBrk="0" hangingPunct="0">
-              <a:defRPr sz="2400">
-                <a:solidFill>
-                  <a:schemeClr val="tx1"/>
-                </a:solidFill>
-                <a:latin typeface="Segoe UI" charset="0"/>
-                <a:ea typeface="ＭＳ Ｐゴシック" charset="0"/>
-                <a:cs typeface="MS PGothic" charset="0"/>
-              </a:defRPr>
-            </a:lvl1pPr>
-            <a:lvl2pPr marL="742950" indent="-285750" eaLnBrk="0" hangingPunct="0">
-              <a:defRPr sz="2400">
-                <a:solidFill>
-                  <a:schemeClr val="tx1"/>
-                </a:solidFill>
-                <a:latin typeface="Segoe UI" charset="0"/>
-                <a:ea typeface="MS PGothic" charset="0"/>
-                <a:cs typeface="MS PGothic" charset="0"/>
-              </a:defRPr>
-            </a:lvl2pPr>
-            <a:lvl3pPr marL="1143000" indent="-228600" eaLnBrk="0" hangingPunct="0">
-              <a:defRPr sz="2400">
-                <a:solidFill>
-                  <a:schemeClr val="tx1"/>
-                </a:solidFill>
-                <a:latin typeface="Segoe UI" charset="0"/>
-                <a:ea typeface="MS PGothic" charset="0"/>
-                <a:cs typeface="MS PGothic" charset="0"/>
-              </a:defRPr>
-            </a:lvl3pPr>
-            <a:lvl4pPr marL="1600200" indent="-228600" eaLnBrk="0" hangingPunct="0">
-              <a:defRPr sz="2400">
-                <a:solidFill>
-                  <a:schemeClr val="tx1"/>
-                </a:solidFill>
-                <a:latin typeface="Segoe UI" charset="0"/>
-                <a:ea typeface="MS PGothic" charset="0"/>
-                <a:cs typeface="MS PGothic" charset="0"/>
-              </a:defRPr>
-            </a:lvl4pPr>
-            <a:lvl5pPr marL="2057400" indent="-228600" eaLnBrk="0" hangingPunct="0">
-              <a:defRPr sz="2400">
-                <a:solidFill>
-                  <a:schemeClr val="tx1"/>
-                </a:solidFill>
-                <a:latin typeface="Segoe UI" charset="0"/>
-                <a:ea typeface="MS PGothic" charset="0"/>
-                <a:cs typeface="MS PGothic" charset="0"/>
-              </a:defRPr>
-            </a:lvl5pPr>
-            <a:lvl6pPr marL="2514600" indent="-228600" defTabSz="931863" eaLnBrk="0" fontAlgn="base" hangingPunct="0">
-              <a:spcBef>
-                <a:spcPct val="0"/>
-              </a:spcBef>
-              <a:spcAft>
-                <a:spcPct val="0"/>
-              </a:spcAft>
-              <a:defRPr sz="2400">
-                <a:solidFill>
-                  <a:schemeClr val="tx1"/>
-                </a:solidFill>
-                <a:latin typeface="Segoe UI" charset="0"/>
-                <a:ea typeface="MS PGothic" charset="0"/>
-                <a:cs typeface="MS PGothic" charset="0"/>
-              </a:defRPr>
-            </a:lvl6pPr>
-            <a:lvl7pPr marL="2971800" indent="-228600" defTabSz="931863" eaLnBrk="0" fontAlgn="base" hangingPunct="0">
-              <a:spcBef>
-                <a:spcPct val="0"/>
-              </a:spcBef>
-              <a:spcAft>
-                <a:spcPct val="0"/>
-              </a:spcAft>
-              <a:defRPr sz="2400">
-                <a:solidFill>
-                  <a:schemeClr val="tx1"/>
-                </a:solidFill>
-                <a:latin typeface="Segoe UI" charset="0"/>
-                <a:ea typeface="MS PGothic" charset="0"/>
-                <a:cs typeface="MS PGothic" charset="0"/>
-              </a:defRPr>
-            </a:lvl7pPr>
-            <a:lvl8pPr marL="3429000" indent="-228600" defTabSz="931863" eaLnBrk="0" fontAlgn="base" hangingPunct="0">
-              <a:spcBef>
-                <a:spcPct val="0"/>
-              </a:spcBef>
-              <a:spcAft>
-                <a:spcPct val="0"/>
-              </a:spcAft>
-              <a:defRPr sz="2400">
-                <a:solidFill>
-                  <a:schemeClr val="tx1"/>
-                </a:solidFill>
-                <a:latin typeface="Segoe UI" charset="0"/>
-                <a:ea typeface="MS PGothic" charset="0"/>
-                <a:cs typeface="MS PGothic" charset="0"/>
-              </a:defRPr>
-            </a:lvl8pPr>
-            <a:lvl9pPr marL="3886200" indent="-228600" defTabSz="931863" eaLnBrk="0" fontAlgn="base" hangingPunct="0">
-              <a:spcBef>
-                <a:spcPct val="0"/>
-              </a:spcBef>
-              <a:spcAft>
-                <a:spcPct val="0"/>
-              </a:spcAft>
-              <a:defRPr sz="2400">
-                <a:solidFill>
-                  <a:schemeClr val="tx1"/>
-                </a:solidFill>
-                <a:latin typeface="Segoe UI" charset="0"/>
-                <a:ea typeface="MS PGothic" charset="0"/>
-                <a:cs typeface="MS PGothic" charset="0"/>
-              </a:defRPr>
-            </a:lvl9pPr>
-          </a:lstStyle>
-          <a:p>
-            <a:pPr marL="0" marR="0" lvl="0" indent="0" algn="r" defTabSz="932425" rtl="0" eaLnBrk="1" fontAlgn="auto" latinLnBrk="0" hangingPunct="1">
-              <a:lnSpc>
-                <a:spcPct val="100000"/>
-              </a:lnSpc>
-              <a:spcBef>
-                <a:spcPts val="0"/>
-              </a:spcBef>
-              <a:spcAft>
-                <a:spcPts val="0"/>
-              </a:spcAft>
-              <a:buClrTx/>
-              <a:buSzTx/>
-              <a:buFontTx/>
-              <a:buNone/>
-              <a:tabLst/>
-              <a:defRPr/>
-            </a:pPr>
-            <a:fld id="{56730852-60DF-A64A-BAD3-05EA9A4B1A18}" type="slidenum">
-              <a:rPr kumimoji="0" lang="en-US" sz="1200" b="0" i="0" u="none" strike="noStrike" kern="1200" cap="none" spc="0" normalizeH="0" baseline="0" noProof="0">
-                <a:ln>
-                  <a:noFill/>
-                </a:ln>
-                <a:solidFill>
-                  <a:prstClr val="black"/>
-                </a:solidFill>
-                <a:effectLst/>
-                <a:uLnTx/>
-                <a:uFillTx/>
-                <a:latin typeface="Calibri" charset="0"/>
-                <a:ea typeface="ＭＳ Ｐゴシック" charset="0"/>
-              </a:rPr>
-              <a:pPr marL="0" marR="0" lvl="0" indent="0" algn="r" defTabSz="932425" rtl="0" eaLnBrk="1" fontAlgn="auto" latinLnBrk="0" hangingPunct="1">
-                <a:lnSpc>
-                  <a:spcPct val="100000"/>
-                </a:lnSpc>
-                <a:spcBef>
-                  <a:spcPts val="0"/>
-                </a:spcBef>
-                <a:spcAft>
-                  <a:spcPts val="0"/>
-                </a:spcAft>
-                <a:buClrTx/>
-                <a:buSzTx/>
-                <a:buFontTx/>
-                <a:buNone/>
-                <a:tabLst/>
-                <a:defRPr/>
-              </a:pPr>
-              <a:t>12</a:t>
-            </a:fld>
-            <a:endParaRPr kumimoji="0" lang="en-US" sz="1200" b="0" i="0" u="none" strike="noStrike" kern="1200" cap="none" spc="0" normalizeH="0" baseline="0" noProof="0">
-              <a:ln>
-                <a:noFill/>
-              </a:ln>
-              <a:solidFill>
-                <a:prstClr val="black"/>
-              </a:solidFill>
-              <a:effectLst/>
-              <a:uLnTx/>
-              <a:uFillTx/>
-              <a:latin typeface="Calibri" charset="0"/>
-              <a:ea typeface="ＭＳ Ｐゴシック" charset="0"/>
-            </a:endParaRPr>
-          </a:p>
-        </p:txBody>
-      </p:sp>
-    </p:spTree>
-    <p:extLst>
-      <p:ext uri="{BB962C8B-B14F-4D97-AF65-F5344CB8AC3E}">
-        <p14:creationId xmlns:p14="http://schemas.microsoft.com/office/powerpoint/2010/main" val="3064093793"/>
-      </p:ext>
-    </p:extLst>
-  </p:cSld>
-  <p:clrMapOvr>
-    <a:masterClrMapping/>
-  </p:clrMapOvr>
-</p:notes>
-</file>
-
-<file path=ppt/notesSlides/notesSlide5.xml><?xml version="1.0" encoding="utf-8"?>
-<p:notes xmlns:a="http://schemas.openxmlformats.org/drawingml/2006/main" xmlns:r="http://schemas.openxmlformats.org/officeDocument/2006/relationships" xmlns:p="http://schemas.openxmlformats.org/presentationml/2006/main">
-  <p:cSld>
-    <p:spTree>
-      <p:nvGrpSpPr>
-        <p:cNvPr id="1" name=""/>
-        <p:cNvGrpSpPr/>
-        <p:nvPr/>
-      </p:nvGrpSpPr>
-      <p:grpSpPr>
-        <a:xfrm>
-          <a:off x="0" y="0"/>
-          <a:ext cx="0" cy="0"/>
-          <a:chOff x="0" y="0"/>
-          <a:chExt cx="0" cy="0"/>
-        </a:xfrm>
-      </p:grpSpPr>
-      <p:sp>
-        <p:nvSpPr>
-          <p:cNvPr id="2" name="Slide Image Placeholder 1"/>
-          <p:cNvSpPr>
-            <a:spLocks noGrp="1" noRot="1" noChangeAspect="1"/>
-          </p:cNvSpPr>
-          <p:nvPr>
-            <p:ph type="sldImg"/>
-          </p:nvPr>
-        </p:nvSpPr>
-        <p:spPr/>
-      </p:sp>
-      <p:sp>
-        <p:nvSpPr>
-          <p:cNvPr id="3" name="Notes Placeholder 2"/>
-          <p:cNvSpPr>
-            <a:spLocks noGrp="1"/>
-          </p:cNvSpPr>
-          <p:nvPr>
-            <p:ph type="body" idx="1"/>
-          </p:nvPr>
-        </p:nvSpPr>
-        <p:spPr/>
-        <p:txBody>
-          <a:bodyPr/>
-          <a:lstStyle/>
-          <a:p>
-            <a:r>
-              <a:rPr lang="en-US"/>
-              <a:t>http://draw</a:t>
-            </a:r>
-            <a:r>
-              <a:rPr lang="en-US" dirty="0"/>
-              <a:t>.io</a:t>
-            </a:r>
-          </a:p>
-        </p:txBody>
-      </p:sp>
-      <p:sp>
-        <p:nvSpPr>
-          <p:cNvPr id="4" name="Slide Number Placeholder 3"/>
-          <p:cNvSpPr>
-            <a:spLocks noGrp="1"/>
-          </p:cNvSpPr>
-          <p:nvPr>
-            <p:ph type="sldNum" sz="quarter" idx="5"/>
-          </p:nvPr>
-        </p:nvSpPr>
-        <p:spPr/>
-        <p:txBody>
-          <a:bodyPr/>
-          <a:lstStyle/>
-          <a:p>
-            <a:fld id="{048B2CCB-0717-404A-9DED-C7E88593F555}" type="slidenum">
-              <a:rPr lang="en-US" smtClean="0"/>
-              <a:t>13</a:t>
-            </a:fld>
-            <a:endParaRPr lang="en-US"/>
-          </a:p>
-        </p:txBody>
-      </p:sp>
-    </p:spTree>
-    <p:extLst>
-      <p:ext uri="{BB962C8B-B14F-4D97-AF65-F5344CB8AC3E}">
-        <p14:creationId xmlns:p14="http://schemas.microsoft.com/office/powerpoint/2010/main" val="581066963"/>
       </p:ext>
     </p:extLst>
   </p:cSld>
@@ -5650,7 +4972,12 @@
 
 <file path=ppt/slideLayouts/slideLayout29.xml><?xml version="1.0" encoding="utf-8"?>
 <p:sldLayout xmlns:a="http://schemas.openxmlformats.org/drawingml/2006/main" xmlns:r="http://schemas.openxmlformats.org/officeDocument/2006/relationships" xmlns:p="http://schemas.openxmlformats.org/presentationml/2006/main" userDrawn="1">
-  <p:cSld name="8_Title Slide Solid">
+  <p:cSld name="Walk-in">
+    <p:bg>
+      <p:bgRef idx="1001">
+        <a:schemeClr val="bg2"/>
+      </p:bgRef>
+    </p:bg>
     <p:spTree>
       <p:nvGrpSpPr>
         <p:cNvPr id="1" name=""/>
@@ -5667,27 +4994,28 @@
       </p:grpSpPr>
       <p:pic>
         <p:nvPicPr>
-          <p:cNvPr id="15" name="Picture 14"/>
+          <p:cNvPr id="4" name="Picture 3" descr="A sky view looking up at the camera&#10;&#10;Description generated with high confidence">
+            <a:extLst>
+              <a:ext uri="{FF2B5EF4-FFF2-40B4-BE49-F238E27FC236}">
+                <a16:creationId xmlns:a16="http://schemas.microsoft.com/office/drawing/2014/main" id="{E0143243-EBF8-42DF-AFA8-808B9A70F959}"/>
+              </a:ext>
+            </a:extLst>
+          </p:cNvPr>
           <p:cNvPicPr>
             <a:picLocks noChangeAspect="1"/>
           </p:cNvPicPr>
           <p:nvPr userDrawn="1"/>
         </p:nvPicPr>
-        <p:blipFill rotWithShape="1">
-          <a:blip r:embed="rId2" cstate="screen">
-            <a:extLst>
-              <a:ext uri="{28A0092B-C50C-407E-A947-70E740481C1C}">
-                <a14:useLocalDpi xmlns:a14="http://schemas.microsoft.com/office/drawing/2010/main" val="0"/>
-              </a:ext>
-            </a:extLst>
-          </a:blip>
-          <a:srcRect/>
-          <a:stretch/>
+        <p:blipFill>
+          <a:blip r:embed="rId2"/>
+          <a:stretch>
+            <a:fillRect/>
+          </a:stretch>
         </p:blipFill>
         <p:spPr>
           <a:xfrm>
-            <a:off x="0" y="0"/>
-            <a:ext cx="12192000" cy="6858000"/>
+            <a:off x="0" y="338"/>
+            <a:ext cx="12192000" cy="6857323"/>
           </a:xfrm>
           <a:prstGeom prst="rect">
             <a:avLst/>
@@ -5696,285 +5024,160 @@
       </p:pic>
       <p:sp>
         <p:nvSpPr>
-          <p:cNvPr id="6" name="Rectangle 5"/>
+          <p:cNvPr id="54" name="Rectangle 53">
+            <a:extLst>
+              <a:ext uri="{FF2B5EF4-FFF2-40B4-BE49-F238E27FC236}">
+                <a16:creationId xmlns:a16="http://schemas.microsoft.com/office/drawing/2014/main" id="{4899085C-4B16-41A5-A2CB-5D4798A0322E}"/>
+              </a:ext>
+            </a:extLst>
+          </p:cNvPr>
           <p:cNvSpPr/>
           <p:nvPr userDrawn="1"/>
         </p:nvSpPr>
-        <p:spPr bwMode="auto">
+        <p:spPr bwMode="white">
           <a:xfrm>
-            <a:off x="269239" y="291073"/>
-            <a:ext cx="6276530" cy="6278977"/>
+            <a:off x="10092825" y="4781344"/>
+            <a:ext cx="2321486" cy="1405513"/>
           </a:xfrm>
           <a:prstGeom prst="rect">
             <a:avLst/>
           </a:prstGeom>
-          <a:solidFill>
-            <a:srgbClr val="00BCF2">
-              <a:alpha val="90000"/>
-            </a:srgbClr>
-          </a:solidFill>
-          <a:ln>
-            <a:noFill/>
-            <a:headEnd type="none" w="med" len="med"/>
-            <a:tailEnd type="none" w="med" len="med"/>
-          </a:ln>
-          <a:effectLst/>
         </p:spPr>
-        <p:style>
-          <a:lnRef idx="1">
-            <a:schemeClr val="accent2"/>
-          </a:lnRef>
-          <a:fillRef idx="3">
-            <a:schemeClr val="accent2"/>
-          </a:fillRef>
-          <a:effectRef idx="2">
-            <a:schemeClr val="accent2"/>
-          </a:effectRef>
-          <a:fontRef idx="minor">
-            <a:schemeClr val="lt1"/>
-          </a:fontRef>
-        </p:style>
-        <p:txBody>
-          <a:bodyPr lIns="179259" tIns="143407" rIns="179259" bIns="143407"/>
+        <p:txBody>
+          <a:bodyPr wrap="square" lIns="0" tIns="0" rIns="0" bIns="0">
+            <a:spAutoFit/>
+          </a:bodyPr>
           <a:lstStyle/>
           <a:p>
-            <a:pPr algn="ctr" defTabSz="913938" fontAlgn="base">
-              <a:lnSpc>
-                <a:spcPct val="90000"/>
-              </a:lnSpc>
-              <a:spcBef>
-                <a:spcPct val="0"/>
-              </a:spcBef>
-              <a:spcAft>
-                <a:spcPct val="0"/>
-              </a:spcAft>
-              <a:defRPr/>
-            </a:pPr>
-            <a:endParaRPr lang="en-US" sz="2353" err="1">
-              <a:gradFill>
-                <a:gsLst>
-                  <a:gs pos="0">
-                    <a:srgbClr val="FFFFFF"/>
-                  </a:gs>
-                  <a:gs pos="100000">
-                    <a:srgbClr val="FFFFFF"/>
-                  </a:gs>
-                </a:gsLst>
-                <a:lin ang="5400000" scaled="0"/>
-              </a:gradFill>
-              <a:ea typeface="Segoe UI" pitchFamily="34" charset="0"/>
-              <a:cs typeface="Segoe UI" pitchFamily="34" charset="0"/>
-            </a:endParaRPr>
-          </a:p>
-        </p:txBody>
-      </p:sp>
-      <p:pic>
-        <p:nvPicPr>
-          <p:cNvPr id="7" name="Picture 7"/>
-          <p:cNvPicPr>
-            <a:picLocks noChangeAspect="1"/>
-          </p:cNvPicPr>
-          <p:nvPr userDrawn="1"/>
-        </p:nvPicPr>
-        <p:blipFill>
-          <a:blip r:embed="rId3" cstate="screen">
-            <a:extLst>
-              <a:ext uri="{28A0092B-C50C-407E-A947-70E740481C1C}">
-                <a14:useLocalDpi xmlns:a14="http://schemas.microsoft.com/office/drawing/2010/main" val="0"/>
-              </a:ext>
-            </a:extLst>
-          </a:blip>
-          <a:stretch>
-            <a:fillRect/>
-          </a:stretch>
-        </p:blipFill>
-        <p:spPr bwMode="auto">
-          <a:xfrm>
-            <a:off x="515138" y="552661"/>
-            <a:ext cx="1229472" cy="262853"/>
-          </a:xfrm>
-          <a:prstGeom prst="rect">
-            <a:avLst/>
-          </a:prstGeom>
-          <a:noFill/>
-          <a:ln>
-            <a:noFill/>
-          </a:ln>
-          <a:extLst>
-            <a:ext uri="{909E8E84-426E-40dd-AFC4-6F175D3DCCD1}">
-              <a14:hiddenFill xmlns="" xmlns:a14="http://schemas.microsoft.com/office/drawing/2010/main">
-                <a:solidFill>
-                  <a:srgbClr val="FFFFFF"/>
-                </a:solidFill>
-              </a14:hiddenFill>
-            </a:ext>
-            <a:ext uri="{91240B29-F687-4f45-9708-019B960494DF}">
-              <a14:hiddenLine xmlns="" xmlns:a14="http://schemas.microsoft.com/office/drawing/2010/main" w="9525">
-                <a:solidFill>
-                  <a:srgbClr val="000000"/>
-                </a:solidFill>
-                <a:miter lim="800000"/>
-                <a:headEnd/>
-                <a:tailEnd/>
-              </a14:hiddenLine>
-            </a:ext>
-          </a:extLst>
-        </p:spPr>
-      </p:pic>
-      <p:sp>
-        <p:nvSpPr>
-          <p:cNvPr id="17" name="Title 1"/>
-          <p:cNvSpPr>
-            <a:spLocks noGrp="1"/>
-          </p:cNvSpPr>
-          <p:nvPr>
-            <p:ph type="ctrTitle"/>
-          </p:nvPr>
-        </p:nvSpPr>
-        <p:spPr>
-          <a:xfrm>
-            <a:off x="375953" y="1413025"/>
-            <a:ext cx="6171371" cy="2488894"/>
-          </a:xfrm>
-        </p:spPr>
-        <p:txBody>
-          <a:bodyPr/>
-          <a:lstStyle>
-            <a:lvl1pPr>
-              <a:defRPr sz="5881" baseline="0">
-                <a:solidFill>
-                  <a:schemeClr val="bg1"/>
-                </a:solidFill>
-              </a:defRPr>
-            </a:lvl1pPr>
-          </a:lstStyle>
-          <a:p>
-            <a:r>
-              <a:rPr lang="en-US"/>
-              <a:t>Click to edit Master title style</a:t>
-            </a:r>
-          </a:p>
-        </p:txBody>
-      </p:sp>
-      <p:sp>
-        <p:nvSpPr>
-          <p:cNvPr id="19" name="Subtitle 2"/>
-          <p:cNvSpPr>
-            <a:spLocks noGrp="1"/>
-          </p:cNvSpPr>
-          <p:nvPr>
-            <p:ph type="subTitle" idx="1"/>
-          </p:nvPr>
-        </p:nvSpPr>
-        <p:spPr>
-          <a:xfrm>
-            <a:off x="375958" y="5387438"/>
-            <a:ext cx="5720046" cy="425822"/>
-          </a:xfrm>
-        </p:spPr>
-        <p:txBody>
-          <a:bodyPr anchor="ctr"/>
-          <a:lstStyle>
-            <a:lvl1pPr marL="0" indent="0" algn="l">
+            <a:pPr marL="0" marR="0" lvl="0" indent="0" algn="l" defTabSz="932742" rtl="0" eaLnBrk="1" fontAlgn="auto" latinLnBrk="0" hangingPunct="1">
               <a:lnSpc>
                 <a:spcPct val="100000"/>
               </a:lnSpc>
               <a:spcBef>
+                <a:spcPts val="800"/>
+              </a:spcBef>
+              <a:spcAft>
                 <a:spcPts val="0"/>
+              </a:spcAft>
+              <a:buClrTx/>
+              <a:buSzTx/>
+              <a:buFontTx/>
+              <a:buNone/>
+              <a:tabLst/>
+              <a:defRPr/>
+            </a:pPr>
+            <a:r>
+              <a:rPr kumimoji="0" lang="en-US" sz="2600" b="0" i="0" u="none" strike="noStrike" kern="1200" cap="none" normalizeH="0" baseline="0" noProof="0">
+                <a:ln w="3175">
+                  <a:noFill/>
+                </a:ln>
+                <a:gradFill>
+                  <a:gsLst>
+                    <a:gs pos="14801">
+                      <a:schemeClr val="bg1"/>
+                    </a:gs>
+                    <a:gs pos="75000">
+                      <a:schemeClr val="bg1"/>
+                    </a:gs>
+                  </a:gsLst>
+                  <a:lin ang="5400000" scaled="1"/>
+                </a:gradFill>
+                <a:effectLst/>
+                <a:uLnTx/>
+                <a:uFillTx/>
+                <a:latin typeface="Segoe UI Semibold"/>
+                <a:ea typeface="+mn-ea"/>
+                <a:cs typeface="Segoe UI" pitchFamily="34" charset="0"/>
+              </a:rPr>
+              <a:t>Learn.</a:t>
+            </a:r>
+          </a:p>
+          <a:p>
+            <a:pPr marL="0" marR="0" lvl="0" indent="0" algn="l" defTabSz="932742" rtl="0" eaLnBrk="1" fontAlgn="auto" latinLnBrk="0" hangingPunct="1">
+              <a:lnSpc>
+                <a:spcPct val="100000"/>
+              </a:lnSpc>
+              <a:spcBef>
+                <a:spcPts val="800"/>
               </a:spcBef>
+              <a:spcAft>
+                <a:spcPts val="0"/>
+              </a:spcAft>
+              <a:buClrTx/>
+              <a:buSzTx/>
+              <a:buFontTx/>
               <a:buNone/>
-              <a:defRPr sz="1567">
-                <a:solidFill>
-                  <a:schemeClr val="bg1"/>
-                </a:solidFill>
-                <a:latin typeface="+mj-lt"/>
-              </a:defRPr>
-            </a:lvl1pPr>
-            <a:lvl2pPr marL="448112" indent="0" algn="ctr">
+              <a:tabLst/>
+              <a:defRPr/>
+            </a:pPr>
+            <a:r>
+              <a:rPr kumimoji="0" lang="en-US" sz="2600" b="0" i="0" u="none" strike="noStrike" kern="1200" cap="none" normalizeH="0" baseline="0" noProof="0">
+                <a:ln w="3175">
+                  <a:noFill/>
+                </a:ln>
+                <a:gradFill>
+                  <a:gsLst>
+                    <a:gs pos="14801">
+                      <a:schemeClr val="bg1"/>
+                    </a:gs>
+                    <a:gs pos="75000">
+                      <a:schemeClr val="bg1"/>
+                    </a:gs>
+                  </a:gsLst>
+                  <a:lin ang="5400000" scaled="1"/>
+                </a:gradFill>
+                <a:effectLst/>
+                <a:uLnTx/>
+                <a:uFillTx/>
+                <a:latin typeface="Segoe UI Semibold"/>
+                <a:ea typeface="+mn-ea"/>
+                <a:cs typeface="Segoe UI" pitchFamily="34" charset="0"/>
+              </a:rPr>
+              <a:t>Connect.</a:t>
+            </a:r>
+          </a:p>
+          <a:p>
+            <a:pPr marL="0" marR="0" lvl="0" indent="0" algn="l" defTabSz="932742" rtl="0" eaLnBrk="1" fontAlgn="auto" latinLnBrk="0" hangingPunct="1">
+              <a:lnSpc>
+                <a:spcPct val="100000"/>
+              </a:lnSpc>
+              <a:spcBef>
+                <a:spcPts val="800"/>
+              </a:spcBef>
+              <a:spcAft>
+                <a:spcPts val="0"/>
+              </a:spcAft>
+              <a:buClrTx/>
+              <a:buSzTx/>
+              <a:buFontTx/>
               <a:buNone/>
-              <a:defRPr>
-                <a:solidFill>
-                  <a:schemeClr val="tx1">
-                    <a:tint val="75000"/>
-                  </a:schemeClr>
-                </a:solidFill>
-              </a:defRPr>
-            </a:lvl2pPr>
-            <a:lvl3pPr marL="896225" indent="0" algn="ctr">
-              <a:buNone/>
-              <a:defRPr>
-                <a:solidFill>
-                  <a:schemeClr val="tx1">
-                    <a:tint val="75000"/>
-                  </a:schemeClr>
-                </a:solidFill>
-              </a:defRPr>
-            </a:lvl3pPr>
-            <a:lvl4pPr marL="1344336" indent="0" algn="ctr">
-              <a:buNone/>
-              <a:defRPr>
-                <a:solidFill>
-                  <a:schemeClr val="tx1">
-                    <a:tint val="75000"/>
-                  </a:schemeClr>
-                </a:solidFill>
-              </a:defRPr>
-            </a:lvl4pPr>
-            <a:lvl5pPr marL="1792450" indent="0" algn="ctr">
-              <a:buNone/>
-              <a:defRPr>
-                <a:solidFill>
-                  <a:schemeClr val="tx1">
-                    <a:tint val="75000"/>
-                  </a:schemeClr>
-                </a:solidFill>
-              </a:defRPr>
-            </a:lvl5pPr>
-            <a:lvl6pPr marL="2240563" indent="0" algn="ctr">
-              <a:buNone/>
-              <a:defRPr>
-                <a:solidFill>
-                  <a:schemeClr val="tx1">
-                    <a:tint val="75000"/>
-                  </a:schemeClr>
-                </a:solidFill>
-              </a:defRPr>
-            </a:lvl6pPr>
-            <a:lvl7pPr marL="2688675" indent="0" algn="ctr">
-              <a:buNone/>
-              <a:defRPr>
-                <a:solidFill>
-                  <a:schemeClr val="tx1">
-                    <a:tint val="75000"/>
-                  </a:schemeClr>
-                </a:solidFill>
-              </a:defRPr>
-            </a:lvl7pPr>
-            <a:lvl8pPr marL="3136786" indent="0" algn="ctr">
-              <a:buNone/>
-              <a:defRPr>
-                <a:solidFill>
-                  <a:schemeClr val="tx1">
-                    <a:tint val="75000"/>
-                  </a:schemeClr>
-                </a:solidFill>
-              </a:defRPr>
-            </a:lvl8pPr>
-            <a:lvl9pPr marL="3584899" indent="0" algn="ctr">
-              <a:buNone/>
-              <a:defRPr>
-                <a:solidFill>
-                  <a:schemeClr val="tx1">
-                    <a:tint val="75000"/>
-                  </a:schemeClr>
-                </a:solidFill>
-              </a:defRPr>
-            </a:lvl9pPr>
-          </a:lstStyle>
-          <a:p>
-            <a:r>
-              <a:rPr lang="en-US"/>
-              <a:t>Click to edit Master subtitle style</a:t>
+              <a:tabLst/>
+              <a:defRPr/>
+            </a:pPr>
+            <a:r>
+              <a:rPr kumimoji="0" lang="en-US" sz="2600" b="0" i="0" u="none" strike="noStrike" kern="1200" cap="none" normalizeH="0" baseline="0" noProof="0">
+                <a:ln w="3175">
+                  <a:noFill/>
+                </a:ln>
+                <a:gradFill>
+                  <a:gsLst>
+                    <a:gs pos="14801">
+                      <a:schemeClr val="bg1"/>
+                    </a:gs>
+                    <a:gs pos="75000">
+                      <a:schemeClr val="bg1"/>
+                    </a:gs>
+                  </a:gsLst>
+                  <a:lin ang="5400000" scaled="1"/>
+                </a:gradFill>
+                <a:effectLst/>
+                <a:uLnTx/>
+                <a:uFillTx/>
+                <a:latin typeface="Segoe UI Semibold"/>
+                <a:ea typeface="+mn-ea"/>
+                <a:cs typeface="Segoe UI" pitchFamily="34" charset="0"/>
+              </a:rPr>
+              <a:t>Explore.</a:t>
             </a:r>
           </a:p>
         </p:txBody>
@@ -5982,16 +5185,25 @@
     </p:spTree>
     <p:extLst>
       <p:ext uri="{BB962C8B-B14F-4D97-AF65-F5344CB8AC3E}">
-        <p14:creationId xmlns:p14="http://schemas.microsoft.com/office/powerpoint/2010/main" val="4067687724"/>
+        <p14:creationId xmlns:p14="http://schemas.microsoft.com/office/powerpoint/2010/main" val="2243752953"/>
       </p:ext>
     </p:extLst>
   </p:cSld>
   <p:clrMapOvr>
-    <a:masterClrMapping/>
+    <a:overrideClrMapping bg1="lt1" tx1="dk1" bg2="lt2" tx2="dk2" accent1="accent1" accent2="accent2" accent3="accent3" accent4="accent4" accent5="accent5" accent6="accent6" hlink="hlink" folHlink="folHlink"/>
   </p:clrMapOvr>
-  <p:transition>
-    <p:fade/>
-  </p:transition>
+  <mc:AlternateContent xmlns:mc="http://schemas.openxmlformats.org/markup-compatibility/2006" xmlns:p159="http://schemas.microsoft.com/office/powerpoint/2015/09/main">
+    <mc:Choice Requires="p159">
+      <p:transition xmlns:p14="http://schemas.microsoft.com/office/powerpoint/2010/main" spd="slow" p14:dur="2000">
+        <p159:morph option="byObject"/>
+      </p:transition>
+    </mc:Choice>
+    <mc:Fallback xmlns="">
+      <p:transition spd="slow">
+        <p:fade/>
+      </p:transition>
+    </mc:Fallback>
+  </mc:AlternateContent>
 </p:sldLayout>
 </file>
 
@@ -6267,243 +5479,6 @@
   <p:clrMapOvr>
     <a:masterClrMapping/>
   </p:clrMapOvr>
-</p:sldLayout>
-</file>
-
-<file path=ppt/slideLayouts/slideLayout30.xml><?xml version="1.0" encoding="utf-8"?>
-<p:sldLayout xmlns:a="http://schemas.openxmlformats.org/drawingml/2006/main" xmlns:r="http://schemas.openxmlformats.org/officeDocument/2006/relationships" xmlns:p="http://schemas.openxmlformats.org/presentationml/2006/main" userDrawn="1">
-  <p:cSld name="Walk-in">
-    <p:bg>
-      <p:bgRef idx="1001">
-        <a:schemeClr val="bg2"/>
-      </p:bgRef>
-    </p:bg>
-    <p:spTree>
-      <p:nvGrpSpPr>
-        <p:cNvPr id="1" name=""/>
-        <p:cNvGrpSpPr/>
-        <p:nvPr/>
-      </p:nvGrpSpPr>
-      <p:grpSpPr>
-        <a:xfrm>
-          <a:off x="0" y="0"/>
-          <a:ext cx="0" cy="0"/>
-          <a:chOff x="0" y="0"/>
-          <a:chExt cx="0" cy="0"/>
-        </a:xfrm>
-      </p:grpSpPr>
-      <p:pic>
-        <p:nvPicPr>
-          <p:cNvPr id="4" name="Picture 3" descr="A sky view looking up at the camera&#10;&#10;Description generated with high confidence">
-            <a:extLst>
-              <a:ext uri="{FF2B5EF4-FFF2-40B4-BE49-F238E27FC236}">
-                <a16:creationId xmlns:a16="http://schemas.microsoft.com/office/drawing/2014/main" id="{E0143243-EBF8-42DF-AFA8-808B9A70F959}"/>
-              </a:ext>
-            </a:extLst>
-          </p:cNvPr>
-          <p:cNvPicPr>
-            <a:picLocks noChangeAspect="1"/>
-          </p:cNvPicPr>
-          <p:nvPr userDrawn="1"/>
-        </p:nvPicPr>
-        <p:blipFill>
-          <a:blip r:embed="rId2"/>
-          <a:stretch>
-            <a:fillRect/>
-          </a:stretch>
-        </p:blipFill>
-        <p:spPr>
-          <a:xfrm>
-            <a:off x="0" y="338"/>
-            <a:ext cx="12192000" cy="6857323"/>
-          </a:xfrm>
-          <a:prstGeom prst="rect">
-            <a:avLst/>
-          </a:prstGeom>
-        </p:spPr>
-      </p:pic>
-      <p:sp>
-        <p:nvSpPr>
-          <p:cNvPr id="54" name="Rectangle 53">
-            <a:extLst>
-              <a:ext uri="{FF2B5EF4-FFF2-40B4-BE49-F238E27FC236}">
-                <a16:creationId xmlns:a16="http://schemas.microsoft.com/office/drawing/2014/main" id="{4899085C-4B16-41A5-A2CB-5D4798A0322E}"/>
-              </a:ext>
-            </a:extLst>
-          </p:cNvPr>
-          <p:cNvSpPr/>
-          <p:nvPr userDrawn="1"/>
-        </p:nvSpPr>
-        <p:spPr bwMode="white">
-          <a:xfrm>
-            <a:off x="10092825" y="4781344"/>
-            <a:ext cx="2321486" cy="1405513"/>
-          </a:xfrm>
-          <a:prstGeom prst="rect">
-            <a:avLst/>
-          </a:prstGeom>
-        </p:spPr>
-        <p:txBody>
-          <a:bodyPr wrap="square" lIns="0" tIns="0" rIns="0" bIns="0">
-            <a:spAutoFit/>
-          </a:bodyPr>
-          <a:lstStyle/>
-          <a:p>
-            <a:pPr marL="0" marR="0" lvl="0" indent="0" algn="l" defTabSz="932742" rtl="0" eaLnBrk="1" fontAlgn="auto" latinLnBrk="0" hangingPunct="1">
-              <a:lnSpc>
-                <a:spcPct val="100000"/>
-              </a:lnSpc>
-              <a:spcBef>
-                <a:spcPts val="800"/>
-              </a:spcBef>
-              <a:spcAft>
-                <a:spcPts val="0"/>
-              </a:spcAft>
-              <a:buClrTx/>
-              <a:buSzTx/>
-              <a:buFontTx/>
-              <a:buNone/>
-              <a:tabLst/>
-              <a:defRPr/>
-            </a:pPr>
-            <a:r>
-              <a:rPr kumimoji="0" lang="en-US" sz="2600" b="0" i="0" u="none" strike="noStrike" kern="1200" cap="none" normalizeH="0" baseline="0" noProof="0">
-                <a:ln w="3175">
-                  <a:noFill/>
-                </a:ln>
-                <a:gradFill>
-                  <a:gsLst>
-                    <a:gs pos="14801">
-                      <a:schemeClr val="bg1"/>
-                    </a:gs>
-                    <a:gs pos="75000">
-                      <a:schemeClr val="bg1"/>
-                    </a:gs>
-                  </a:gsLst>
-                  <a:lin ang="5400000" scaled="1"/>
-                </a:gradFill>
-                <a:effectLst/>
-                <a:uLnTx/>
-                <a:uFillTx/>
-                <a:latin typeface="Segoe UI Semibold"/>
-                <a:ea typeface="+mn-ea"/>
-                <a:cs typeface="Segoe UI" pitchFamily="34" charset="0"/>
-              </a:rPr>
-              <a:t>Learn.</a:t>
-            </a:r>
-          </a:p>
-          <a:p>
-            <a:pPr marL="0" marR="0" lvl="0" indent="0" algn="l" defTabSz="932742" rtl="0" eaLnBrk="1" fontAlgn="auto" latinLnBrk="0" hangingPunct="1">
-              <a:lnSpc>
-                <a:spcPct val="100000"/>
-              </a:lnSpc>
-              <a:spcBef>
-                <a:spcPts val="800"/>
-              </a:spcBef>
-              <a:spcAft>
-                <a:spcPts val="0"/>
-              </a:spcAft>
-              <a:buClrTx/>
-              <a:buSzTx/>
-              <a:buFontTx/>
-              <a:buNone/>
-              <a:tabLst/>
-              <a:defRPr/>
-            </a:pPr>
-            <a:r>
-              <a:rPr kumimoji="0" lang="en-US" sz="2600" b="0" i="0" u="none" strike="noStrike" kern="1200" cap="none" normalizeH="0" baseline="0" noProof="0">
-                <a:ln w="3175">
-                  <a:noFill/>
-                </a:ln>
-                <a:gradFill>
-                  <a:gsLst>
-                    <a:gs pos="14801">
-                      <a:schemeClr val="bg1"/>
-                    </a:gs>
-                    <a:gs pos="75000">
-                      <a:schemeClr val="bg1"/>
-                    </a:gs>
-                  </a:gsLst>
-                  <a:lin ang="5400000" scaled="1"/>
-                </a:gradFill>
-                <a:effectLst/>
-                <a:uLnTx/>
-                <a:uFillTx/>
-                <a:latin typeface="Segoe UI Semibold"/>
-                <a:ea typeface="+mn-ea"/>
-                <a:cs typeface="Segoe UI" pitchFamily="34" charset="0"/>
-              </a:rPr>
-              <a:t>Connect.</a:t>
-            </a:r>
-          </a:p>
-          <a:p>
-            <a:pPr marL="0" marR="0" lvl="0" indent="0" algn="l" defTabSz="932742" rtl="0" eaLnBrk="1" fontAlgn="auto" latinLnBrk="0" hangingPunct="1">
-              <a:lnSpc>
-                <a:spcPct val="100000"/>
-              </a:lnSpc>
-              <a:spcBef>
-                <a:spcPts val="800"/>
-              </a:spcBef>
-              <a:spcAft>
-                <a:spcPts val="0"/>
-              </a:spcAft>
-              <a:buClrTx/>
-              <a:buSzTx/>
-              <a:buFontTx/>
-              <a:buNone/>
-              <a:tabLst/>
-              <a:defRPr/>
-            </a:pPr>
-            <a:r>
-              <a:rPr kumimoji="0" lang="en-US" sz="2600" b="0" i="0" u="none" strike="noStrike" kern="1200" cap="none" normalizeH="0" baseline="0" noProof="0">
-                <a:ln w="3175">
-                  <a:noFill/>
-                </a:ln>
-                <a:gradFill>
-                  <a:gsLst>
-                    <a:gs pos="14801">
-                      <a:schemeClr val="bg1"/>
-                    </a:gs>
-                    <a:gs pos="75000">
-                      <a:schemeClr val="bg1"/>
-                    </a:gs>
-                  </a:gsLst>
-                  <a:lin ang="5400000" scaled="1"/>
-                </a:gradFill>
-                <a:effectLst/>
-                <a:uLnTx/>
-                <a:uFillTx/>
-                <a:latin typeface="Segoe UI Semibold"/>
-                <a:ea typeface="+mn-ea"/>
-                <a:cs typeface="Segoe UI" pitchFamily="34" charset="0"/>
-              </a:rPr>
-              <a:t>Explore.</a:t>
-            </a:r>
-          </a:p>
-        </p:txBody>
-      </p:sp>
-    </p:spTree>
-    <p:extLst>
-      <p:ext uri="{BB962C8B-B14F-4D97-AF65-F5344CB8AC3E}">
-        <p14:creationId xmlns:p14="http://schemas.microsoft.com/office/powerpoint/2010/main" val="2243752953"/>
-      </p:ext>
-    </p:extLst>
-  </p:cSld>
-  <p:clrMapOvr>
-    <a:overrideClrMapping bg1="lt1" tx1="dk1" bg2="lt2" tx2="dk2" accent1="accent1" accent2="accent2" accent3="accent3" accent4="accent4" accent5="accent5" accent6="accent6" hlink="hlink" folHlink="folHlink"/>
-  </p:clrMapOvr>
-  <mc:AlternateContent xmlns:mc="http://schemas.openxmlformats.org/markup-compatibility/2006" xmlns:p159="http://schemas.microsoft.com/office/powerpoint/2015/09/main">
-    <mc:Choice Requires="p159">
-      <p:transition xmlns:p14="http://schemas.microsoft.com/office/powerpoint/2010/main" spd="slow" p14:dur="2000">
-        <p159:morph option="byObject"/>
-      </p:transition>
-    </mc:Choice>
-    <mc:Fallback xmlns="">
-      <p:transition spd="slow">
-        <p:fade/>
-      </p:transition>
-    </mc:Fallback>
-  </mc:AlternateContent>
 </p:sldLayout>
 </file>
 
@@ -8731,7 +7706,7 @@
           <p:nvPr userDrawn="1"/>
         </p:nvPicPr>
         <p:blipFill>
-          <a:blip r:embed="rId21" cstate="screen">
+          <a:blip r:embed="rId20" cstate="screen">
             <a:extLst>
               <a:ext uri="{28A0092B-C50C-407E-A947-70E740481C1C}">
                 <a14:useLocalDpi xmlns:a14="http://schemas.microsoft.com/office/drawing/2010/main"/>
@@ -8778,8 +7753,7 @@
     <p:sldLayoutId id="2147483675" r:id="rId15"/>
     <p:sldLayoutId id="2147483676" r:id="rId16"/>
     <p:sldLayoutId id="2147483677" r:id="rId17"/>
-    <p:sldLayoutId id="2147483678" r:id="rId18"/>
-    <p:sldLayoutId id="2147483679" r:id="rId19"/>
+    <p:sldLayoutId id="2147483679" r:id="rId18"/>
   </p:sldLayoutIdLst>
   <p:transition>
     <p:fade/>
@@ -9716,3429 +8690,6 @@
       </p:transition>
     </mc:Fallback>
   </mc:AlternateContent>
-</p:sld>
-</file>
-
-<file path=ppt/slides/slide11.xml><?xml version="1.0" encoding="utf-8"?>
-<p:sld xmlns:a="http://schemas.openxmlformats.org/drawingml/2006/main" xmlns:r="http://schemas.openxmlformats.org/officeDocument/2006/relationships" xmlns:p="http://schemas.openxmlformats.org/presentationml/2006/main">
-  <p:cSld>
-    <p:spTree>
-      <p:nvGrpSpPr>
-        <p:cNvPr id="1" name=""/>
-        <p:cNvGrpSpPr/>
-        <p:nvPr/>
-      </p:nvGrpSpPr>
-      <p:grpSpPr>
-        <a:xfrm>
-          <a:off x="0" y="0"/>
-          <a:ext cx="0" cy="0"/>
-          <a:chOff x="0" y="0"/>
-          <a:chExt cx="0" cy="0"/>
-        </a:xfrm>
-      </p:grpSpPr>
-      <p:sp>
-        <p:nvSpPr>
-          <p:cNvPr id="3" name="TextBox 2">
-            <a:extLst>
-              <a:ext uri="{FF2B5EF4-FFF2-40B4-BE49-F238E27FC236}">
-                <a16:creationId xmlns:a16="http://schemas.microsoft.com/office/drawing/2014/main" id="{E097154D-57A0-4AE5-9EA7-C0B7A89F88E5}"/>
-              </a:ext>
-            </a:extLst>
-          </p:cNvPr>
-          <p:cNvSpPr txBox="1"/>
-          <p:nvPr/>
-        </p:nvSpPr>
-        <p:spPr>
-          <a:xfrm>
-            <a:off x="208393" y="195996"/>
-            <a:ext cx="3181193" cy="954107"/>
-          </a:xfrm>
-          <a:prstGeom prst="rect">
-            <a:avLst/>
-          </a:prstGeom>
-          <a:noFill/>
-        </p:spPr>
-        <p:txBody>
-          <a:bodyPr wrap="square" rtlCol="0">
-            <a:spAutoFit/>
-          </a:bodyPr>
-          <a:lstStyle/>
-          <a:p>
-            <a:r>
-              <a:rPr lang="en-US" sz="2800" dirty="0"/>
-              <a:t>Possible Architecture</a:t>
-            </a:r>
-          </a:p>
-        </p:txBody>
-      </p:sp>
-      <p:pic>
-        <p:nvPicPr>
-          <p:cNvPr id="2" name="Picture 1">
-            <a:extLst>
-              <a:ext uri="{FF2B5EF4-FFF2-40B4-BE49-F238E27FC236}">
-                <a16:creationId xmlns:a16="http://schemas.microsoft.com/office/drawing/2014/main" id="{C2259D29-EA36-47E4-8FC7-F9888E22C21D}"/>
-              </a:ext>
-            </a:extLst>
-          </p:cNvPr>
-          <p:cNvPicPr>
-            <a:picLocks noChangeAspect="1"/>
-          </p:cNvPicPr>
-          <p:nvPr/>
-        </p:nvPicPr>
-        <p:blipFill>
-          <a:blip r:embed="rId2"/>
-          <a:stretch>
-            <a:fillRect/>
-          </a:stretch>
-        </p:blipFill>
-        <p:spPr>
-          <a:xfrm>
-            <a:off x="2739181" y="42040"/>
-            <a:ext cx="7756258" cy="6815960"/>
-          </a:xfrm>
-          <a:prstGeom prst="rect">
-            <a:avLst/>
-          </a:prstGeom>
-        </p:spPr>
-      </p:pic>
-    </p:spTree>
-    <p:extLst>
-      <p:ext uri="{BB962C8B-B14F-4D97-AF65-F5344CB8AC3E}">
-        <p14:creationId xmlns:p14="http://schemas.microsoft.com/office/powerpoint/2010/main" val="985215954"/>
-      </p:ext>
-    </p:extLst>
-  </p:cSld>
-  <p:clrMapOvr>
-    <a:masterClrMapping/>
-  </p:clrMapOvr>
-  <mc:AlternateContent xmlns:mc="http://schemas.openxmlformats.org/markup-compatibility/2006" xmlns:p14="http://schemas.microsoft.com/office/powerpoint/2010/main">
-    <mc:Choice Requires="p14">
-      <p:transition spd="med" p14:dur="700">
-        <p:fade/>
-      </p:transition>
-    </mc:Choice>
-    <mc:Fallback xmlns="">
-      <p:transition spd="med">
-        <p:fade/>
-      </p:transition>
-    </mc:Fallback>
-  </mc:AlternateContent>
-</p:sld>
-</file>
-
-<file path=ppt/slides/slide12.xml><?xml version="1.0" encoding="utf-8"?>
-<p:sld xmlns:a="http://schemas.openxmlformats.org/drawingml/2006/main" xmlns:r="http://schemas.openxmlformats.org/officeDocument/2006/relationships" xmlns:p="http://schemas.openxmlformats.org/presentationml/2006/main">
-  <p:cSld>
-    <p:spTree>
-      <p:nvGrpSpPr>
-        <p:cNvPr id="1" name=""/>
-        <p:cNvGrpSpPr/>
-        <p:nvPr/>
-      </p:nvGrpSpPr>
-      <p:grpSpPr>
-        <a:xfrm>
-          <a:off x="0" y="0"/>
-          <a:ext cx="0" cy="0"/>
-          <a:chOff x="0" y="0"/>
-          <a:chExt cx="0" cy="0"/>
-        </a:xfrm>
-      </p:grpSpPr>
-      <p:sp>
-        <p:nvSpPr>
-          <p:cNvPr id="9" name="Title 4"/>
-          <p:cNvSpPr>
-            <a:spLocks noGrp="1"/>
-          </p:cNvSpPr>
-          <p:nvPr>
-            <p:ph type="ctrTitle"/>
-          </p:nvPr>
-        </p:nvSpPr>
-        <p:spPr>
-          <a:xfrm>
-            <a:off x="274321" y="1038534"/>
-            <a:ext cx="6264810" cy="1916953"/>
-          </a:xfrm>
-          <a:solidFill>
-            <a:srgbClr val="002060"/>
-          </a:solidFill>
-        </p:spPr>
-        <p:txBody>
-          <a:bodyPr vert="horz" wrap="square" lIns="179259" tIns="91427" rIns="179259" bIns="91427" rtlCol="0" anchor="t">
-            <a:noAutofit/>
-          </a:bodyPr>
-          <a:lstStyle/>
-          <a:p>
-            <a:pPr defTabSz="914116">
-              <a:defRPr/>
-            </a:pPr>
-            <a:r>
-              <a:rPr sz="6470" spc="0" dirty="0">
-                <a:solidFill>
-                  <a:schemeClr val="tx2"/>
-                </a:solidFill>
-                <a:latin typeface="Segoe UI Light"/>
-                <a:cs typeface="Segoe UI Light"/>
-              </a:rPr>
-              <a:t>Microsoft Azure </a:t>
-            </a:r>
-            <a:br>
-              <a:rPr sz="6470" spc="0" dirty="0">
-                <a:solidFill>
-                  <a:schemeClr val="tx2"/>
-                </a:solidFill>
-                <a:latin typeface="Segoe UI Light"/>
-                <a:cs typeface="Segoe UI Light"/>
-              </a:rPr>
-            </a:br>
-            <a:r>
-              <a:rPr sz="6470" spc="0" dirty="0">
-                <a:solidFill>
-                  <a:schemeClr val="tx2"/>
-                </a:solidFill>
-                <a:latin typeface="Segoe UI Light"/>
-                <a:cs typeface="Segoe UI Light"/>
-              </a:rPr>
-              <a:t>P  </a:t>
-            </a:r>
-            <a:r>
-              <a:rPr sz="6470" spc="0" dirty="0" err="1">
-                <a:solidFill>
-                  <a:schemeClr val="tx2"/>
-                </a:solidFill>
-                <a:latin typeface="Segoe UI Light"/>
-                <a:cs typeface="Segoe UI Light"/>
-              </a:rPr>
-              <a:t>wer</a:t>
-            </a:r>
-            <a:r>
-              <a:rPr lang="en-US" sz="6470" spc="0" dirty="0">
-                <a:solidFill>
-                  <a:schemeClr val="tx2"/>
-                </a:solidFill>
-                <a:latin typeface="Segoe UI Light"/>
-                <a:cs typeface="Segoe UI Light"/>
-              </a:rPr>
-              <a:t> Lunch</a:t>
-            </a:r>
-            <a:br>
-              <a:rPr sz="6470" spc="0" dirty="0">
-                <a:solidFill>
-                  <a:schemeClr val="tx2"/>
-                </a:solidFill>
-                <a:latin typeface="Segoe UI Light"/>
-                <a:cs typeface="Segoe UI Light"/>
-              </a:rPr>
-            </a:br>
-            <a:endParaRPr sz="6470" spc="0" dirty="0">
-              <a:solidFill>
-                <a:schemeClr val="tx2"/>
-              </a:solidFill>
-              <a:latin typeface="Segoe UI Light"/>
-              <a:cs typeface="Segoe UI Light"/>
-            </a:endParaRPr>
-          </a:p>
-        </p:txBody>
-      </p:sp>
-      <p:sp>
-        <p:nvSpPr>
-          <p:cNvPr id="12290" name="Title 4"/>
-          <p:cNvSpPr txBox="1">
-            <a:spLocks/>
-          </p:cNvSpPr>
-          <p:nvPr/>
-        </p:nvSpPr>
-        <p:spPr bwMode="auto">
-          <a:xfrm>
-            <a:off x="274321" y="5764097"/>
-            <a:ext cx="6264810" cy="802390"/>
-          </a:xfrm>
-          <a:prstGeom prst="rect">
-            <a:avLst/>
-          </a:prstGeom>
-          <a:noFill/>
-          <a:ln>
-            <a:noFill/>
-          </a:ln>
-          <a:extLst>
-            <a:ext uri="{909E8E84-426E-40dd-AFC4-6F175D3DCCD1}">
-              <a14:hiddenFill xmlns="" xmlns:a14="http://schemas.microsoft.com/office/drawing/2010/main">
-                <a:solidFill>
-                  <a:srgbClr val="FFFFFF"/>
-                </a:solidFill>
-              </a14:hiddenFill>
-            </a:ext>
-            <a:ext uri="{91240B29-F687-4f45-9708-019B960494DF}">
-              <a14:hiddenLine xmlns="" xmlns:a14="http://schemas.microsoft.com/office/drawing/2010/main" w="9525">
-                <a:solidFill>
-                  <a:srgbClr val="000000"/>
-                </a:solidFill>
-                <a:miter lim="800000"/>
-                <a:headEnd/>
-                <a:tailEnd/>
-              </a14:hiddenLine>
-            </a:ext>
-          </a:extLst>
-        </p:spPr>
-        <p:txBody>
-          <a:bodyPr lIns="143352" tIns="89594" rIns="143352" bIns="89594" anchor="ctr"/>
-          <a:lstStyle>
-            <a:lvl1pPr eaLnBrk="0" hangingPunct="0">
-              <a:defRPr sz="2400">
-                <a:solidFill>
-                  <a:schemeClr val="tx1"/>
-                </a:solidFill>
-                <a:latin typeface="Segoe UI" charset="0"/>
-                <a:ea typeface="ＭＳ Ｐゴシック" charset="0"/>
-                <a:cs typeface="MS PGothic" charset="0"/>
-              </a:defRPr>
-            </a:lvl1pPr>
-            <a:lvl2pPr marL="742950" indent="-285750" eaLnBrk="0" hangingPunct="0">
-              <a:defRPr sz="2400">
-                <a:solidFill>
-                  <a:schemeClr val="tx1"/>
-                </a:solidFill>
-                <a:latin typeface="Segoe UI" charset="0"/>
-                <a:ea typeface="MS PGothic" charset="0"/>
-                <a:cs typeface="MS PGothic" charset="0"/>
-              </a:defRPr>
-            </a:lvl2pPr>
-            <a:lvl3pPr marL="1143000" indent="-228600" eaLnBrk="0" hangingPunct="0">
-              <a:defRPr sz="2400">
-                <a:solidFill>
-                  <a:schemeClr val="tx1"/>
-                </a:solidFill>
-                <a:latin typeface="Segoe UI" charset="0"/>
-                <a:ea typeface="MS PGothic" charset="0"/>
-                <a:cs typeface="MS PGothic" charset="0"/>
-              </a:defRPr>
-            </a:lvl3pPr>
-            <a:lvl4pPr marL="1600200" indent="-228600" eaLnBrk="0" hangingPunct="0">
-              <a:defRPr sz="2400">
-                <a:solidFill>
-                  <a:schemeClr val="tx1"/>
-                </a:solidFill>
-                <a:latin typeface="Segoe UI" charset="0"/>
-                <a:ea typeface="MS PGothic" charset="0"/>
-                <a:cs typeface="MS PGothic" charset="0"/>
-              </a:defRPr>
-            </a:lvl4pPr>
-            <a:lvl5pPr marL="2057400" indent="-228600" eaLnBrk="0" hangingPunct="0">
-              <a:defRPr sz="2400">
-                <a:solidFill>
-                  <a:schemeClr val="tx1"/>
-                </a:solidFill>
-                <a:latin typeface="Segoe UI" charset="0"/>
-                <a:ea typeface="MS PGothic" charset="0"/>
-                <a:cs typeface="MS PGothic" charset="0"/>
-              </a:defRPr>
-            </a:lvl5pPr>
-            <a:lvl6pPr marL="2514600" indent="-228600" defTabSz="931863" eaLnBrk="0" fontAlgn="base" hangingPunct="0">
-              <a:spcBef>
-                <a:spcPct val="0"/>
-              </a:spcBef>
-              <a:spcAft>
-                <a:spcPct val="0"/>
-              </a:spcAft>
-              <a:defRPr sz="2400">
-                <a:solidFill>
-                  <a:schemeClr val="tx1"/>
-                </a:solidFill>
-                <a:latin typeface="Segoe UI" charset="0"/>
-                <a:ea typeface="MS PGothic" charset="0"/>
-                <a:cs typeface="MS PGothic" charset="0"/>
-              </a:defRPr>
-            </a:lvl6pPr>
-            <a:lvl7pPr marL="2971800" indent="-228600" defTabSz="931863" eaLnBrk="0" fontAlgn="base" hangingPunct="0">
-              <a:spcBef>
-                <a:spcPct val="0"/>
-              </a:spcBef>
-              <a:spcAft>
-                <a:spcPct val="0"/>
-              </a:spcAft>
-              <a:defRPr sz="2400">
-                <a:solidFill>
-                  <a:schemeClr val="tx1"/>
-                </a:solidFill>
-                <a:latin typeface="Segoe UI" charset="0"/>
-                <a:ea typeface="MS PGothic" charset="0"/>
-                <a:cs typeface="MS PGothic" charset="0"/>
-              </a:defRPr>
-            </a:lvl7pPr>
-            <a:lvl8pPr marL="3429000" indent="-228600" defTabSz="931863" eaLnBrk="0" fontAlgn="base" hangingPunct="0">
-              <a:spcBef>
-                <a:spcPct val="0"/>
-              </a:spcBef>
-              <a:spcAft>
-                <a:spcPct val="0"/>
-              </a:spcAft>
-              <a:defRPr sz="2400">
-                <a:solidFill>
-                  <a:schemeClr val="tx1"/>
-                </a:solidFill>
-                <a:latin typeface="Segoe UI" charset="0"/>
-                <a:ea typeface="MS PGothic" charset="0"/>
-                <a:cs typeface="MS PGothic" charset="0"/>
-              </a:defRPr>
-            </a:lvl8pPr>
-            <a:lvl9pPr marL="3886200" indent="-228600" defTabSz="931863" eaLnBrk="0" fontAlgn="base" hangingPunct="0">
-              <a:spcBef>
-                <a:spcPct val="0"/>
-              </a:spcBef>
-              <a:spcAft>
-                <a:spcPct val="0"/>
-              </a:spcAft>
-              <a:defRPr sz="2400">
-                <a:solidFill>
-                  <a:schemeClr val="tx1"/>
-                </a:solidFill>
-                <a:latin typeface="Segoe UI" charset="0"/>
-                <a:ea typeface="MS PGothic" charset="0"/>
-                <a:cs typeface="MS PGothic" charset="0"/>
-              </a:defRPr>
-            </a:lvl9pPr>
-          </a:lstStyle>
-          <a:p>
-            <a:pPr defTabSz="913341" eaLnBrk="1" fontAlgn="base" hangingPunct="1">
-              <a:lnSpc>
-                <a:spcPts val="2942"/>
-              </a:lnSpc>
-              <a:spcBef>
-                <a:spcPct val="0"/>
-              </a:spcBef>
-              <a:spcAft>
-                <a:spcPts val="1175"/>
-              </a:spcAft>
-            </a:pPr>
-            <a:r>
-              <a:rPr lang="en-US" sz="1765" b="1" dirty="0">
-                <a:solidFill>
-                  <a:schemeClr val="tx1">
-                    <a:lumMod val="95000"/>
-                    <a:lumOff val="5000"/>
-                  </a:schemeClr>
-                </a:solidFill>
-                <a:latin typeface="Segoe UI Light" charset="0"/>
-                <a:cs typeface="Segoe UI" charset="0"/>
-              </a:rPr>
-              <a:t>Presented By: </a:t>
-            </a:r>
-            <a:r>
-              <a:rPr lang="en-US" sz="1765" dirty="0">
-                <a:solidFill>
-                  <a:schemeClr val="tx1">
-                    <a:lumMod val="95000"/>
-                    <a:lumOff val="5000"/>
-                  </a:schemeClr>
-                </a:solidFill>
-                <a:latin typeface="Segoe UI Light" charset="0"/>
-                <a:cs typeface="Segoe UI" charset="0"/>
-              </a:rPr>
-              <a:t>Azure Solution Architects from US South Central</a:t>
-            </a:r>
-          </a:p>
-        </p:txBody>
-      </p:sp>
-      <p:sp>
-        <p:nvSpPr>
-          <p:cNvPr id="5" name="Title 4"/>
-          <p:cNvSpPr txBox="1">
-            <a:spLocks/>
-          </p:cNvSpPr>
-          <p:nvPr/>
-        </p:nvSpPr>
-        <p:spPr>
-          <a:xfrm>
-            <a:off x="279402" y="3669315"/>
-            <a:ext cx="4646991" cy="542099"/>
-          </a:xfrm>
-          <a:prstGeom prst="rect">
-            <a:avLst/>
-          </a:prstGeom>
-        </p:spPr>
-        <p:txBody>
-          <a:bodyPr lIns="179259" tIns="89630" rIns="179259" bIns="89630"/>
-          <a:lstStyle>
-            <a:lvl1pPr algn="l" defTabSz="931863" rtl="0" fontAlgn="base">
-              <a:lnSpc>
-                <a:spcPct val="90000"/>
-              </a:lnSpc>
-              <a:spcBef>
-                <a:spcPct val="0"/>
-              </a:spcBef>
-              <a:spcAft>
-                <a:spcPct val="0"/>
-              </a:spcAft>
-              <a:defRPr lang="en-US" sz="6000" kern="1200" spc="-102" baseline="0">
-                <a:ln w="3175">
-                  <a:noFill/>
-                </a:ln>
-                <a:solidFill>
-                  <a:schemeClr val="bg1"/>
-                </a:solidFill>
-                <a:latin typeface="+mj-lt"/>
-                <a:ea typeface="ＭＳ Ｐゴシック" charset="0"/>
-                <a:cs typeface="Segoe UI" pitchFamily="34" charset="0"/>
-              </a:defRPr>
-            </a:lvl1pPr>
-            <a:lvl2pPr algn="l" defTabSz="931863" rtl="0" fontAlgn="base">
-              <a:lnSpc>
-                <a:spcPct val="90000"/>
-              </a:lnSpc>
-              <a:spcBef>
-                <a:spcPct val="0"/>
-              </a:spcBef>
-              <a:spcAft>
-                <a:spcPct val="0"/>
-              </a:spcAft>
-              <a:defRPr sz="5400">
-                <a:solidFill>
-                  <a:schemeClr val="tx2"/>
-                </a:solidFill>
-                <a:latin typeface="Segoe UI Light" charset="0"/>
-                <a:ea typeface="ＭＳ Ｐゴシック" charset="0"/>
-                <a:cs typeface="Segoe UI" charset="0"/>
-              </a:defRPr>
-            </a:lvl2pPr>
-            <a:lvl3pPr algn="l" defTabSz="931863" rtl="0" fontAlgn="base">
-              <a:lnSpc>
-                <a:spcPct val="90000"/>
-              </a:lnSpc>
-              <a:spcBef>
-                <a:spcPct val="0"/>
-              </a:spcBef>
-              <a:spcAft>
-                <a:spcPct val="0"/>
-              </a:spcAft>
-              <a:defRPr sz="5400">
-                <a:solidFill>
-                  <a:schemeClr val="tx2"/>
-                </a:solidFill>
-                <a:latin typeface="Segoe UI Light" charset="0"/>
-                <a:ea typeface="ＭＳ Ｐゴシック" charset="0"/>
-                <a:cs typeface="Segoe UI" charset="0"/>
-              </a:defRPr>
-            </a:lvl3pPr>
-            <a:lvl4pPr algn="l" defTabSz="931863" rtl="0" fontAlgn="base">
-              <a:lnSpc>
-                <a:spcPct val="90000"/>
-              </a:lnSpc>
-              <a:spcBef>
-                <a:spcPct val="0"/>
-              </a:spcBef>
-              <a:spcAft>
-                <a:spcPct val="0"/>
-              </a:spcAft>
-              <a:defRPr sz="5400">
-                <a:solidFill>
-                  <a:schemeClr val="tx2"/>
-                </a:solidFill>
-                <a:latin typeface="Segoe UI Light" charset="0"/>
-                <a:ea typeface="ＭＳ Ｐゴシック" charset="0"/>
-                <a:cs typeface="Segoe UI" charset="0"/>
-              </a:defRPr>
-            </a:lvl4pPr>
-            <a:lvl5pPr algn="l" defTabSz="931863" rtl="0" fontAlgn="base">
-              <a:lnSpc>
-                <a:spcPct val="90000"/>
-              </a:lnSpc>
-              <a:spcBef>
-                <a:spcPct val="0"/>
-              </a:spcBef>
-              <a:spcAft>
-                <a:spcPct val="0"/>
-              </a:spcAft>
-              <a:defRPr sz="5400">
-                <a:solidFill>
-                  <a:schemeClr val="tx2"/>
-                </a:solidFill>
-                <a:latin typeface="Segoe UI Light" charset="0"/>
-                <a:ea typeface="ＭＳ Ｐゴシック" charset="0"/>
-                <a:cs typeface="Segoe UI" charset="0"/>
-              </a:defRPr>
-            </a:lvl5pPr>
-            <a:lvl6pPr marL="457200" algn="l" defTabSz="931863" rtl="0" fontAlgn="base">
-              <a:lnSpc>
-                <a:spcPct val="90000"/>
-              </a:lnSpc>
-              <a:spcBef>
-                <a:spcPct val="0"/>
-              </a:spcBef>
-              <a:spcAft>
-                <a:spcPct val="0"/>
-              </a:spcAft>
-              <a:defRPr sz="5400">
-                <a:solidFill>
-                  <a:schemeClr val="tx2"/>
-                </a:solidFill>
-                <a:latin typeface="Segoe UI Light" charset="0"/>
-                <a:ea typeface="ＭＳ Ｐゴシック" charset="0"/>
-                <a:cs typeface="Segoe UI" charset="0"/>
-              </a:defRPr>
-            </a:lvl6pPr>
-            <a:lvl7pPr marL="914400" algn="l" defTabSz="931863" rtl="0" fontAlgn="base">
-              <a:lnSpc>
-                <a:spcPct val="90000"/>
-              </a:lnSpc>
-              <a:spcBef>
-                <a:spcPct val="0"/>
-              </a:spcBef>
-              <a:spcAft>
-                <a:spcPct val="0"/>
-              </a:spcAft>
-              <a:defRPr sz="5400">
-                <a:solidFill>
-                  <a:schemeClr val="tx2"/>
-                </a:solidFill>
-                <a:latin typeface="Segoe UI Light" charset="0"/>
-                <a:ea typeface="ＭＳ Ｐゴシック" charset="0"/>
-                <a:cs typeface="Segoe UI" charset="0"/>
-              </a:defRPr>
-            </a:lvl7pPr>
-            <a:lvl8pPr marL="1371600" algn="l" defTabSz="931863" rtl="0" fontAlgn="base">
-              <a:lnSpc>
-                <a:spcPct val="90000"/>
-              </a:lnSpc>
-              <a:spcBef>
-                <a:spcPct val="0"/>
-              </a:spcBef>
-              <a:spcAft>
-                <a:spcPct val="0"/>
-              </a:spcAft>
-              <a:defRPr sz="5400">
-                <a:solidFill>
-                  <a:schemeClr val="tx2"/>
-                </a:solidFill>
-                <a:latin typeface="Segoe UI Light" charset="0"/>
-                <a:ea typeface="ＭＳ Ｐゴシック" charset="0"/>
-                <a:cs typeface="Segoe UI" charset="0"/>
-              </a:defRPr>
-            </a:lvl8pPr>
-            <a:lvl9pPr marL="1828800" algn="l" defTabSz="931863" rtl="0" fontAlgn="base">
-              <a:lnSpc>
-                <a:spcPct val="90000"/>
-              </a:lnSpc>
-              <a:spcBef>
-                <a:spcPct val="0"/>
-              </a:spcBef>
-              <a:spcAft>
-                <a:spcPct val="0"/>
-              </a:spcAft>
-              <a:defRPr sz="5400">
-                <a:solidFill>
-                  <a:schemeClr val="tx2"/>
-                </a:solidFill>
-                <a:latin typeface="Segoe UI Light" charset="0"/>
-                <a:ea typeface="ＭＳ Ｐゴシック" charset="0"/>
-                <a:cs typeface="Segoe UI" charset="0"/>
-              </a:defRPr>
-            </a:lvl9pPr>
-          </a:lstStyle>
-          <a:p>
-            <a:pPr defTabSz="914116">
-              <a:defRPr/>
-            </a:pPr>
-            <a:endParaRPr lang="en-US" sz="2000" spc="0">
-              <a:solidFill>
-                <a:srgbClr val="FFFFFF"/>
-              </a:solidFill>
-              <a:latin typeface="Segoe UI Light"/>
-              <a:cs typeface="Segoe UI Light"/>
-            </a:endParaRPr>
-          </a:p>
-        </p:txBody>
-      </p:sp>
-      <p:pic>
-        <p:nvPicPr>
-          <p:cNvPr id="2" name="Picture 1" descr="Power symbol"/>
-          <p:cNvPicPr>
-            <a:picLocks noChangeAspect="1"/>
-          </p:cNvPicPr>
-          <p:nvPr/>
-        </p:nvPicPr>
-        <p:blipFill>
-          <a:blip r:embed="rId3">
-            <a:lum bright="70000" contrast="-70000"/>
-            <a:extLst>
-              <a:ext uri="{28A0092B-C50C-407E-A947-70E740481C1C}">
-                <a14:useLocalDpi xmlns:a14="http://schemas.microsoft.com/office/drawing/2010/main" val="0"/>
-              </a:ext>
-            </a:extLst>
-          </a:blip>
-          <a:stretch>
-            <a:fillRect/>
-          </a:stretch>
-        </p:blipFill>
-        <p:spPr>
-          <a:xfrm>
-            <a:off x="866855" y="2185237"/>
-            <a:ext cx="448212" cy="560266"/>
-          </a:xfrm>
-          <a:prstGeom prst="rect">
-            <a:avLst/>
-          </a:prstGeom>
-        </p:spPr>
-      </p:pic>
-      <p:sp>
-        <p:nvSpPr>
-          <p:cNvPr id="8" name="Title 4"/>
-          <p:cNvSpPr txBox="1">
-            <a:spLocks/>
-          </p:cNvSpPr>
-          <p:nvPr/>
-        </p:nvSpPr>
-        <p:spPr>
-          <a:xfrm>
-            <a:off x="279407" y="3193976"/>
-            <a:ext cx="6259724" cy="1916953"/>
-          </a:xfrm>
-          <a:prstGeom prst="rect">
-            <a:avLst/>
-          </a:prstGeom>
-        </p:spPr>
-        <p:txBody>
-          <a:bodyPr vert="horz" wrap="square" lIns="179259" tIns="91427" rIns="179259" bIns="91427" rtlCol="0" anchor="t">
-            <a:noAutofit/>
-          </a:bodyPr>
-          <a:lstStyle>
-            <a:lvl1pPr algn="l" defTabSz="931695" rtl="0" eaLnBrk="0" fontAlgn="base" hangingPunct="0">
-              <a:lnSpc>
-                <a:spcPct val="90000"/>
-              </a:lnSpc>
-              <a:spcBef>
-                <a:spcPct val="0"/>
-              </a:spcBef>
-              <a:spcAft>
-                <a:spcPct val="0"/>
-              </a:spcAft>
-              <a:defRPr lang="en-US" sz="5999" kern="1200" spc="-102" baseline="0">
-                <a:ln w="3175">
-                  <a:noFill/>
-                </a:ln>
-                <a:solidFill>
-                  <a:schemeClr val="bg1"/>
-                </a:solidFill>
-                <a:latin typeface="+mj-lt"/>
-                <a:ea typeface="ＭＳ Ｐゴシック" charset="0"/>
-                <a:cs typeface="Segoe UI" pitchFamily="34" charset="0"/>
-              </a:defRPr>
-            </a:lvl1pPr>
-            <a:lvl2pPr algn="l" defTabSz="931695" rtl="0" eaLnBrk="0" fontAlgn="base" hangingPunct="0">
-              <a:lnSpc>
-                <a:spcPct val="90000"/>
-              </a:lnSpc>
-              <a:spcBef>
-                <a:spcPct val="0"/>
-              </a:spcBef>
-              <a:spcAft>
-                <a:spcPct val="0"/>
-              </a:spcAft>
-              <a:defRPr sz="5399">
-                <a:solidFill>
-                  <a:schemeClr val="tx2"/>
-                </a:solidFill>
-                <a:latin typeface="Segoe UI Light" charset="0"/>
-                <a:ea typeface="ＭＳ Ｐゴシック" charset="0"/>
-                <a:cs typeface="Segoe UI" charset="0"/>
-              </a:defRPr>
-            </a:lvl2pPr>
-            <a:lvl3pPr algn="l" defTabSz="931695" rtl="0" eaLnBrk="0" fontAlgn="base" hangingPunct="0">
-              <a:lnSpc>
-                <a:spcPct val="90000"/>
-              </a:lnSpc>
-              <a:spcBef>
-                <a:spcPct val="0"/>
-              </a:spcBef>
-              <a:spcAft>
-                <a:spcPct val="0"/>
-              </a:spcAft>
-              <a:defRPr sz="5399">
-                <a:solidFill>
-                  <a:schemeClr val="tx2"/>
-                </a:solidFill>
-                <a:latin typeface="Segoe UI Light" charset="0"/>
-                <a:ea typeface="ＭＳ Ｐゴシック" charset="0"/>
-                <a:cs typeface="Segoe UI" charset="0"/>
-              </a:defRPr>
-            </a:lvl3pPr>
-            <a:lvl4pPr algn="l" defTabSz="931695" rtl="0" eaLnBrk="0" fontAlgn="base" hangingPunct="0">
-              <a:lnSpc>
-                <a:spcPct val="90000"/>
-              </a:lnSpc>
-              <a:spcBef>
-                <a:spcPct val="0"/>
-              </a:spcBef>
-              <a:spcAft>
-                <a:spcPct val="0"/>
-              </a:spcAft>
-              <a:defRPr sz="5399">
-                <a:solidFill>
-                  <a:schemeClr val="tx2"/>
-                </a:solidFill>
-                <a:latin typeface="Segoe UI Light" charset="0"/>
-                <a:ea typeface="ＭＳ Ｐゴシック" charset="0"/>
-                <a:cs typeface="Segoe UI" charset="0"/>
-              </a:defRPr>
-            </a:lvl4pPr>
-            <a:lvl5pPr algn="l" defTabSz="931695" rtl="0" eaLnBrk="0" fontAlgn="base" hangingPunct="0">
-              <a:lnSpc>
-                <a:spcPct val="90000"/>
-              </a:lnSpc>
-              <a:spcBef>
-                <a:spcPct val="0"/>
-              </a:spcBef>
-              <a:spcAft>
-                <a:spcPct val="0"/>
-              </a:spcAft>
-              <a:defRPr sz="5399">
-                <a:solidFill>
-                  <a:schemeClr val="tx2"/>
-                </a:solidFill>
-                <a:latin typeface="Segoe UI Light" charset="0"/>
-                <a:ea typeface="ＭＳ Ｐゴシック" charset="0"/>
-                <a:cs typeface="Segoe UI" charset="0"/>
-              </a:defRPr>
-            </a:lvl5pPr>
-            <a:lvl6pPr marL="457117" algn="l" defTabSz="931695" rtl="0" fontAlgn="base">
-              <a:lnSpc>
-                <a:spcPct val="90000"/>
-              </a:lnSpc>
-              <a:spcBef>
-                <a:spcPct val="0"/>
-              </a:spcBef>
-              <a:spcAft>
-                <a:spcPct val="0"/>
-              </a:spcAft>
-              <a:defRPr sz="5399">
-                <a:solidFill>
-                  <a:schemeClr val="tx2"/>
-                </a:solidFill>
-                <a:latin typeface="Segoe UI Light" charset="0"/>
-                <a:ea typeface="ＭＳ Ｐゴシック" charset="0"/>
-                <a:cs typeface="Segoe UI" charset="0"/>
-              </a:defRPr>
-            </a:lvl6pPr>
-            <a:lvl7pPr marL="914235" algn="l" defTabSz="931695" rtl="0" fontAlgn="base">
-              <a:lnSpc>
-                <a:spcPct val="90000"/>
-              </a:lnSpc>
-              <a:spcBef>
-                <a:spcPct val="0"/>
-              </a:spcBef>
-              <a:spcAft>
-                <a:spcPct val="0"/>
-              </a:spcAft>
-              <a:defRPr sz="5399">
-                <a:solidFill>
-                  <a:schemeClr val="tx2"/>
-                </a:solidFill>
-                <a:latin typeface="Segoe UI Light" charset="0"/>
-                <a:ea typeface="ＭＳ Ｐゴシック" charset="0"/>
-                <a:cs typeface="Segoe UI" charset="0"/>
-              </a:defRPr>
-            </a:lvl7pPr>
-            <a:lvl8pPr marL="1371352" algn="l" defTabSz="931695" rtl="0" fontAlgn="base">
-              <a:lnSpc>
-                <a:spcPct val="90000"/>
-              </a:lnSpc>
-              <a:spcBef>
-                <a:spcPct val="0"/>
-              </a:spcBef>
-              <a:spcAft>
-                <a:spcPct val="0"/>
-              </a:spcAft>
-              <a:defRPr sz="5399">
-                <a:solidFill>
-                  <a:schemeClr val="tx2"/>
-                </a:solidFill>
-                <a:latin typeface="Segoe UI Light" charset="0"/>
-                <a:ea typeface="ＭＳ Ｐゴシック" charset="0"/>
-                <a:cs typeface="Segoe UI" charset="0"/>
-              </a:defRPr>
-            </a:lvl8pPr>
-            <a:lvl9pPr marL="1828471" algn="l" defTabSz="931695" rtl="0" fontAlgn="base">
-              <a:lnSpc>
-                <a:spcPct val="90000"/>
-              </a:lnSpc>
-              <a:spcBef>
-                <a:spcPct val="0"/>
-              </a:spcBef>
-              <a:spcAft>
-                <a:spcPct val="0"/>
-              </a:spcAft>
-              <a:defRPr sz="5399">
-                <a:solidFill>
-                  <a:schemeClr val="tx2"/>
-                </a:solidFill>
-                <a:latin typeface="Segoe UI Light" charset="0"/>
-                <a:ea typeface="ＭＳ Ｐゴシック" charset="0"/>
-                <a:cs typeface="Segoe UI" charset="0"/>
-              </a:defRPr>
-            </a:lvl9pPr>
-          </a:lstStyle>
-          <a:p>
-            <a:pPr defTabSz="914116" eaLnBrk="1" hangingPunct="1">
-              <a:defRPr/>
-            </a:pPr>
-            <a:r>
-              <a:rPr lang="en-US" sz="3137" b="1" spc="0" dirty="0">
-                <a:latin typeface="Segoe UI Light"/>
-                <a:ea typeface="+mn-ea"/>
-                <a:cs typeface="Segoe UI Light"/>
-              </a:rPr>
-              <a:t>Starts: Friday September 21</a:t>
-            </a:r>
-            <a:r>
-              <a:rPr lang="en-US" sz="3137" b="1" spc="0" baseline="30000" dirty="0">
-                <a:latin typeface="Segoe UI Light"/>
-                <a:ea typeface="+mn-ea"/>
-                <a:cs typeface="Segoe UI Light"/>
-              </a:rPr>
-              <a:t>st</a:t>
-            </a:r>
-            <a:r>
-              <a:rPr lang="en-US" sz="3137" b="1" spc="0" dirty="0">
-                <a:latin typeface="Segoe UI Light"/>
-                <a:ea typeface="+mn-ea"/>
-                <a:cs typeface="Segoe UI Light"/>
-              </a:rPr>
-              <a:t>, 2018</a:t>
-            </a:r>
-          </a:p>
-          <a:p>
-            <a:pPr defTabSz="914116" eaLnBrk="1" hangingPunct="1">
-              <a:defRPr/>
-            </a:pPr>
-            <a:endParaRPr lang="en-US" sz="3137" spc="0" dirty="0">
-              <a:ea typeface="+mn-ea"/>
-              <a:cs typeface="Segoe UI Light"/>
-            </a:endParaRPr>
-          </a:p>
-          <a:p>
-            <a:pPr defTabSz="914116" eaLnBrk="1" hangingPunct="1">
-              <a:defRPr/>
-            </a:pPr>
-            <a:r>
-              <a:rPr lang="en-US" sz="3137" spc="0" dirty="0">
-                <a:latin typeface="Segoe UI Light"/>
-                <a:ea typeface="+mn-ea"/>
-                <a:cs typeface="Segoe UI Light"/>
-              </a:rPr>
-              <a:t>For schedule, on-demand content:</a:t>
-            </a:r>
-          </a:p>
-          <a:p>
-            <a:pPr defTabSz="914116" eaLnBrk="1" hangingPunct="1">
-              <a:defRPr/>
-            </a:pPr>
-            <a:r>
-              <a:rPr lang="en-US" sz="3137" spc="0" dirty="0">
-                <a:solidFill>
-                  <a:schemeClr val="bg2"/>
-                </a:solidFill>
-                <a:ea typeface="+mn-ea"/>
-                <a:cs typeface="Segoe UI Light"/>
-                <a:hlinkClick r:id="rId4">
-                  <a:extLst>
-                    <a:ext uri="{A12FA001-AC4F-418D-AE19-62706E023703}">
-                      <ahyp:hlinkClr xmlns:ahyp="http://schemas.microsoft.com/office/drawing/2018/hyperlinkcolor" val="tx"/>
-                    </a:ext>
-                  </a:extLst>
-                </a:hlinkClick>
-              </a:rPr>
-              <a:t>http://azurepowerlunch.com/</a:t>
-            </a:r>
-            <a:r>
-              <a:rPr lang="en-US" sz="3137" spc="0" dirty="0">
-                <a:solidFill>
-                  <a:schemeClr val="bg2"/>
-                </a:solidFill>
-                <a:ea typeface="+mn-ea"/>
-                <a:cs typeface="Segoe UI Light"/>
-              </a:rPr>
-              <a:t> </a:t>
-            </a:r>
-            <a:br>
-              <a:rPr lang="en-US" sz="3137" spc="0" dirty="0">
-                <a:latin typeface="Segoe UI Light"/>
-                <a:ea typeface="+mn-ea"/>
-                <a:cs typeface="Segoe UI Light"/>
-              </a:rPr>
-            </a:br>
-            <a:endParaRPr lang="en-US" sz="3137" spc="0" dirty="0">
-              <a:latin typeface="Segoe UI Light"/>
-              <a:ea typeface="+mn-ea"/>
-              <a:cs typeface="Segoe UI Light"/>
-            </a:endParaRPr>
-          </a:p>
-        </p:txBody>
-      </p:sp>
-      <p:pic>
-        <p:nvPicPr>
-          <p:cNvPr id="11" name="Picture 4" descr="Image result for lunch">
-            <a:extLst>
-              <a:ext uri="{FF2B5EF4-FFF2-40B4-BE49-F238E27FC236}">
-                <a16:creationId xmlns:a16="http://schemas.microsoft.com/office/drawing/2014/main" id="{9FB35AEE-3924-4EDC-B664-7048F0422C21}"/>
-              </a:ext>
-            </a:extLst>
-          </p:cNvPr>
-          <p:cNvPicPr>
-            <a:picLocks noChangeAspect="1" noChangeArrowheads="1"/>
-          </p:cNvPicPr>
-          <p:nvPr/>
-        </p:nvPicPr>
-        <p:blipFill>
-          <a:blip r:embed="rId5">
-            <a:duotone>
-              <a:schemeClr val="accent2">
-                <a:shade val="45000"/>
-                <a:satMod val="135000"/>
-              </a:schemeClr>
-              <a:prstClr val="white"/>
-            </a:duotone>
-            <a:extLst>
-              <a:ext uri="{28A0092B-C50C-407E-A947-70E740481C1C}">
-                <a14:useLocalDpi xmlns:a14="http://schemas.microsoft.com/office/drawing/2010/main" val="0"/>
-              </a:ext>
-            </a:extLst>
-          </a:blip>
-          <a:srcRect/>
-          <a:stretch>
-            <a:fillRect/>
-          </a:stretch>
-        </p:blipFill>
-        <p:spPr bwMode="auto">
-          <a:xfrm>
-            <a:off x="4826065" y="2009660"/>
-            <a:ext cx="992022" cy="843875"/>
-          </a:xfrm>
-          <a:prstGeom prst="rect">
-            <a:avLst/>
-          </a:prstGeom>
-          <a:noFill/>
-          <a:extLst>
-            <a:ext uri="{909E8E84-426E-40DD-AFC4-6F175D3DCCD1}">
-              <a14:hiddenFill xmlns:a14="http://schemas.microsoft.com/office/drawing/2010/main">
-                <a:solidFill>
-                  <a:srgbClr val="FFFFFF"/>
-                </a:solidFill>
-              </a14:hiddenFill>
-            </a:ext>
-          </a:extLst>
-        </p:spPr>
-      </p:pic>
-    </p:spTree>
-    <p:extLst>
-      <p:ext uri="{BB962C8B-B14F-4D97-AF65-F5344CB8AC3E}">
-        <p14:creationId xmlns:p14="http://schemas.microsoft.com/office/powerpoint/2010/main" val="2682252305"/>
-      </p:ext>
-    </p:extLst>
-  </p:cSld>
-  <p:clrMapOvr>
-    <a:masterClrMapping/>
-  </p:clrMapOvr>
-  <p:transition>
-    <p:fade/>
-  </p:transition>
-</p:sld>
-</file>
-
-<file path=ppt/slides/slide13.xml><?xml version="1.0" encoding="utf-8"?>
-<p:sld xmlns:a="http://schemas.openxmlformats.org/drawingml/2006/main" xmlns:r="http://schemas.openxmlformats.org/officeDocument/2006/relationships" xmlns:p="http://schemas.openxmlformats.org/presentationml/2006/main" show="0">
-  <p:cSld>
-    <p:spTree>
-      <p:nvGrpSpPr>
-        <p:cNvPr id="1" name=""/>
-        <p:cNvGrpSpPr/>
-        <p:nvPr/>
-      </p:nvGrpSpPr>
-      <p:grpSpPr>
-        <a:xfrm>
-          <a:off x="0" y="0"/>
-          <a:ext cx="0" cy="0"/>
-          <a:chOff x="0" y="0"/>
-          <a:chExt cx="0" cy="0"/>
-        </a:xfrm>
-      </p:grpSpPr>
-      <p:sp>
-        <p:nvSpPr>
-          <p:cNvPr id="5" name="Rectangle 4">
-            <a:extLst>
-              <a:ext uri="{FF2B5EF4-FFF2-40B4-BE49-F238E27FC236}">
-                <a16:creationId xmlns:a16="http://schemas.microsoft.com/office/drawing/2014/main" id="{AB84389F-7294-498C-BDBB-276DA76F93CD}"/>
-              </a:ext>
-            </a:extLst>
-          </p:cNvPr>
-          <p:cNvSpPr/>
-          <p:nvPr/>
-        </p:nvSpPr>
-        <p:spPr>
-          <a:xfrm>
-            <a:off x="4095688" y="679084"/>
-            <a:ext cx="2705388" cy="1959386"/>
-          </a:xfrm>
-          <a:prstGeom prst="rect">
-            <a:avLst/>
-          </a:prstGeom>
-        </p:spPr>
-        <p:style>
-          <a:lnRef idx="2">
-            <a:schemeClr val="dk1"/>
-          </a:lnRef>
-          <a:fillRef idx="1">
-            <a:schemeClr val="lt1"/>
-          </a:fillRef>
-          <a:effectRef idx="0">
-            <a:schemeClr val="dk1"/>
-          </a:effectRef>
-          <a:fontRef idx="minor">
-            <a:schemeClr val="dk1"/>
-          </a:fontRef>
-        </p:style>
-        <p:txBody>
-          <a:bodyPr rtlCol="0" anchor="ctr"/>
-          <a:lstStyle/>
-          <a:p>
-            <a:pPr algn="ctr"/>
-            <a:endParaRPr lang="en-US"/>
-          </a:p>
-        </p:txBody>
-      </p:sp>
-      <p:pic>
-        <p:nvPicPr>
-          <p:cNvPr id="17" name="Picture 16">
-            <a:extLst>
-              <a:ext uri="{FF2B5EF4-FFF2-40B4-BE49-F238E27FC236}">
-                <a16:creationId xmlns:a16="http://schemas.microsoft.com/office/drawing/2014/main" id="{E119F170-A454-41C0-9753-02D238D0C277}"/>
-              </a:ext>
-            </a:extLst>
-          </p:cNvPr>
-          <p:cNvPicPr>
-            <a:picLocks noChangeAspect="1"/>
-          </p:cNvPicPr>
-          <p:nvPr/>
-        </p:nvPicPr>
-        <p:blipFill>
-          <a:blip r:embed="rId3">
-            <a:extLst>
-              <a:ext uri="{28A0092B-C50C-407E-A947-70E740481C1C}">
-                <a14:useLocalDpi xmlns:a14="http://schemas.microsoft.com/office/drawing/2010/main" val="0"/>
-              </a:ext>
-            </a:extLst>
-          </a:blip>
-          <a:stretch>
-            <a:fillRect/>
-          </a:stretch>
-        </p:blipFill>
-        <p:spPr>
-          <a:xfrm>
-            <a:off x="11083056" y="178295"/>
-            <a:ext cx="780290" cy="780290"/>
-          </a:xfrm>
-          <a:prstGeom prst="rect">
-            <a:avLst/>
-          </a:prstGeom>
-        </p:spPr>
-      </p:pic>
-      <p:pic>
-        <p:nvPicPr>
-          <p:cNvPr id="23" name="Picture 22">
-            <a:extLst>
-              <a:ext uri="{FF2B5EF4-FFF2-40B4-BE49-F238E27FC236}">
-                <a16:creationId xmlns:a16="http://schemas.microsoft.com/office/drawing/2014/main" id="{E736D3D7-5737-4392-BD71-B366EB758E87}"/>
-              </a:ext>
-            </a:extLst>
-          </p:cNvPr>
-          <p:cNvPicPr>
-            <a:picLocks noChangeAspect="1"/>
-          </p:cNvPicPr>
-          <p:nvPr/>
-        </p:nvPicPr>
-        <p:blipFill>
-          <a:blip r:embed="rId4">
-            <a:extLst>
-              <a:ext uri="{28A0092B-C50C-407E-A947-70E740481C1C}">
-                <a14:useLocalDpi xmlns:a14="http://schemas.microsoft.com/office/drawing/2010/main" val="0"/>
-              </a:ext>
-            </a:extLst>
-          </a:blip>
-          <a:stretch>
-            <a:fillRect/>
-          </a:stretch>
-        </p:blipFill>
-        <p:spPr>
-          <a:xfrm>
-            <a:off x="5254918" y="4492194"/>
-            <a:ext cx="780290" cy="780290"/>
-          </a:xfrm>
-          <a:prstGeom prst="rect">
-            <a:avLst/>
-          </a:prstGeom>
-        </p:spPr>
-      </p:pic>
-      <p:pic>
-        <p:nvPicPr>
-          <p:cNvPr id="25" name="Picture 24">
-            <a:extLst>
-              <a:ext uri="{FF2B5EF4-FFF2-40B4-BE49-F238E27FC236}">
-                <a16:creationId xmlns:a16="http://schemas.microsoft.com/office/drawing/2014/main" id="{4DAF9FFE-8D6C-4132-8B15-54E7B5DE3E70}"/>
-              </a:ext>
-            </a:extLst>
-          </p:cNvPr>
-          <p:cNvPicPr>
-            <a:picLocks noChangeAspect="1"/>
-          </p:cNvPicPr>
-          <p:nvPr/>
-        </p:nvPicPr>
-        <p:blipFill>
-          <a:blip r:embed="rId4">
-            <a:extLst>
-              <a:ext uri="{28A0092B-C50C-407E-A947-70E740481C1C}">
-                <a14:useLocalDpi xmlns:a14="http://schemas.microsoft.com/office/drawing/2010/main" val="0"/>
-              </a:ext>
-            </a:extLst>
-          </a:blip>
-          <a:stretch>
-            <a:fillRect/>
-          </a:stretch>
-        </p:blipFill>
-        <p:spPr>
-          <a:xfrm>
-            <a:off x="5254918" y="5662161"/>
-            <a:ext cx="780290" cy="780290"/>
-          </a:xfrm>
-          <a:prstGeom prst="rect">
-            <a:avLst/>
-          </a:prstGeom>
-        </p:spPr>
-      </p:pic>
-      <p:sp>
-        <p:nvSpPr>
-          <p:cNvPr id="26" name="Rectangle 25">
-            <a:extLst>
-              <a:ext uri="{FF2B5EF4-FFF2-40B4-BE49-F238E27FC236}">
-                <a16:creationId xmlns:a16="http://schemas.microsoft.com/office/drawing/2014/main" id="{FEF9BAE9-7CC0-4B48-B15B-8EB00065F406}"/>
-              </a:ext>
-            </a:extLst>
-          </p:cNvPr>
-          <p:cNvSpPr/>
-          <p:nvPr/>
-        </p:nvSpPr>
-        <p:spPr>
-          <a:xfrm>
-            <a:off x="2343150" y="3800896"/>
-            <a:ext cx="8460549" cy="2930103"/>
-          </a:xfrm>
-          <a:prstGeom prst="rect">
-            <a:avLst/>
-          </a:prstGeom>
-          <a:noFill/>
-        </p:spPr>
-        <p:style>
-          <a:lnRef idx="2">
-            <a:schemeClr val="dk1"/>
-          </a:lnRef>
-          <a:fillRef idx="1">
-            <a:schemeClr val="lt1"/>
-          </a:fillRef>
-          <a:effectRef idx="0">
-            <a:schemeClr val="dk1"/>
-          </a:effectRef>
-          <a:fontRef idx="minor">
-            <a:schemeClr val="dk1"/>
-          </a:fontRef>
-        </p:style>
-        <p:txBody>
-          <a:bodyPr rtlCol="0" anchor="t" anchorCtr="0"/>
-          <a:lstStyle/>
-          <a:p>
-            <a:pPr algn="ctr"/>
-            <a:r>
-              <a:rPr lang="en-US" dirty="0"/>
-              <a:t>Tailspin Datacenter</a:t>
-            </a:r>
-          </a:p>
-        </p:txBody>
-      </p:sp>
-      <p:pic>
-        <p:nvPicPr>
-          <p:cNvPr id="30" name="Picture 29">
-            <a:extLst>
-              <a:ext uri="{FF2B5EF4-FFF2-40B4-BE49-F238E27FC236}">
-                <a16:creationId xmlns:a16="http://schemas.microsoft.com/office/drawing/2014/main" id="{09559760-DB47-47FF-87F1-7115DD5216C2}"/>
-              </a:ext>
-            </a:extLst>
-          </p:cNvPr>
-          <p:cNvPicPr>
-            <a:picLocks noChangeAspect="1"/>
-          </p:cNvPicPr>
-          <p:nvPr/>
-        </p:nvPicPr>
-        <p:blipFill>
-          <a:blip r:embed="rId5">
-            <a:extLst>
-              <a:ext uri="{28A0092B-C50C-407E-A947-70E740481C1C}">
-                <a14:useLocalDpi xmlns:a14="http://schemas.microsoft.com/office/drawing/2010/main" val="0"/>
-              </a:ext>
-            </a:extLst>
-          </a:blip>
-          <a:stretch>
-            <a:fillRect/>
-          </a:stretch>
-        </p:blipFill>
-        <p:spPr>
-          <a:xfrm>
-            <a:off x="9171724" y="5313671"/>
-            <a:ext cx="780290" cy="780290"/>
-          </a:xfrm>
-          <a:prstGeom prst="rect">
-            <a:avLst/>
-          </a:prstGeom>
-        </p:spPr>
-      </p:pic>
-      <p:pic>
-        <p:nvPicPr>
-          <p:cNvPr id="35" name="Picture 34">
-            <a:extLst>
-              <a:ext uri="{FF2B5EF4-FFF2-40B4-BE49-F238E27FC236}">
-                <a16:creationId xmlns:a16="http://schemas.microsoft.com/office/drawing/2014/main" id="{FF86FB99-25A0-49BE-A7BD-102D41B5459F}"/>
-              </a:ext>
-            </a:extLst>
-          </p:cNvPr>
-          <p:cNvPicPr>
-            <a:picLocks noChangeAspect="1"/>
-          </p:cNvPicPr>
-          <p:nvPr/>
-        </p:nvPicPr>
-        <p:blipFill>
-          <a:blip r:embed="rId6">
-            <a:extLst>
-              <a:ext uri="{28A0092B-C50C-407E-A947-70E740481C1C}">
-                <a14:useLocalDpi xmlns:a14="http://schemas.microsoft.com/office/drawing/2010/main" val="0"/>
-              </a:ext>
-            </a:extLst>
-          </a:blip>
-          <a:stretch>
-            <a:fillRect/>
-          </a:stretch>
-        </p:blipFill>
-        <p:spPr>
-          <a:xfrm>
-            <a:off x="9171724" y="3868603"/>
-            <a:ext cx="205030" cy="205030"/>
-          </a:xfrm>
-          <a:prstGeom prst="rect">
-            <a:avLst/>
-          </a:prstGeom>
-        </p:spPr>
-      </p:pic>
-      <p:pic>
-        <p:nvPicPr>
-          <p:cNvPr id="38" name="Picture 37">
-            <a:extLst>
-              <a:ext uri="{FF2B5EF4-FFF2-40B4-BE49-F238E27FC236}">
-                <a16:creationId xmlns:a16="http://schemas.microsoft.com/office/drawing/2014/main" id="{C36A4A9A-97C2-4267-8AF7-06FF12701899}"/>
-              </a:ext>
-            </a:extLst>
-          </p:cNvPr>
-          <p:cNvPicPr>
-            <a:picLocks noChangeAspect="1"/>
-          </p:cNvPicPr>
-          <p:nvPr/>
-        </p:nvPicPr>
-        <p:blipFill>
-          <a:blip r:embed="rId6">
-            <a:extLst>
-              <a:ext uri="{28A0092B-C50C-407E-A947-70E740481C1C}">
-                <a14:useLocalDpi xmlns:a14="http://schemas.microsoft.com/office/drawing/2010/main" val="0"/>
-              </a:ext>
-            </a:extLst>
-          </a:blip>
-          <a:stretch>
-            <a:fillRect/>
-          </a:stretch>
-        </p:blipFill>
-        <p:spPr>
-          <a:xfrm>
-            <a:off x="9437402" y="3868602"/>
-            <a:ext cx="205030" cy="205030"/>
-          </a:xfrm>
-          <a:prstGeom prst="rect">
-            <a:avLst/>
-          </a:prstGeom>
-        </p:spPr>
-      </p:pic>
-      <p:pic>
-        <p:nvPicPr>
-          <p:cNvPr id="39" name="Picture 38">
-            <a:extLst>
-              <a:ext uri="{FF2B5EF4-FFF2-40B4-BE49-F238E27FC236}">
-                <a16:creationId xmlns:a16="http://schemas.microsoft.com/office/drawing/2014/main" id="{7F14683F-4C87-4F8D-A681-B695C5C93358}"/>
-              </a:ext>
-            </a:extLst>
-          </p:cNvPr>
-          <p:cNvPicPr>
-            <a:picLocks noChangeAspect="1"/>
-          </p:cNvPicPr>
-          <p:nvPr/>
-        </p:nvPicPr>
-        <p:blipFill>
-          <a:blip r:embed="rId6">
-            <a:extLst>
-              <a:ext uri="{28A0092B-C50C-407E-A947-70E740481C1C}">
-                <a14:useLocalDpi xmlns:a14="http://schemas.microsoft.com/office/drawing/2010/main" val="0"/>
-              </a:ext>
-            </a:extLst>
-          </a:blip>
-          <a:stretch>
-            <a:fillRect/>
-          </a:stretch>
-        </p:blipFill>
-        <p:spPr>
-          <a:xfrm>
-            <a:off x="9703081" y="3868602"/>
-            <a:ext cx="205030" cy="205030"/>
-          </a:xfrm>
-          <a:prstGeom prst="rect">
-            <a:avLst/>
-          </a:prstGeom>
-        </p:spPr>
-      </p:pic>
-      <p:cxnSp>
-        <p:nvCxnSpPr>
-          <p:cNvPr id="16" name="Straight Arrow Connector 15">
-            <a:extLst>
-              <a:ext uri="{FF2B5EF4-FFF2-40B4-BE49-F238E27FC236}">
-                <a16:creationId xmlns:a16="http://schemas.microsoft.com/office/drawing/2014/main" id="{F41F2157-7E92-4784-8E30-8230B69887C5}"/>
-              </a:ext>
-            </a:extLst>
-          </p:cNvPr>
-          <p:cNvCxnSpPr>
-            <a:cxnSpLocks/>
-            <a:stCxn id="9" idx="2"/>
-            <a:endCxn id="23" idx="1"/>
-          </p:cNvCxnSpPr>
-          <p:nvPr/>
-        </p:nvCxnSpPr>
-        <p:spPr>
-          <a:xfrm>
-            <a:off x="4869935" y="2249309"/>
-            <a:ext cx="384983" cy="2633030"/>
-          </a:xfrm>
-          <a:prstGeom prst="straightConnector1">
-            <a:avLst/>
-          </a:prstGeom>
-          <a:ln>
-            <a:headEnd type="triangle"/>
-            <a:tailEnd type="triangle"/>
-          </a:ln>
-        </p:spPr>
-        <p:style>
-          <a:lnRef idx="1">
-            <a:schemeClr val="accent1"/>
-          </a:lnRef>
-          <a:fillRef idx="0">
-            <a:schemeClr val="accent1"/>
-          </a:fillRef>
-          <a:effectRef idx="0">
-            <a:schemeClr val="accent1"/>
-          </a:effectRef>
-          <a:fontRef idx="minor">
-            <a:schemeClr val="tx1"/>
-          </a:fontRef>
-        </p:style>
-      </p:cxnSp>
-      <p:cxnSp>
-        <p:nvCxnSpPr>
-          <p:cNvPr id="22" name="Straight Arrow Connector 21">
-            <a:extLst>
-              <a:ext uri="{FF2B5EF4-FFF2-40B4-BE49-F238E27FC236}">
-                <a16:creationId xmlns:a16="http://schemas.microsoft.com/office/drawing/2014/main" id="{46076CB9-5E4F-43B2-8C5D-1D7A63067D62}"/>
-              </a:ext>
-            </a:extLst>
-          </p:cNvPr>
-          <p:cNvCxnSpPr>
-            <a:cxnSpLocks/>
-            <a:stCxn id="9" idx="2"/>
-            <a:endCxn id="25" idx="0"/>
-          </p:cNvCxnSpPr>
-          <p:nvPr/>
-        </p:nvCxnSpPr>
-        <p:spPr>
-          <a:xfrm>
-            <a:off x="4869935" y="2249309"/>
-            <a:ext cx="775128" cy="3412852"/>
-          </a:xfrm>
-          <a:prstGeom prst="straightConnector1">
-            <a:avLst/>
-          </a:prstGeom>
-          <a:ln>
-            <a:headEnd type="triangle"/>
-            <a:tailEnd type="triangle"/>
-          </a:ln>
-        </p:spPr>
-        <p:style>
-          <a:lnRef idx="1">
-            <a:schemeClr val="accent1"/>
-          </a:lnRef>
-          <a:fillRef idx="0">
-            <a:schemeClr val="accent1"/>
-          </a:fillRef>
-          <a:effectRef idx="0">
-            <a:schemeClr val="accent1"/>
-          </a:effectRef>
-          <a:fontRef idx="minor">
-            <a:schemeClr val="tx1"/>
-          </a:fontRef>
-        </p:style>
-      </p:cxnSp>
-      <p:sp>
-        <p:nvSpPr>
-          <p:cNvPr id="24" name="TextBox 23">
-            <a:extLst>
-              <a:ext uri="{FF2B5EF4-FFF2-40B4-BE49-F238E27FC236}">
-                <a16:creationId xmlns:a16="http://schemas.microsoft.com/office/drawing/2014/main" id="{D198FE40-1797-4673-912D-835F7D3F6D97}"/>
-              </a:ext>
-            </a:extLst>
-          </p:cNvPr>
-          <p:cNvSpPr txBox="1"/>
-          <p:nvPr/>
-        </p:nvSpPr>
-        <p:spPr>
-          <a:xfrm>
-            <a:off x="10928233" y="958585"/>
-            <a:ext cx="1121875" cy="553998"/>
-          </a:xfrm>
-          <a:prstGeom prst="rect">
-            <a:avLst/>
-          </a:prstGeom>
-          <a:noFill/>
-        </p:spPr>
-        <p:txBody>
-          <a:bodyPr wrap="square" rtlCol="0">
-            <a:spAutoFit/>
-          </a:bodyPr>
-          <a:lstStyle/>
-          <a:p>
-            <a:pPr algn="ctr"/>
-            <a:r>
-              <a:rPr lang="en-US" sz="1000" dirty="0"/>
-              <a:t>3</a:t>
-            </a:r>
-            <a:r>
-              <a:rPr lang="en-US" sz="1000" baseline="30000" dirty="0"/>
-              <a:t>rd</a:t>
-            </a:r>
-            <a:r>
-              <a:rPr lang="en-US" sz="1000" dirty="0"/>
-              <a:t> Party Credit Card Processing Service</a:t>
-            </a:r>
-          </a:p>
-        </p:txBody>
-      </p:sp>
-      <p:pic>
-        <p:nvPicPr>
-          <p:cNvPr id="40" name="Picture 39">
-            <a:extLst>
-              <a:ext uri="{FF2B5EF4-FFF2-40B4-BE49-F238E27FC236}">
-                <a16:creationId xmlns:a16="http://schemas.microsoft.com/office/drawing/2014/main" id="{F06D509E-7F6F-4970-A0BB-595449031ADE}"/>
-              </a:ext>
-            </a:extLst>
-          </p:cNvPr>
-          <p:cNvPicPr>
-            <a:picLocks noChangeAspect="1"/>
-          </p:cNvPicPr>
-          <p:nvPr/>
-        </p:nvPicPr>
-        <p:blipFill>
-          <a:blip r:embed="rId6">
-            <a:extLst>
-              <a:ext uri="{28A0092B-C50C-407E-A947-70E740481C1C}">
-                <a14:useLocalDpi xmlns:a14="http://schemas.microsoft.com/office/drawing/2010/main" val="0"/>
-              </a:ext>
-            </a:extLst>
-          </a:blip>
-          <a:stretch>
-            <a:fillRect/>
-          </a:stretch>
-        </p:blipFill>
-        <p:spPr>
-          <a:xfrm>
-            <a:off x="9171724" y="5164224"/>
-            <a:ext cx="205030" cy="205030"/>
-          </a:xfrm>
-          <a:prstGeom prst="rect">
-            <a:avLst/>
-          </a:prstGeom>
-        </p:spPr>
-      </p:pic>
-      <p:pic>
-        <p:nvPicPr>
-          <p:cNvPr id="41" name="Picture 40">
-            <a:extLst>
-              <a:ext uri="{FF2B5EF4-FFF2-40B4-BE49-F238E27FC236}">
-                <a16:creationId xmlns:a16="http://schemas.microsoft.com/office/drawing/2014/main" id="{2D492B2F-863E-41FE-87E6-448CE317ACB3}"/>
-              </a:ext>
-            </a:extLst>
-          </p:cNvPr>
-          <p:cNvPicPr>
-            <a:picLocks noChangeAspect="1"/>
-          </p:cNvPicPr>
-          <p:nvPr/>
-        </p:nvPicPr>
-        <p:blipFill>
-          <a:blip r:embed="rId6">
-            <a:extLst>
-              <a:ext uri="{28A0092B-C50C-407E-A947-70E740481C1C}">
-                <a14:useLocalDpi xmlns:a14="http://schemas.microsoft.com/office/drawing/2010/main" val="0"/>
-              </a:ext>
-            </a:extLst>
-          </a:blip>
-          <a:stretch>
-            <a:fillRect/>
-          </a:stretch>
-        </p:blipFill>
-        <p:spPr>
-          <a:xfrm>
-            <a:off x="9437402" y="5164223"/>
-            <a:ext cx="205030" cy="205030"/>
-          </a:xfrm>
-          <a:prstGeom prst="rect">
-            <a:avLst/>
-          </a:prstGeom>
-        </p:spPr>
-      </p:pic>
-      <p:pic>
-        <p:nvPicPr>
-          <p:cNvPr id="42" name="Picture 41">
-            <a:extLst>
-              <a:ext uri="{FF2B5EF4-FFF2-40B4-BE49-F238E27FC236}">
-                <a16:creationId xmlns:a16="http://schemas.microsoft.com/office/drawing/2014/main" id="{EC995705-CD6F-43F9-80BA-9AA26C213A71}"/>
-              </a:ext>
-            </a:extLst>
-          </p:cNvPr>
-          <p:cNvPicPr>
-            <a:picLocks noChangeAspect="1"/>
-          </p:cNvPicPr>
-          <p:nvPr/>
-        </p:nvPicPr>
-        <p:blipFill>
-          <a:blip r:embed="rId6">
-            <a:extLst>
-              <a:ext uri="{28A0092B-C50C-407E-A947-70E740481C1C}">
-                <a14:useLocalDpi xmlns:a14="http://schemas.microsoft.com/office/drawing/2010/main" val="0"/>
-              </a:ext>
-            </a:extLst>
-          </a:blip>
-          <a:stretch>
-            <a:fillRect/>
-          </a:stretch>
-        </p:blipFill>
-        <p:spPr>
-          <a:xfrm>
-            <a:off x="9703081" y="5164223"/>
-            <a:ext cx="205030" cy="205030"/>
-          </a:xfrm>
-          <a:prstGeom prst="rect">
-            <a:avLst/>
-          </a:prstGeom>
-        </p:spPr>
-      </p:pic>
-      <p:pic>
-        <p:nvPicPr>
-          <p:cNvPr id="43" name="Picture 42">
-            <a:extLst>
-              <a:ext uri="{FF2B5EF4-FFF2-40B4-BE49-F238E27FC236}">
-                <a16:creationId xmlns:a16="http://schemas.microsoft.com/office/drawing/2014/main" id="{8DA3DAAD-7784-4F3B-B371-1E428069907A}"/>
-              </a:ext>
-            </a:extLst>
-          </p:cNvPr>
-          <p:cNvPicPr>
-            <a:picLocks noChangeAspect="1"/>
-          </p:cNvPicPr>
-          <p:nvPr/>
-        </p:nvPicPr>
-        <p:blipFill>
-          <a:blip r:embed="rId5">
-            <a:extLst>
-              <a:ext uri="{28A0092B-C50C-407E-A947-70E740481C1C}">
-                <a14:useLocalDpi xmlns:a14="http://schemas.microsoft.com/office/drawing/2010/main" val="0"/>
-              </a:ext>
-            </a:extLst>
-          </a:blip>
-          <a:stretch>
-            <a:fillRect/>
-          </a:stretch>
-        </p:blipFill>
-        <p:spPr>
-          <a:xfrm>
-            <a:off x="9185322" y="4013302"/>
-            <a:ext cx="780290" cy="780290"/>
-          </a:xfrm>
-          <a:prstGeom prst="rect">
-            <a:avLst/>
-          </a:prstGeom>
-        </p:spPr>
-      </p:pic>
-      <p:sp>
-        <p:nvSpPr>
-          <p:cNvPr id="45" name="TextBox 44">
-            <a:extLst>
-              <a:ext uri="{FF2B5EF4-FFF2-40B4-BE49-F238E27FC236}">
-                <a16:creationId xmlns:a16="http://schemas.microsoft.com/office/drawing/2014/main" id="{DAB9391D-B426-431A-984A-6F78CC876015}"/>
-              </a:ext>
-            </a:extLst>
-          </p:cNvPr>
-          <p:cNvSpPr txBox="1"/>
-          <p:nvPr/>
-        </p:nvSpPr>
-        <p:spPr>
-          <a:xfrm>
-            <a:off x="8429940" y="1894510"/>
-            <a:ext cx="2370081" cy="246221"/>
-          </a:xfrm>
-          <a:prstGeom prst="rect">
-            <a:avLst/>
-          </a:prstGeom>
-          <a:noFill/>
-        </p:spPr>
-        <p:txBody>
-          <a:bodyPr wrap="square" rtlCol="0">
-            <a:spAutoFit/>
-          </a:bodyPr>
-          <a:lstStyle/>
-          <a:p>
-            <a:pPr algn="ctr"/>
-            <a:r>
-              <a:rPr lang="en-US" sz="1000" dirty="0"/>
-              <a:t>Bulk Order Processing Logic App</a:t>
-            </a:r>
-          </a:p>
-        </p:txBody>
-      </p:sp>
-      <p:sp>
-        <p:nvSpPr>
-          <p:cNvPr id="46" name="TextBox 45">
-            <a:extLst>
-              <a:ext uri="{FF2B5EF4-FFF2-40B4-BE49-F238E27FC236}">
-                <a16:creationId xmlns:a16="http://schemas.microsoft.com/office/drawing/2014/main" id="{93AEA4AB-EF20-43D1-97A9-CCD9251F2540}"/>
-              </a:ext>
-            </a:extLst>
-          </p:cNvPr>
-          <p:cNvSpPr txBox="1"/>
-          <p:nvPr/>
-        </p:nvSpPr>
-        <p:spPr>
-          <a:xfrm>
-            <a:off x="4460022" y="5148905"/>
-            <a:ext cx="2370081" cy="246221"/>
-          </a:xfrm>
-          <a:prstGeom prst="rect">
-            <a:avLst/>
-          </a:prstGeom>
-          <a:noFill/>
-        </p:spPr>
-        <p:txBody>
-          <a:bodyPr wrap="square" rtlCol="0">
-            <a:spAutoFit/>
-          </a:bodyPr>
-          <a:lstStyle/>
-          <a:p>
-            <a:pPr algn="ctr"/>
-            <a:r>
-              <a:rPr lang="en-US" sz="1000" dirty="0"/>
-              <a:t>Inventory System (SaaS App)</a:t>
-            </a:r>
-          </a:p>
-        </p:txBody>
-      </p:sp>
-      <p:sp>
-        <p:nvSpPr>
-          <p:cNvPr id="47" name="TextBox 46">
-            <a:extLst>
-              <a:ext uri="{FF2B5EF4-FFF2-40B4-BE49-F238E27FC236}">
-                <a16:creationId xmlns:a16="http://schemas.microsoft.com/office/drawing/2014/main" id="{E90C0D9C-6031-422D-8B53-92B8EB3737CD}"/>
-              </a:ext>
-            </a:extLst>
-          </p:cNvPr>
-          <p:cNvSpPr txBox="1"/>
-          <p:nvPr/>
-        </p:nvSpPr>
-        <p:spPr>
-          <a:xfrm>
-            <a:off x="4460022" y="6319340"/>
-            <a:ext cx="2370081" cy="246221"/>
-          </a:xfrm>
-          <a:prstGeom prst="rect">
-            <a:avLst/>
-          </a:prstGeom>
-          <a:noFill/>
-        </p:spPr>
-        <p:txBody>
-          <a:bodyPr wrap="square" rtlCol="0">
-            <a:spAutoFit/>
-          </a:bodyPr>
-          <a:lstStyle/>
-          <a:p>
-            <a:pPr algn="ctr"/>
-            <a:r>
-              <a:rPr lang="en-US" sz="1000" dirty="0"/>
-              <a:t>Supply Chain System (SaaS App)</a:t>
-            </a:r>
-          </a:p>
-        </p:txBody>
-      </p:sp>
-      <p:sp>
-        <p:nvSpPr>
-          <p:cNvPr id="48" name="TextBox 47">
-            <a:extLst>
-              <a:ext uri="{FF2B5EF4-FFF2-40B4-BE49-F238E27FC236}">
-                <a16:creationId xmlns:a16="http://schemas.microsoft.com/office/drawing/2014/main" id="{8D0DFB46-89C1-4831-B05D-64D3AF2A0BCE}"/>
-              </a:ext>
-            </a:extLst>
-          </p:cNvPr>
-          <p:cNvSpPr txBox="1"/>
-          <p:nvPr/>
-        </p:nvSpPr>
-        <p:spPr>
-          <a:xfrm>
-            <a:off x="7197324" y="1494400"/>
-            <a:ext cx="745693" cy="400110"/>
-          </a:xfrm>
-          <a:prstGeom prst="rect">
-            <a:avLst/>
-          </a:prstGeom>
-          <a:noFill/>
-        </p:spPr>
-        <p:txBody>
-          <a:bodyPr wrap="square" rtlCol="0">
-            <a:spAutoFit/>
-          </a:bodyPr>
-          <a:lstStyle/>
-          <a:p>
-            <a:pPr algn="ctr"/>
-            <a:r>
-              <a:rPr lang="en-US" sz="1000" dirty="0"/>
-              <a:t>Azure SQL DB</a:t>
-            </a:r>
-          </a:p>
-        </p:txBody>
-      </p:sp>
-      <p:sp>
-        <p:nvSpPr>
-          <p:cNvPr id="49" name="TextBox 48">
-            <a:extLst>
-              <a:ext uri="{FF2B5EF4-FFF2-40B4-BE49-F238E27FC236}">
-                <a16:creationId xmlns:a16="http://schemas.microsoft.com/office/drawing/2014/main" id="{F277A5DC-01B2-4D13-A31D-BC037797731C}"/>
-              </a:ext>
-            </a:extLst>
-          </p:cNvPr>
-          <p:cNvSpPr txBox="1"/>
-          <p:nvPr/>
-        </p:nvSpPr>
-        <p:spPr>
-          <a:xfrm>
-            <a:off x="2542770" y="2116153"/>
-            <a:ext cx="1298918" cy="400110"/>
-          </a:xfrm>
-          <a:prstGeom prst="rect">
-            <a:avLst/>
-          </a:prstGeom>
-          <a:noFill/>
-        </p:spPr>
-        <p:txBody>
-          <a:bodyPr wrap="square" rtlCol="0">
-            <a:spAutoFit/>
-          </a:bodyPr>
-          <a:lstStyle/>
-          <a:p>
-            <a:pPr algn="ctr"/>
-            <a:r>
-              <a:rPr lang="en-US" sz="1000" dirty="0"/>
-              <a:t>Azure App Service (Website)</a:t>
-            </a:r>
-          </a:p>
-        </p:txBody>
-      </p:sp>
-      <p:pic>
-        <p:nvPicPr>
-          <p:cNvPr id="37" name="Graphic 36" descr="User">
-            <a:extLst>
-              <a:ext uri="{FF2B5EF4-FFF2-40B4-BE49-F238E27FC236}">
-                <a16:creationId xmlns:a16="http://schemas.microsoft.com/office/drawing/2014/main" id="{9C500A47-A40E-45BC-81F5-A9CEDAE52887}"/>
-              </a:ext>
-            </a:extLst>
-          </p:cNvPr>
-          <p:cNvPicPr>
-            <a:picLocks noChangeAspect="1"/>
-          </p:cNvPicPr>
-          <p:nvPr/>
-        </p:nvPicPr>
-        <p:blipFill>
-          <a:blip r:embed="rId7">
-            <a:extLst>
-              <a:ext uri="{28A0092B-C50C-407E-A947-70E740481C1C}">
-                <a14:useLocalDpi xmlns:a14="http://schemas.microsoft.com/office/drawing/2010/main" val="0"/>
-              </a:ext>
-              <a:ext uri="{96DAC541-7B7A-43D3-8B79-37D633B846F1}">
-                <asvg:svgBlip xmlns:asvg="http://schemas.microsoft.com/office/drawing/2016/SVG/main" r:embed="rId8"/>
-              </a:ext>
-            </a:extLst>
-          </a:blip>
-          <a:stretch>
-            <a:fillRect/>
-          </a:stretch>
-        </p:blipFill>
-        <p:spPr>
-          <a:xfrm>
-            <a:off x="11140306" y="3891455"/>
-            <a:ext cx="669837" cy="669837"/>
-          </a:xfrm>
-          <a:prstGeom prst="rect">
-            <a:avLst/>
-          </a:prstGeom>
-        </p:spPr>
-      </p:pic>
-      <p:pic>
-        <p:nvPicPr>
-          <p:cNvPr id="50" name="Graphic 49" descr="User">
-            <a:extLst>
-              <a:ext uri="{FF2B5EF4-FFF2-40B4-BE49-F238E27FC236}">
-                <a16:creationId xmlns:a16="http://schemas.microsoft.com/office/drawing/2014/main" id="{10BD415D-6F4E-4223-94A7-CA105F67DFA6}"/>
-              </a:ext>
-            </a:extLst>
-          </p:cNvPr>
-          <p:cNvPicPr>
-            <a:picLocks noChangeAspect="1"/>
-          </p:cNvPicPr>
-          <p:nvPr/>
-        </p:nvPicPr>
-        <p:blipFill>
-          <a:blip r:embed="rId7">
-            <a:extLst>
-              <a:ext uri="{28A0092B-C50C-407E-A947-70E740481C1C}">
-                <a14:useLocalDpi xmlns:a14="http://schemas.microsoft.com/office/drawing/2010/main" val="0"/>
-              </a:ext>
-              <a:ext uri="{96DAC541-7B7A-43D3-8B79-37D633B846F1}">
-                <asvg:svgBlip xmlns:asvg="http://schemas.microsoft.com/office/drawing/2016/SVG/main" r:embed="rId8"/>
-              </a:ext>
-            </a:extLst>
-          </a:blip>
-          <a:stretch>
-            <a:fillRect/>
-          </a:stretch>
-        </p:blipFill>
-        <p:spPr>
-          <a:xfrm>
-            <a:off x="11154253" y="5266738"/>
-            <a:ext cx="669837" cy="669837"/>
-          </a:xfrm>
-          <a:prstGeom prst="rect">
-            <a:avLst/>
-          </a:prstGeom>
-        </p:spPr>
-      </p:pic>
-      <p:sp>
-        <p:nvSpPr>
-          <p:cNvPr id="52" name="TextBox 51">
-            <a:extLst>
-              <a:ext uri="{FF2B5EF4-FFF2-40B4-BE49-F238E27FC236}">
-                <a16:creationId xmlns:a16="http://schemas.microsoft.com/office/drawing/2014/main" id="{2906F283-0915-447D-9DF7-D5827DAC65C8}"/>
-              </a:ext>
-            </a:extLst>
-          </p:cNvPr>
-          <p:cNvSpPr txBox="1"/>
-          <p:nvPr/>
-        </p:nvSpPr>
-        <p:spPr>
-          <a:xfrm>
-            <a:off x="10914286" y="4523630"/>
-            <a:ext cx="1121875" cy="246221"/>
-          </a:xfrm>
-          <a:prstGeom prst="rect">
-            <a:avLst/>
-          </a:prstGeom>
-          <a:noFill/>
-        </p:spPr>
-        <p:txBody>
-          <a:bodyPr wrap="square" rtlCol="0">
-            <a:spAutoFit/>
-          </a:bodyPr>
-          <a:lstStyle/>
-          <a:p>
-            <a:pPr algn="ctr"/>
-            <a:r>
-              <a:rPr lang="en-US" sz="1000" dirty="0"/>
-              <a:t>Vendors</a:t>
-            </a:r>
-          </a:p>
-        </p:txBody>
-      </p:sp>
-      <p:sp>
-        <p:nvSpPr>
-          <p:cNvPr id="53" name="TextBox 52">
-            <a:extLst>
-              <a:ext uri="{FF2B5EF4-FFF2-40B4-BE49-F238E27FC236}">
-                <a16:creationId xmlns:a16="http://schemas.microsoft.com/office/drawing/2014/main" id="{E9C8A5E2-746E-4910-830A-E4B716AAA4E9}"/>
-              </a:ext>
-            </a:extLst>
-          </p:cNvPr>
-          <p:cNvSpPr txBox="1"/>
-          <p:nvPr/>
-        </p:nvSpPr>
-        <p:spPr>
-          <a:xfrm>
-            <a:off x="10952778" y="5857403"/>
-            <a:ext cx="1121875" cy="246221"/>
-          </a:xfrm>
-          <a:prstGeom prst="rect">
-            <a:avLst/>
-          </a:prstGeom>
-          <a:noFill/>
-        </p:spPr>
-        <p:txBody>
-          <a:bodyPr wrap="square" rtlCol="0">
-            <a:spAutoFit/>
-          </a:bodyPr>
-          <a:lstStyle/>
-          <a:p>
-            <a:pPr algn="ctr"/>
-            <a:r>
-              <a:rPr lang="en-US" sz="1000" dirty="0"/>
-              <a:t>Resellers</a:t>
-            </a:r>
-          </a:p>
-        </p:txBody>
-      </p:sp>
-      <p:sp>
-        <p:nvSpPr>
-          <p:cNvPr id="54" name="Arrow: Left-Right 53">
-            <a:extLst>
-              <a:ext uri="{FF2B5EF4-FFF2-40B4-BE49-F238E27FC236}">
-                <a16:creationId xmlns:a16="http://schemas.microsoft.com/office/drawing/2014/main" id="{79CAF358-A5E1-49D4-A526-0F4C1142D34E}"/>
-              </a:ext>
-            </a:extLst>
-          </p:cNvPr>
-          <p:cNvSpPr/>
-          <p:nvPr/>
-        </p:nvSpPr>
-        <p:spPr>
-          <a:xfrm rot="4388077">
-            <a:off x="7507411" y="2672007"/>
-            <a:ext cx="2754867" cy="296909"/>
-          </a:xfrm>
-          <a:prstGeom prst="leftRightArrow">
-            <a:avLst/>
-          </a:prstGeom>
-        </p:spPr>
-        <p:style>
-          <a:lnRef idx="2">
-            <a:schemeClr val="accent5"/>
-          </a:lnRef>
-          <a:fillRef idx="1">
-            <a:schemeClr val="lt1"/>
-          </a:fillRef>
-          <a:effectRef idx="0">
-            <a:schemeClr val="accent5"/>
-          </a:effectRef>
-          <a:fontRef idx="minor">
-            <a:schemeClr val="dk1"/>
-          </a:fontRef>
-        </p:style>
-        <p:txBody>
-          <a:bodyPr rtlCol="0" anchor="ctr"/>
-          <a:lstStyle/>
-          <a:p>
-            <a:pPr algn="ctr"/>
-            <a:endParaRPr lang="en-US"/>
-          </a:p>
-        </p:txBody>
-      </p:sp>
-      <p:sp>
-        <p:nvSpPr>
-          <p:cNvPr id="55" name="Arrow: Left-Right 54">
-            <a:extLst>
-              <a:ext uri="{FF2B5EF4-FFF2-40B4-BE49-F238E27FC236}">
-                <a16:creationId xmlns:a16="http://schemas.microsoft.com/office/drawing/2014/main" id="{EE26E379-B65F-4EF2-B19D-6D4C161ED482}"/>
-              </a:ext>
-            </a:extLst>
-          </p:cNvPr>
-          <p:cNvSpPr/>
-          <p:nvPr/>
-        </p:nvSpPr>
-        <p:spPr>
-          <a:xfrm rot="15225539" flipV="1">
-            <a:off x="7586561" y="3923179"/>
-            <a:ext cx="2537075" cy="269846"/>
-          </a:xfrm>
-          <a:prstGeom prst="leftRightArrow">
-            <a:avLst/>
-          </a:prstGeom>
-        </p:spPr>
-        <p:style>
-          <a:lnRef idx="2">
-            <a:schemeClr val="accent5"/>
-          </a:lnRef>
-          <a:fillRef idx="1">
-            <a:schemeClr val="lt1"/>
-          </a:fillRef>
-          <a:effectRef idx="0">
-            <a:schemeClr val="accent5"/>
-          </a:effectRef>
-          <a:fontRef idx="minor">
-            <a:schemeClr val="dk1"/>
-          </a:fontRef>
-        </p:style>
-        <p:txBody>
-          <a:bodyPr rtlCol="0" anchor="ctr"/>
-          <a:lstStyle/>
-          <a:p>
-            <a:pPr algn="ctr"/>
-            <a:endParaRPr lang="en-US" dirty="0"/>
-          </a:p>
-        </p:txBody>
-      </p:sp>
-      <p:cxnSp>
-        <p:nvCxnSpPr>
-          <p:cNvPr id="56" name="Straight Arrow Connector 55">
-            <a:extLst>
-              <a:ext uri="{FF2B5EF4-FFF2-40B4-BE49-F238E27FC236}">
-                <a16:creationId xmlns:a16="http://schemas.microsoft.com/office/drawing/2014/main" id="{2DFC0AF6-73B7-49D9-BE74-E864A44435EC}"/>
-              </a:ext>
-            </a:extLst>
-          </p:cNvPr>
-          <p:cNvCxnSpPr>
-            <a:cxnSpLocks/>
-            <a:stCxn id="27" idx="1"/>
-            <a:endCxn id="23" idx="3"/>
-          </p:cNvCxnSpPr>
-          <p:nvPr/>
-        </p:nvCxnSpPr>
-        <p:spPr>
-          <a:xfrm flipH="1">
-            <a:off x="6035208" y="2532285"/>
-            <a:ext cx="2394732" cy="2350054"/>
-          </a:xfrm>
-          <a:prstGeom prst="straightConnector1">
-            <a:avLst/>
-          </a:prstGeom>
-          <a:ln>
-            <a:headEnd type="triangle"/>
-            <a:tailEnd type="triangle"/>
-          </a:ln>
-        </p:spPr>
-        <p:style>
-          <a:lnRef idx="1">
-            <a:schemeClr val="accent1"/>
-          </a:lnRef>
-          <a:fillRef idx="0">
-            <a:schemeClr val="accent1"/>
-          </a:fillRef>
-          <a:effectRef idx="0">
-            <a:schemeClr val="accent1"/>
-          </a:effectRef>
-          <a:fontRef idx="minor">
-            <a:schemeClr val="tx1"/>
-          </a:fontRef>
-        </p:style>
-      </p:cxnSp>
-      <p:cxnSp>
-        <p:nvCxnSpPr>
-          <p:cNvPr id="62" name="Straight Arrow Connector 61">
-            <a:extLst>
-              <a:ext uri="{FF2B5EF4-FFF2-40B4-BE49-F238E27FC236}">
-                <a16:creationId xmlns:a16="http://schemas.microsoft.com/office/drawing/2014/main" id="{86612F8D-EDD3-4003-AD97-0F4940EFABE5}"/>
-              </a:ext>
-            </a:extLst>
-          </p:cNvPr>
-          <p:cNvCxnSpPr>
-            <a:cxnSpLocks/>
-            <a:stCxn id="27" idx="1"/>
-            <a:endCxn id="25" idx="3"/>
-          </p:cNvCxnSpPr>
-          <p:nvPr/>
-        </p:nvCxnSpPr>
-        <p:spPr>
-          <a:xfrm flipH="1">
-            <a:off x="6035208" y="2532285"/>
-            <a:ext cx="2394732" cy="3520021"/>
-          </a:xfrm>
-          <a:prstGeom prst="straightConnector1">
-            <a:avLst/>
-          </a:prstGeom>
-          <a:ln>
-            <a:headEnd type="triangle"/>
-            <a:tailEnd type="triangle"/>
-          </a:ln>
-        </p:spPr>
-        <p:style>
-          <a:lnRef idx="1">
-            <a:schemeClr val="accent1"/>
-          </a:lnRef>
-          <a:fillRef idx="0">
-            <a:schemeClr val="accent1"/>
-          </a:fillRef>
-          <a:effectRef idx="0">
-            <a:schemeClr val="accent1"/>
-          </a:effectRef>
-          <a:fontRef idx="minor">
-            <a:schemeClr val="tx1"/>
-          </a:fontRef>
-        </p:style>
-      </p:cxnSp>
-      <p:cxnSp>
-        <p:nvCxnSpPr>
-          <p:cNvPr id="67" name="Straight Arrow Connector 66">
-            <a:extLst>
-              <a:ext uri="{FF2B5EF4-FFF2-40B4-BE49-F238E27FC236}">
-                <a16:creationId xmlns:a16="http://schemas.microsoft.com/office/drawing/2014/main" id="{132779DC-E23D-4E93-B63E-79D0FD6E9368}"/>
-              </a:ext>
-            </a:extLst>
-          </p:cNvPr>
-          <p:cNvCxnSpPr>
-            <a:cxnSpLocks/>
-            <a:stCxn id="60" idx="1"/>
-            <a:endCxn id="23" idx="3"/>
-          </p:cNvCxnSpPr>
-          <p:nvPr/>
-        </p:nvCxnSpPr>
-        <p:spPr>
-          <a:xfrm flipH="1">
-            <a:off x="6035208" y="1187706"/>
-            <a:ext cx="2394732" cy="3694633"/>
-          </a:xfrm>
-          <a:prstGeom prst="straightConnector1">
-            <a:avLst/>
-          </a:prstGeom>
-          <a:ln>
-            <a:headEnd type="triangle"/>
-            <a:tailEnd type="triangle"/>
-          </a:ln>
-        </p:spPr>
-        <p:style>
-          <a:lnRef idx="1">
-            <a:schemeClr val="accent1"/>
-          </a:lnRef>
-          <a:fillRef idx="0">
-            <a:schemeClr val="accent1"/>
-          </a:fillRef>
-          <a:effectRef idx="0">
-            <a:schemeClr val="accent1"/>
-          </a:effectRef>
-          <a:fontRef idx="minor">
-            <a:schemeClr val="tx1"/>
-          </a:fontRef>
-        </p:style>
-      </p:cxnSp>
-      <p:cxnSp>
-        <p:nvCxnSpPr>
-          <p:cNvPr id="69" name="Straight Arrow Connector 68">
-            <a:extLst>
-              <a:ext uri="{FF2B5EF4-FFF2-40B4-BE49-F238E27FC236}">
-                <a16:creationId xmlns:a16="http://schemas.microsoft.com/office/drawing/2014/main" id="{2E951E73-4601-41C9-8846-BAD49439AFE2}"/>
-              </a:ext>
-            </a:extLst>
-          </p:cNvPr>
-          <p:cNvCxnSpPr>
-            <a:cxnSpLocks/>
-            <a:stCxn id="60" idx="1"/>
-            <a:endCxn id="25" idx="3"/>
-          </p:cNvCxnSpPr>
-          <p:nvPr/>
-        </p:nvCxnSpPr>
-        <p:spPr>
-          <a:xfrm flipH="1">
-            <a:off x="6035208" y="1187706"/>
-            <a:ext cx="2394732" cy="4864600"/>
-          </a:xfrm>
-          <a:prstGeom prst="straightConnector1">
-            <a:avLst/>
-          </a:prstGeom>
-          <a:ln>
-            <a:headEnd type="triangle"/>
-            <a:tailEnd type="triangle"/>
-          </a:ln>
-        </p:spPr>
-        <p:style>
-          <a:lnRef idx="1">
-            <a:schemeClr val="accent1"/>
-          </a:lnRef>
-          <a:fillRef idx="0">
-            <a:schemeClr val="accent1"/>
-          </a:fillRef>
-          <a:effectRef idx="0">
-            <a:schemeClr val="accent1"/>
-          </a:effectRef>
-          <a:fontRef idx="minor">
-            <a:schemeClr val="tx1"/>
-          </a:fontRef>
-        </p:style>
-      </p:cxnSp>
-      <p:sp>
-        <p:nvSpPr>
-          <p:cNvPr id="76" name="Arrow: Left-Right 75">
-            <a:extLst>
-              <a:ext uri="{FF2B5EF4-FFF2-40B4-BE49-F238E27FC236}">
-                <a16:creationId xmlns:a16="http://schemas.microsoft.com/office/drawing/2014/main" id="{FFF9E3B3-9B95-4576-BA1F-23AADF157E27}"/>
-              </a:ext>
-            </a:extLst>
-          </p:cNvPr>
-          <p:cNvSpPr/>
-          <p:nvPr/>
-        </p:nvSpPr>
-        <p:spPr>
-          <a:xfrm>
-            <a:off x="9979210" y="4101582"/>
-            <a:ext cx="1235503" cy="177079"/>
-          </a:xfrm>
-          <a:prstGeom prst="leftRightArrow">
-            <a:avLst/>
-          </a:prstGeom>
-        </p:spPr>
-        <p:style>
-          <a:lnRef idx="2">
-            <a:schemeClr val="dk1"/>
-          </a:lnRef>
-          <a:fillRef idx="1">
-            <a:schemeClr val="lt1"/>
-          </a:fillRef>
-          <a:effectRef idx="0">
-            <a:schemeClr val="dk1"/>
-          </a:effectRef>
-          <a:fontRef idx="minor">
-            <a:schemeClr val="dk1"/>
-          </a:fontRef>
-        </p:style>
-        <p:txBody>
-          <a:bodyPr rtlCol="0" anchor="ctr"/>
-          <a:lstStyle/>
-          <a:p>
-            <a:pPr algn="ctr"/>
-            <a:endParaRPr lang="en-US"/>
-          </a:p>
-        </p:txBody>
-      </p:sp>
-      <p:sp>
-        <p:nvSpPr>
-          <p:cNvPr id="77" name="Arrow: Left-Right 76">
-            <a:extLst>
-              <a:ext uri="{FF2B5EF4-FFF2-40B4-BE49-F238E27FC236}">
-                <a16:creationId xmlns:a16="http://schemas.microsoft.com/office/drawing/2014/main" id="{B5BB9339-BCE4-4C80-B029-D1130A2D341C}"/>
-              </a:ext>
-            </a:extLst>
-          </p:cNvPr>
-          <p:cNvSpPr/>
-          <p:nvPr/>
-        </p:nvSpPr>
-        <p:spPr>
-          <a:xfrm>
-            <a:off x="10003997" y="5405318"/>
-            <a:ext cx="1235503" cy="177079"/>
-          </a:xfrm>
-          <a:prstGeom prst="leftRightArrow">
-            <a:avLst/>
-          </a:prstGeom>
-        </p:spPr>
-        <p:style>
-          <a:lnRef idx="2">
-            <a:schemeClr val="dk1"/>
-          </a:lnRef>
-          <a:fillRef idx="1">
-            <a:schemeClr val="lt1"/>
-          </a:fillRef>
-          <a:effectRef idx="0">
-            <a:schemeClr val="dk1"/>
-          </a:effectRef>
-          <a:fontRef idx="minor">
-            <a:schemeClr val="dk1"/>
-          </a:fontRef>
-        </p:style>
-        <p:txBody>
-          <a:bodyPr rtlCol="0" anchor="ctr"/>
-          <a:lstStyle/>
-          <a:p>
-            <a:pPr algn="ctr"/>
-            <a:endParaRPr lang="en-US"/>
-          </a:p>
-        </p:txBody>
-      </p:sp>
-      <p:sp>
-        <p:nvSpPr>
-          <p:cNvPr id="51" name="Rectangle 50">
-            <a:extLst>
-              <a:ext uri="{FF2B5EF4-FFF2-40B4-BE49-F238E27FC236}">
-                <a16:creationId xmlns:a16="http://schemas.microsoft.com/office/drawing/2014/main" id="{02D66B4F-79E1-4EA3-8E28-C716C324FF81}"/>
-              </a:ext>
-            </a:extLst>
-          </p:cNvPr>
-          <p:cNvSpPr/>
-          <p:nvPr/>
-        </p:nvSpPr>
-        <p:spPr>
-          <a:xfrm>
-            <a:off x="2343149" y="126944"/>
-            <a:ext cx="8460549" cy="2919119"/>
-          </a:xfrm>
-          <a:prstGeom prst="rect">
-            <a:avLst/>
-          </a:prstGeom>
-          <a:noFill/>
-        </p:spPr>
-        <p:style>
-          <a:lnRef idx="2">
-            <a:schemeClr val="dk1"/>
-          </a:lnRef>
-          <a:fillRef idx="1">
-            <a:schemeClr val="lt1"/>
-          </a:fillRef>
-          <a:effectRef idx="0">
-            <a:schemeClr val="dk1"/>
-          </a:effectRef>
-          <a:fontRef idx="minor">
-            <a:schemeClr val="dk1"/>
-          </a:fontRef>
-        </p:style>
-        <p:txBody>
-          <a:bodyPr rtlCol="0" anchor="t" anchorCtr="0"/>
-          <a:lstStyle/>
-          <a:p>
-            <a:pPr algn="ctr"/>
-            <a:r>
-              <a:rPr lang="en-US" dirty="0"/>
-              <a:t>Microsoft Azure</a:t>
-            </a:r>
-          </a:p>
-        </p:txBody>
-      </p:sp>
-      <p:pic>
-        <p:nvPicPr>
-          <p:cNvPr id="4" name="Picture 3">
-            <a:extLst>
-              <a:ext uri="{FF2B5EF4-FFF2-40B4-BE49-F238E27FC236}">
-                <a16:creationId xmlns:a16="http://schemas.microsoft.com/office/drawing/2014/main" id="{FE39DF7A-F21B-42F2-A463-8A9A0D1CABE1}"/>
-              </a:ext>
-            </a:extLst>
-          </p:cNvPr>
-          <p:cNvPicPr>
-            <a:picLocks noChangeAspect="1"/>
-          </p:cNvPicPr>
-          <p:nvPr/>
-        </p:nvPicPr>
-        <p:blipFill>
-          <a:blip r:embed="rId9">
-            <a:extLst>
-              <a:ext uri="{28A0092B-C50C-407E-A947-70E740481C1C}">
-                <a14:useLocalDpi xmlns:a14="http://schemas.microsoft.com/office/drawing/2010/main" val="0"/>
-              </a:ext>
-            </a:extLst>
-          </a:blip>
-          <a:stretch>
-            <a:fillRect/>
-          </a:stretch>
-        </p:blipFill>
-        <p:spPr>
-          <a:xfrm>
-            <a:off x="2785213" y="1289375"/>
-            <a:ext cx="780290" cy="780290"/>
-          </a:xfrm>
-          <a:prstGeom prst="rect">
-            <a:avLst/>
-          </a:prstGeom>
-        </p:spPr>
-      </p:pic>
-      <p:pic>
-        <p:nvPicPr>
-          <p:cNvPr id="7" name="Picture 6">
-            <a:extLst>
-              <a:ext uri="{FF2B5EF4-FFF2-40B4-BE49-F238E27FC236}">
-                <a16:creationId xmlns:a16="http://schemas.microsoft.com/office/drawing/2014/main" id="{46356F88-D68A-4961-B6A6-680DF4CA2338}"/>
-              </a:ext>
-            </a:extLst>
-          </p:cNvPr>
-          <p:cNvPicPr>
-            <a:picLocks noChangeAspect="1"/>
-          </p:cNvPicPr>
-          <p:nvPr/>
-        </p:nvPicPr>
-        <p:blipFill>
-          <a:blip r:embed="rId10">
-            <a:extLst>
-              <a:ext uri="{28A0092B-C50C-407E-A947-70E740481C1C}">
-                <a14:useLocalDpi xmlns:a14="http://schemas.microsoft.com/office/drawing/2010/main" val="0"/>
-              </a:ext>
-            </a:extLst>
-          </a:blip>
-          <a:stretch>
-            <a:fillRect/>
-          </a:stretch>
-        </p:blipFill>
-        <p:spPr>
-          <a:xfrm>
-            <a:off x="4186117" y="402504"/>
-            <a:ext cx="547809" cy="547809"/>
-          </a:xfrm>
-          <a:prstGeom prst="rect">
-            <a:avLst/>
-          </a:prstGeom>
-        </p:spPr>
-      </p:pic>
-      <p:pic>
-        <p:nvPicPr>
-          <p:cNvPr id="9" name="Picture 8">
-            <a:extLst>
-              <a:ext uri="{FF2B5EF4-FFF2-40B4-BE49-F238E27FC236}">
-                <a16:creationId xmlns:a16="http://schemas.microsoft.com/office/drawing/2014/main" id="{D31CA1DC-EABD-4516-BC7F-C7CB7BCCBF7E}"/>
-              </a:ext>
-            </a:extLst>
-          </p:cNvPr>
-          <p:cNvPicPr>
-            <a:picLocks noChangeAspect="1"/>
-          </p:cNvPicPr>
-          <p:nvPr/>
-        </p:nvPicPr>
-        <p:blipFill>
-          <a:blip r:embed="rId11">
-            <a:extLst>
-              <a:ext uri="{28A0092B-C50C-407E-A947-70E740481C1C}">
-                <a14:useLocalDpi xmlns:a14="http://schemas.microsoft.com/office/drawing/2010/main" val="0"/>
-              </a:ext>
-            </a:extLst>
-          </a:blip>
-          <a:stretch>
-            <a:fillRect/>
-          </a:stretch>
-        </p:blipFill>
-        <p:spPr>
-          <a:xfrm>
-            <a:off x="4303387" y="1116214"/>
-            <a:ext cx="1133095" cy="1133095"/>
-          </a:xfrm>
-          <a:prstGeom prst="rect">
-            <a:avLst/>
-          </a:prstGeom>
-        </p:spPr>
-      </p:pic>
-      <p:pic>
-        <p:nvPicPr>
-          <p:cNvPr id="18" name="Picture 17">
-            <a:extLst>
-              <a:ext uri="{FF2B5EF4-FFF2-40B4-BE49-F238E27FC236}">
-                <a16:creationId xmlns:a16="http://schemas.microsoft.com/office/drawing/2014/main" id="{9A044665-985F-455D-B0E6-BCF409B36936}"/>
-              </a:ext>
-            </a:extLst>
-          </p:cNvPr>
-          <p:cNvPicPr>
-            <a:picLocks noChangeAspect="1"/>
-          </p:cNvPicPr>
-          <p:nvPr/>
-        </p:nvPicPr>
-        <p:blipFill>
-          <a:blip r:embed="rId12">
-            <a:extLst>
-              <a:ext uri="{28A0092B-C50C-407E-A947-70E740481C1C}">
-                <a14:useLocalDpi xmlns:a14="http://schemas.microsoft.com/office/drawing/2010/main" val="0"/>
-              </a:ext>
-            </a:extLst>
-          </a:blip>
-          <a:stretch>
-            <a:fillRect/>
-          </a:stretch>
-        </p:blipFill>
-        <p:spPr>
-          <a:xfrm>
-            <a:off x="7177775" y="679084"/>
-            <a:ext cx="780290" cy="780290"/>
-          </a:xfrm>
-          <a:prstGeom prst="rect">
-            <a:avLst/>
-          </a:prstGeom>
-        </p:spPr>
-      </p:pic>
-      <p:pic>
-        <p:nvPicPr>
-          <p:cNvPr id="27" name="Picture 26">
-            <a:extLst>
-              <a:ext uri="{FF2B5EF4-FFF2-40B4-BE49-F238E27FC236}">
-                <a16:creationId xmlns:a16="http://schemas.microsoft.com/office/drawing/2014/main" id="{BA25B890-C9B5-42B0-AD1A-ED6D708F3644}"/>
-              </a:ext>
-            </a:extLst>
-          </p:cNvPr>
-          <p:cNvPicPr>
-            <a:picLocks noChangeAspect="1"/>
-          </p:cNvPicPr>
-          <p:nvPr/>
-        </p:nvPicPr>
-        <p:blipFill>
-          <a:blip r:embed="rId13">
-            <a:extLst>
-              <a:ext uri="{28A0092B-C50C-407E-A947-70E740481C1C}">
-                <a14:useLocalDpi xmlns:a14="http://schemas.microsoft.com/office/drawing/2010/main" val="0"/>
-              </a:ext>
-            </a:extLst>
-          </a:blip>
-          <a:stretch>
-            <a:fillRect/>
-          </a:stretch>
-        </p:blipFill>
-        <p:spPr>
-          <a:xfrm>
-            <a:off x="8429940" y="2142140"/>
-            <a:ext cx="780290" cy="780290"/>
-          </a:xfrm>
-          <a:prstGeom prst="rect">
-            <a:avLst/>
-          </a:prstGeom>
-        </p:spPr>
-      </p:pic>
-      <p:pic>
-        <p:nvPicPr>
-          <p:cNvPr id="60" name="Picture 59">
-            <a:extLst>
-              <a:ext uri="{FF2B5EF4-FFF2-40B4-BE49-F238E27FC236}">
-                <a16:creationId xmlns:a16="http://schemas.microsoft.com/office/drawing/2014/main" id="{5244943F-A954-4166-AF12-D7AC584E87E8}"/>
-              </a:ext>
-            </a:extLst>
-          </p:cNvPr>
-          <p:cNvPicPr>
-            <a:picLocks noChangeAspect="1"/>
-          </p:cNvPicPr>
-          <p:nvPr/>
-        </p:nvPicPr>
-        <p:blipFill>
-          <a:blip r:embed="rId13">
-            <a:extLst>
-              <a:ext uri="{28A0092B-C50C-407E-A947-70E740481C1C}">
-                <a14:useLocalDpi xmlns:a14="http://schemas.microsoft.com/office/drawing/2010/main" val="0"/>
-              </a:ext>
-            </a:extLst>
-          </a:blip>
-          <a:stretch>
-            <a:fillRect/>
-          </a:stretch>
-        </p:blipFill>
-        <p:spPr>
-          <a:xfrm>
-            <a:off x="8429940" y="797561"/>
-            <a:ext cx="780290" cy="780290"/>
-          </a:xfrm>
-          <a:prstGeom prst="rect">
-            <a:avLst/>
-          </a:prstGeom>
-        </p:spPr>
-      </p:pic>
-      <p:sp>
-        <p:nvSpPr>
-          <p:cNvPr id="44" name="TextBox 43">
-            <a:extLst>
-              <a:ext uri="{FF2B5EF4-FFF2-40B4-BE49-F238E27FC236}">
-                <a16:creationId xmlns:a16="http://schemas.microsoft.com/office/drawing/2014/main" id="{B66D9463-F59E-4ACD-A3EC-3F5C346764D4}"/>
-              </a:ext>
-            </a:extLst>
-          </p:cNvPr>
-          <p:cNvSpPr txBox="1"/>
-          <p:nvPr/>
-        </p:nvSpPr>
-        <p:spPr>
-          <a:xfrm>
-            <a:off x="8215482" y="530806"/>
-            <a:ext cx="2370081" cy="246221"/>
-          </a:xfrm>
-          <a:prstGeom prst="rect">
-            <a:avLst/>
-          </a:prstGeom>
-          <a:noFill/>
-        </p:spPr>
-        <p:txBody>
-          <a:bodyPr wrap="square" rtlCol="0">
-            <a:spAutoFit/>
-          </a:bodyPr>
-          <a:lstStyle/>
-          <a:p>
-            <a:pPr algn="ctr"/>
-            <a:r>
-              <a:rPr lang="en-US" sz="1000" dirty="0"/>
-              <a:t>Invoice Processing Logic App</a:t>
-            </a:r>
-          </a:p>
-        </p:txBody>
-      </p:sp>
-      <p:sp>
-        <p:nvSpPr>
-          <p:cNvPr id="78" name="TextBox 77">
-            <a:extLst>
-              <a:ext uri="{FF2B5EF4-FFF2-40B4-BE49-F238E27FC236}">
-                <a16:creationId xmlns:a16="http://schemas.microsoft.com/office/drawing/2014/main" id="{D1480156-B14E-4041-9EDC-F92B4266C7FB}"/>
-              </a:ext>
-            </a:extLst>
-          </p:cNvPr>
-          <p:cNvSpPr txBox="1"/>
-          <p:nvPr/>
-        </p:nvSpPr>
-        <p:spPr>
-          <a:xfrm>
-            <a:off x="4319493" y="653916"/>
-            <a:ext cx="2005158" cy="246221"/>
-          </a:xfrm>
-          <a:prstGeom prst="rect">
-            <a:avLst/>
-          </a:prstGeom>
-          <a:noFill/>
-        </p:spPr>
-        <p:txBody>
-          <a:bodyPr wrap="square" rtlCol="0">
-            <a:spAutoFit/>
-          </a:bodyPr>
-          <a:lstStyle/>
-          <a:p>
-            <a:pPr algn="ctr"/>
-            <a:r>
-              <a:rPr lang="en-US" sz="1000" dirty="0"/>
-              <a:t>Azure Virtual Network</a:t>
-            </a:r>
-          </a:p>
-        </p:txBody>
-      </p:sp>
-      <p:sp>
-        <p:nvSpPr>
-          <p:cNvPr id="79" name="TextBox 78">
-            <a:extLst>
-              <a:ext uri="{FF2B5EF4-FFF2-40B4-BE49-F238E27FC236}">
-                <a16:creationId xmlns:a16="http://schemas.microsoft.com/office/drawing/2014/main" id="{314612E8-A22E-4878-BF7B-D40BB3EA3710}"/>
-              </a:ext>
-            </a:extLst>
-          </p:cNvPr>
-          <p:cNvSpPr txBox="1"/>
-          <p:nvPr/>
-        </p:nvSpPr>
-        <p:spPr>
-          <a:xfrm>
-            <a:off x="5066447" y="1620264"/>
-            <a:ext cx="2005158" cy="400110"/>
-          </a:xfrm>
-          <a:prstGeom prst="rect">
-            <a:avLst/>
-          </a:prstGeom>
-          <a:noFill/>
-        </p:spPr>
-        <p:txBody>
-          <a:bodyPr wrap="square" rtlCol="0">
-            <a:spAutoFit/>
-          </a:bodyPr>
-          <a:lstStyle/>
-          <a:p>
-            <a:pPr algn="ctr"/>
-            <a:r>
-              <a:rPr lang="en-US" sz="1000" dirty="0"/>
-              <a:t>Azure Service Fabric </a:t>
-            </a:r>
-          </a:p>
-          <a:p>
-            <a:pPr algn="ctr"/>
-            <a:r>
-              <a:rPr lang="en-US" sz="1000" dirty="0"/>
-              <a:t>(Middle Tier as Microservices)</a:t>
-            </a:r>
-          </a:p>
-        </p:txBody>
-      </p:sp>
-      <p:cxnSp>
-        <p:nvCxnSpPr>
-          <p:cNvPr id="86" name="Straight Arrow Connector 85">
-            <a:extLst>
-              <a:ext uri="{FF2B5EF4-FFF2-40B4-BE49-F238E27FC236}">
-                <a16:creationId xmlns:a16="http://schemas.microsoft.com/office/drawing/2014/main" id="{70AE315D-23BE-4D80-8141-B3398BB65912}"/>
-              </a:ext>
-            </a:extLst>
-          </p:cNvPr>
-          <p:cNvCxnSpPr>
-            <a:cxnSpLocks/>
-            <a:stCxn id="9" idx="1"/>
-            <a:endCxn id="4" idx="3"/>
-          </p:cNvCxnSpPr>
-          <p:nvPr/>
-        </p:nvCxnSpPr>
-        <p:spPr>
-          <a:xfrm flipH="1" flipV="1">
-            <a:off x="3565503" y="1679520"/>
-            <a:ext cx="737884" cy="3242"/>
-          </a:xfrm>
-          <a:prstGeom prst="straightConnector1">
-            <a:avLst/>
-          </a:prstGeom>
-          <a:ln>
-            <a:headEnd type="triangle"/>
-            <a:tailEnd type="triangle"/>
-          </a:ln>
-        </p:spPr>
-        <p:style>
-          <a:lnRef idx="1">
-            <a:schemeClr val="accent1"/>
-          </a:lnRef>
-          <a:fillRef idx="0">
-            <a:schemeClr val="accent1"/>
-          </a:fillRef>
-          <a:effectRef idx="0">
-            <a:schemeClr val="accent1"/>
-          </a:effectRef>
-          <a:fontRef idx="minor">
-            <a:schemeClr val="tx1"/>
-          </a:fontRef>
-        </p:style>
-      </p:cxnSp>
-      <p:pic>
-        <p:nvPicPr>
-          <p:cNvPr id="90" name="Picture 89">
-            <a:extLst>
-              <a:ext uri="{FF2B5EF4-FFF2-40B4-BE49-F238E27FC236}">
-                <a16:creationId xmlns:a16="http://schemas.microsoft.com/office/drawing/2014/main" id="{C237BB43-5698-469A-89A1-65D968A7BEBC}"/>
-              </a:ext>
-            </a:extLst>
-          </p:cNvPr>
-          <p:cNvPicPr>
-            <a:picLocks noChangeAspect="1"/>
-          </p:cNvPicPr>
-          <p:nvPr/>
-        </p:nvPicPr>
-        <p:blipFill>
-          <a:blip r:embed="rId14">
-            <a:extLst>
-              <a:ext uri="{28A0092B-C50C-407E-A947-70E740481C1C}">
-                <a14:useLocalDpi xmlns:a14="http://schemas.microsoft.com/office/drawing/2010/main" val="0"/>
-              </a:ext>
-            </a:extLst>
-          </a:blip>
-          <a:stretch>
-            <a:fillRect/>
-          </a:stretch>
-        </p:blipFill>
-        <p:spPr>
-          <a:xfrm>
-            <a:off x="8947614" y="4716378"/>
-            <a:ext cx="289772" cy="289772"/>
-          </a:xfrm>
-          <a:prstGeom prst="rect">
-            <a:avLst/>
-          </a:prstGeom>
-        </p:spPr>
-      </p:pic>
-      <p:pic>
-        <p:nvPicPr>
-          <p:cNvPr id="91" name="Picture 90">
-            <a:extLst>
-              <a:ext uri="{FF2B5EF4-FFF2-40B4-BE49-F238E27FC236}">
-                <a16:creationId xmlns:a16="http://schemas.microsoft.com/office/drawing/2014/main" id="{4838AA7C-5F9D-4F48-AEDD-1D34DE5ED303}"/>
-              </a:ext>
-            </a:extLst>
-          </p:cNvPr>
-          <p:cNvPicPr>
-            <a:picLocks noChangeAspect="1"/>
-          </p:cNvPicPr>
-          <p:nvPr/>
-        </p:nvPicPr>
-        <p:blipFill>
-          <a:blip r:embed="rId14">
-            <a:extLst>
-              <a:ext uri="{28A0092B-C50C-407E-A947-70E740481C1C}">
-                <a14:useLocalDpi xmlns:a14="http://schemas.microsoft.com/office/drawing/2010/main" val="0"/>
-              </a:ext>
-            </a:extLst>
-          </a:blip>
-          <a:stretch>
-            <a:fillRect/>
-          </a:stretch>
-        </p:blipFill>
-        <p:spPr>
-          <a:xfrm>
-            <a:off x="9009788" y="3455622"/>
-            <a:ext cx="289772" cy="289772"/>
-          </a:xfrm>
-          <a:prstGeom prst="rect">
-            <a:avLst/>
-          </a:prstGeom>
-        </p:spPr>
-      </p:pic>
-      <p:sp>
-        <p:nvSpPr>
-          <p:cNvPr id="92" name="TextBox 91">
-            <a:extLst>
-              <a:ext uri="{FF2B5EF4-FFF2-40B4-BE49-F238E27FC236}">
-                <a16:creationId xmlns:a16="http://schemas.microsoft.com/office/drawing/2014/main" id="{C09F9368-3F29-47C8-848C-DBE1A409D16E}"/>
-              </a:ext>
-            </a:extLst>
-          </p:cNvPr>
-          <p:cNvSpPr txBox="1"/>
-          <p:nvPr/>
-        </p:nvSpPr>
-        <p:spPr>
-          <a:xfrm>
-            <a:off x="9304908" y="3480088"/>
-            <a:ext cx="2370081" cy="246221"/>
-          </a:xfrm>
-          <a:prstGeom prst="rect">
-            <a:avLst/>
-          </a:prstGeom>
-          <a:noFill/>
-        </p:spPr>
-        <p:txBody>
-          <a:bodyPr wrap="square" rtlCol="0">
-            <a:spAutoFit/>
-          </a:bodyPr>
-          <a:lstStyle/>
-          <a:p>
-            <a:r>
-              <a:rPr lang="en-US" sz="1000" dirty="0"/>
-              <a:t>Hybrid Connection</a:t>
-            </a:r>
-          </a:p>
-        </p:txBody>
-      </p:sp>
-      <p:sp>
-        <p:nvSpPr>
-          <p:cNvPr id="93" name="TextBox 92">
-            <a:extLst>
-              <a:ext uri="{FF2B5EF4-FFF2-40B4-BE49-F238E27FC236}">
-                <a16:creationId xmlns:a16="http://schemas.microsoft.com/office/drawing/2014/main" id="{A22FF43F-31C6-4D33-A645-A98A8EF2B55D}"/>
-              </a:ext>
-            </a:extLst>
-          </p:cNvPr>
-          <p:cNvSpPr txBox="1"/>
-          <p:nvPr/>
-        </p:nvSpPr>
-        <p:spPr>
-          <a:xfrm>
-            <a:off x="9185322" y="4716656"/>
-            <a:ext cx="2370081" cy="246221"/>
-          </a:xfrm>
-          <a:prstGeom prst="rect">
-            <a:avLst/>
-          </a:prstGeom>
-          <a:noFill/>
-        </p:spPr>
-        <p:txBody>
-          <a:bodyPr wrap="square" rtlCol="0">
-            <a:spAutoFit/>
-          </a:bodyPr>
-          <a:lstStyle/>
-          <a:p>
-            <a:r>
-              <a:rPr lang="en-US" sz="1000" dirty="0"/>
-              <a:t>Hybrid Connection</a:t>
-            </a:r>
-          </a:p>
-        </p:txBody>
-      </p:sp>
-      <p:cxnSp>
-        <p:nvCxnSpPr>
-          <p:cNvPr id="94" name="Straight Arrow Connector 93">
-            <a:extLst>
-              <a:ext uri="{FF2B5EF4-FFF2-40B4-BE49-F238E27FC236}">
-                <a16:creationId xmlns:a16="http://schemas.microsoft.com/office/drawing/2014/main" id="{4B53F71E-B1FA-410B-A85D-EA32C4F59A82}"/>
-              </a:ext>
-            </a:extLst>
-          </p:cNvPr>
-          <p:cNvCxnSpPr>
-            <a:cxnSpLocks/>
-            <a:stCxn id="60" idx="1"/>
-            <a:endCxn id="18" idx="3"/>
-          </p:cNvCxnSpPr>
-          <p:nvPr/>
-        </p:nvCxnSpPr>
-        <p:spPr>
-          <a:xfrm flipH="1" flipV="1">
-            <a:off x="7958065" y="1069229"/>
-            <a:ext cx="471875" cy="118477"/>
-          </a:xfrm>
-          <a:prstGeom prst="straightConnector1">
-            <a:avLst/>
-          </a:prstGeom>
-          <a:ln>
-            <a:headEnd type="triangle"/>
-            <a:tailEnd type="triangle"/>
-          </a:ln>
-        </p:spPr>
-        <p:style>
-          <a:lnRef idx="1">
-            <a:schemeClr val="accent1"/>
-          </a:lnRef>
-          <a:fillRef idx="0">
-            <a:schemeClr val="accent1"/>
-          </a:fillRef>
-          <a:effectRef idx="0">
-            <a:schemeClr val="accent1"/>
-          </a:effectRef>
-          <a:fontRef idx="minor">
-            <a:schemeClr val="tx1"/>
-          </a:fontRef>
-        </p:style>
-      </p:cxnSp>
-      <p:cxnSp>
-        <p:nvCxnSpPr>
-          <p:cNvPr id="97" name="Straight Arrow Connector 96">
-            <a:extLst>
-              <a:ext uri="{FF2B5EF4-FFF2-40B4-BE49-F238E27FC236}">
-                <a16:creationId xmlns:a16="http://schemas.microsoft.com/office/drawing/2014/main" id="{8188E16F-EB9C-4C8D-A6B0-7E62348E7C74}"/>
-              </a:ext>
-            </a:extLst>
-          </p:cNvPr>
-          <p:cNvCxnSpPr>
-            <a:cxnSpLocks/>
-            <a:stCxn id="27" idx="1"/>
-            <a:endCxn id="18" idx="3"/>
-          </p:cNvCxnSpPr>
-          <p:nvPr/>
-        </p:nvCxnSpPr>
-        <p:spPr>
-          <a:xfrm flipH="1" flipV="1">
-            <a:off x="7958065" y="1069229"/>
-            <a:ext cx="471875" cy="1463056"/>
-          </a:xfrm>
-          <a:prstGeom prst="straightConnector1">
-            <a:avLst/>
-          </a:prstGeom>
-          <a:ln>
-            <a:headEnd type="triangle"/>
-            <a:tailEnd type="triangle"/>
-          </a:ln>
-        </p:spPr>
-        <p:style>
-          <a:lnRef idx="1">
-            <a:schemeClr val="accent1"/>
-          </a:lnRef>
-          <a:fillRef idx="0">
-            <a:schemeClr val="accent1"/>
-          </a:fillRef>
-          <a:effectRef idx="0">
-            <a:schemeClr val="accent1"/>
-          </a:effectRef>
-          <a:fontRef idx="minor">
-            <a:schemeClr val="tx1"/>
-          </a:fontRef>
-        </p:style>
-      </p:cxnSp>
-      <p:cxnSp>
-        <p:nvCxnSpPr>
-          <p:cNvPr id="101" name="Straight Arrow Connector 100">
-            <a:extLst>
-              <a:ext uri="{FF2B5EF4-FFF2-40B4-BE49-F238E27FC236}">
-                <a16:creationId xmlns:a16="http://schemas.microsoft.com/office/drawing/2014/main" id="{1BAD6D6C-5453-402B-B2A0-FAAE9F9C5F96}"/>
-              </a:ext>
-            </a:extLst>
-          </p:cNvPr>
-          <p:cNvCxnSpPr>
-            <a:cxnSpLocks/>
-            <a:stCxn id="18" idx="1"/>
-          </p:cNvCxnSpPr>
-          <p:nvPr/>
-        </p:nvCxnSpPr>
-        <p:spPr>
-          <a:xfrm flipH="1">
-            <a:off x="5448383" y="1069229"/>
-            <a:ext cx="1729392" cy="558247"/>
-          </a:xfrm>
-          <a:prstGeom prst="straightConnector1">
-            <a:avLst/>
-          </a:prstGeom>
-          <a:ln>
-            <a:headEnd type="triangle"/>
-            <a:tailEnd type="triangle"/>
-          </a:ln>
-        </p:spPr>
-        <p:style>
-          <a:lnRef idx="1">
-            <a:schemeClr val="accent1"/>
-          </a:lnRef>
-          <a:fillRef idx="0">
-            <a:schemeClr val="accent1"/>
-          </a:fillRef>
-          <a:effectRef idx="0">
-            <a:schemeClr val="accent1"/>
-          </a:effectRef>
-          <a:fontRef idx="minor">
-            <a:schemeClr val="tx1"/>
-          </a:fontRef>
-        </p:style>
-      </p:cxnSp>
-      <p:sp>
-        <p:nvSpPr>
-          <p:cNvPr id="104" name="Arrow: Up-Down 103">
-            <a:extLst>
-              <a:ext uri="{FF2B5EF4-FFF2-40B4-BE49-F238E27FC236}">
-                <a16:creationId xmlns:a16="http://schemas.microsoft.com/office/drawing/2014/main" id="{23074BAD-0A99-4CF5-89E9-962F98A992C9}"/>
-              </a:ext>
-            </a:extLst>
-          </p:cNvPr>
-          <p:cNvSpPr/>
-          <p:nvPr/>
-        </p:nvSpPr>
-        <p:spPr>
-          <a:xfrm>
-            <a:off x="4621521" y="2650581"/>
-            <a:ext cx="754465" cy="1148300"/>
-          </a:xfrm>
-          <a:prstGeom prst="upDownArrow">
-            <a:avLst/>
-          </a:prstGeom>
-        </p:spPr>
-        <p:style>
-          <a:lnRef idx="1">
-            <a:schemeClr val="accent1"/>
-          </a:lnRef>
-          <a:fillRef idx="2">
-            <a:schemeClr val="accent1"/>
-          </a:fillRef>
-          <a:effectRef idx="1">
-            <a:schemeClr val="accent1"/>
-          </a:effectRef>
-          <a:fontRef idx="minor">
-            <a:schemeClr val="dk1"/>
-          </a:fontRef>
-        </p:style>
-        <p:txBody>
-          <a:bodyPr rtlCol="0" anchor="ctr"/>
-          <a:lstStyle/>
-          <a:p>
-            <a:pPr algn="ctr"/>
-            <a:endParaRPr lang="en-US"/>
-          </a:p>
-        </p:txBody>
-      </p:sp>
-      <p:pic>
-        <p:nvPicPr>
-          <p:cNvPr id="106" name="Picture 105">
-            <a:extLst>
-              <a:ext uri="{FF2B5EF4-FFF2-40B4-BE49-F238E27FC236}">
-                <a16:creationId xmlns:a16="http://schemas.microsoft.com/office/drawing/2014/main" id="{D24CBD82-9FED-483B-9D55-E4B23287CC3B}"/>
-              </a:ext>
-            </a:extLst>
-          </p:cNvPr>
-          <p:cNvPicPr>
-            <a:picLocks noChangeAspect="1"/>
-          </p:cNvPicPr>
-          <p:nvPr/>
-        </p:nvPicPr>
-        <p:blipFill>
-          <a:blip r:embed="rId15">
-            <a:extLst>
-              <a:ext uri="{28A0092B-C50C-407E-A947-70E740481C1C}">
-                <a14:useLocalDpi xmlns:a14="http://schemas.microsoft.com/office/drawing/2010/main" val="0"/>
-              </a:ext>
-            </a:extLst>
-          </a:blip>
-          <a:stretch>
-            <a:fillRect/>
-          </a:stretch>
-        </p:blipFill>
-        <p:spPr>
-          <a:xfrm>
-            <a:off x="4851871" y="2835740"/>
-            <a:ext cx="315930" cy="315930"/>
-          </a:xfrm>
-          <a:prstGeom prst="rect">
-            <a:avLst/>
-          </a:prstGeom>
-        </p:spPr>
-      </p:pic>
-      <p:pic>
-        <p:nvPicPr>
-          <p:cNvPr id="108" name="Picture 107">
-            <a:extLst>
-              <a:ext uri="{FF2B5EF4-FFF2-40B4-BE49-F238E27FC236}">
-                <a16:creationId xmlns:a16="http://schemas.microsoft.com/office/drawing/2014/main" id="{3904122A-3461-4630-B06C-7DA6D534D366}"/>
-              </a:ext>
-            </a:extLst>
-          </p:cNvPr>
-          <p:cNvPicPr>
-            <a:picLocks noChangeAspect="1"/>
-          </p:cNvPicPr>
-          <p:nvPr/>
-        </p:nvPicPr>
-        <p:blipFill>
-          <a:blip r:embed="rId16">
-            <a:extLst>
-              <a:ext uri="{28A0092B-C50C-407E-A947-70E740481C1C}">
-                <a14:useLocalDpi xmlns:a14="http://schemas.microsoft.com/office/drawing/2010/main" val="0"/>
-              </a:ext>
-            </a:extLst>
-          </a:blip>
-          <a:stretch>
-            <a:fillRect/>
-          </a:stretch>
-        </p:blipFill>
-        <p:spPr>
-          <a:xfrm>
-            <a:off x="4823853" y="3281061"/>
-            <a:ext cx="349121" cy="349121"/>
-          </a:xfrm>
-          <a:prstGeom prst="rect">
-            <a:avLst/>
-          </a:prstGeom>
-        </p:spPr>
-      </p:pic>
-      <p:sp>
-        <p:nvSpPr>
-          <p:cNvPr id="109" name="TextBox 108">
-            <a:extLst>
-              <a:ext uri="{FF2B5EF4-FFF2-40B4-BE49-F238E27FC236}">
-                <a16:creationId xmlns:a16="http://schemas.microsoft.com/office/drawing/2014/main" id="{7EE3A369-8AA5-4C80-88C1-B1187986CA05}"/>
-              </a:ext>
-            </a:extLst>
-          </p:cNvPr>
-          <p:cNvSpPr txBox="1"/>
-          <p:nvPr/>
-        </p:nvSpPr>
-        <p:spPr>
-          <a:xfrm>
-            <a:off x="5260231" y="3093285"/>
-            <a:ext cx="2370081" cy="246221"/>
-          </a:xfrm>
-          <a:prstGeom prst="rect">
-            <a:avLst/>
-          </a:prstGeom>
-          <a:noFill/>
-        </p:spPr>
-        <p:txBody>
-          <a:bodyPr wrap="square" rtlCol="0">
-            <a:spAutoFit/>
-          </a:bodyPr>
-          <a:lstStyle/>
-          <a:p>
-            <a:r>
-              <a:rPr lang="en-US" sz="1000" dirty="0"/>
-              <a:t>Azure VPN or ExpressRoute</a:t>
-            </a:r>
-          </a:p>
-        </p:txBody>
-      </p:sp>
-      <p:cxnSp>
-        <p:nvCxnSpPr>
-          <p:cNvPr id="110" name="Connector: Elbow 109">
-            <a:extLst>
-              <a:ext uri="{FF2B5EF4-FFF2-40B4-BE49-F238E27FC236}">
-                <a16:creationId xmlns:a16="http://schemas.microsoft.com/office/drawing/2014/main" id="{7134AC36-B70D-4A8E-AA32-41BEF71437B2}"/>
-              </a:ext>
-            </a:extLst>
-          </p:cNvPr>
-          <p:cNvCxnSpPr>
-            <a:cxnSpLocks/>
-            <a:stCxn id="9" idx="0"/>
-            <a:endCxn id="17" idx="1"/>
-          </p:cNvCxnSpPr>
-          <p:nvPr/>
-        </p:nvCxnSpPr>
-        <p:spPr>
-          <a:xfrm rot="5400000" flipH="1" flipV="1">
-            <a:off x="7702608" y="-2264233"/>
-            <a:ext cx="547774" cy="6213121"/>
-          </a:xfrm>
-          <a:prstGeom prst="bentConnector2">
-            <a:avLst/>
-          </a:prstGeom>
-          <a:ln>
-            <a:headEnd type="triangle" w="lg" len="med"/>
-            <a:tailEnd type="triangle"/>
-          </a:ln>
-        </p:spPr>
-        <p:style>
-          <a:lnRef idx="1">
-            <a:schemeClr val="accent1"/>
-          </a:lnRef>
-          <a:fillRef idx="0">
-            <a:schemeClr val="accent1"/>
-          </a:fillRef>
-          <a:effectRef idx="0">
-            <a:schemeClr val="accent1"/>
-          </a:effectRef>
-          <a:fontRef idx="minor">
-            <a:schemeClr val="tx1"/>
-          </a:fontRef>
-        </p:style>
-      </p:cxnSp>
-      <p:pic>
-        <p:nvPicPr>
-          <p:cNvPr id="114" name="Picture 113">
-            <a:extLst>
-              <a:ext uri="{FF2B5EF4-FFF2-40B4-BE49-F238E27FC236}">
-                <a16:creationId xmlns:a16="http://schemas.microsoft.com/office/drawing/2014/main" id="{817C398C-A4F7-4F92-B047-B03F13059067}"/>
-              </a:ext>
-            </a:extLst>
-          </p:cNvPr>
-          <p:cNvPicPr>
-            <a:picLocks noChangeAspect="1"/>
-          </p:cNvPicPr>
-          <p:nvPr/>
-        </p:nvPicPr>
-        <p:blipFill>
-          <a:blip r:embed="rId14">
-            <a:extLst>
-              <a:ext uri="{28A0092B-C50C-407E-A947-70E740481C1C}">
-                <a14:useLocalDpi xmlns:a14="http://schemas.microsoft.com/office/drawing/2010/main" val="0"/>
-              </a:ext>
-            </a:extLst>
-          </a:blip>
-          <a:stretch>
-            <a:fillRect/>
-          </a:stretch>
-        </p:blipFill>
-        <p:spPr>
-          <a:xfrm>
-            <a:off x="7668293" y="3151670"/>
-            <a:ext cx="289772" cy="289772"/>
-          </a:xfrm>
-          <a:prstGeom prst="rect">
-            <a:avLst/>
-          </a:prstGeom>
-        </p:spPr>
-      </p:pic>
-      <p:sp>
-        <p:nvSpPr>
-          <p:cNvPr id="115" name="TextBox 114">
-            <a:extLst>
-              <a:ext uri="{FF2B5EF4-FFF2-40B4-BE49-F238E27FC236}">
-                <a16:creationId xmlns:a16="http://schemas.microsoft.com/office/drawing/2014/main" id="{B741AEDE-9BEC-4655-B09F-EC97BB98ED14}"/>
-              </a:ext>
-            </a:extLst>
-          </p:cNvPr>
-          <p:cNvSpPr txBox="1"/>
-          <p:nvPr/>
-        </p:nvSpPr>
-        <p:spPr>
-          <a:xfrm>
-            <a:off x="7271599" y="3386038"/>
-            <a:ext cx="1275501" cy="246221"/>
-          </a:xfrm>
-          <a:prstGeom prst="rect">
-            <a:avLst/>
-          </a:prstGeom>
-          <a:noFill/>
-        </p:spPr>
-        <p:txBody>
-          <a:bodyPr wrap="square" rtlCol="0">
-            <a:spAutoFit/>
-          </a:bodyPr>
-          <a:lstStyle/>
-          <a:p>
-            <a:r>
-              <a:rPr lang="en-US" sz="1000" dirty="0"/>
-              <a:t>Hybrid Connection</a:t>
-            </a:r>
-          </a:p>
-        </p:txBody>
-      </p:sp>
-      <p:pic>
-        <p:nvPicPr>
-          <p:cNvPr id="116" name="Picture 115">
-            <a:extLst>
-              <a:ext uri="{FF2B5EF4-FFF2-40B4-BE49-F238E27FC236}">
-                <a16:creationId xmlns:a16="http://schemas.microsoft.com/office/drawing/2014/main" id="{6C00FE07-D899-47C1-9874-87EA8F5087B4}"/>
-              </a:ext>
-            </a:extLst>
-          </p:cNvPr>
-          <p:cNvPicPr>
-            <a:picLocks noChangeAspect="1"/>
-          </p:cNvPicPr>
-          <p:nvPr/>
-        </p:nvPicPr>
-        <p:blipFill>
-          <a:blip r:embed="rId14">
-            <a:extLst>
-              <a:ext uri="{28A0092B-C50C-407E-A947-70E740481C1C}">
-                <a14:useLocalDpi xmlns:a14="http://schemas.microsoft.com/office/drawing/2010/main" val="0"/>
-              </a:ext>
-            </a:extLst>
-          </a:blip>
-          <a:stretch>
-            <a:fillRect/>
-          </a:stretch>
-        </p:blipFill>
-        <p:spPr>
-          <a:xfrm>
-            <a:off x="7503148" y="2227850"/>
-            <a:ext cx="289772" cy="289772"/>
-          </a:xfrm>
-          <a:prstGeom prst="rect">
-            <a:avLst/>
-          </a:prstGeom>
-        </p:spPr>
-      </p:pic>
-      <p:sp>
-        <p:nvSpPr>
-          <p:cNvPr id="117" name="TextBox 116">
-            <a:extLst>
-              <a:ext uri="{FF2B5EF4-FFF2-40B4-BE49-F238E27FC236}">
-                <a16:creationId xmlns:a16="http://schemas.microsoft.com/office/drawing/2014/main" id="{0B8AA212-634C-4A1B-98F9-B1C5686BABF8}"/>
-              </a:ext>
-            </a:extLst>
-          </p:cNvPr>
-          <p:cNvSpPr txBox="1"/>
-          <p:nvPr/>
-        </p:nvSpPr>
-        <p:spPr>
-          <a:xfrm>
-            <a:off x="7180565" y="2486829"/>
-            <a:ext cx="2370081" cy="246221"/>
-          </a:xfrm>
-          <a:prstGeom prst="rect">
-            <a:avLst/>
-          </a:prstGeom>
-          <a:noFill/>
-        </p:spPr>
-        <p:txBody>
-          <a:bodyPr wrap="square" rtlCol="0">
-            <a:spAutoFit/>
-          </a:bodyPr>
-          <a:lstStyle/>
-          <a:p>
-            <a:r>
-              <a:rPr lang="en-US" sz="1000" dirty="0"/>
-              <a:t>Hybrid Connection</a:t>
-            </a:r>
-          </a:p>
-        </p:txBody>
-      </p:sp>
-      <p:sp>
-        <p:nvSpPr>
-          <p:cNvPr id="118" name="TextBox 117">
-            <a:extLst>
-              <a:ext uri="{FF2B5EF4-FFF2-40B4-BE49-F238E27FC236}">
-                <a16:creationId xmlns:a16="http://schemas.microsoft.com/office/drawing/2014/main" id="{BF5B451D-32A4-4F64-9019-659025F47ADA}"/>
-              </a:ext>
-            </a:extLst>
-          </p:cNvPr>
-          <p:cNvSpPr txBox="1"/>
-          <p:nvPr/>
-        </p:nvSpPr>
-        <p:spPr>
-          <a:xfrm>
-            <a:off x="208393" y="195996"/>
-            <a:ext cx="1996463" cy="954107"/>
-          </a:xfrm>
-          <a:prstGeom prst="rect">
-            <a:avLst/>
-          </a:prstGeom>
-          <a:noFill/>
-        </p:spPr>
-        <p:txBody>
-          <a:bodyPr wrap="square" rtlCol="0">
-            <a:spAutoFit/>
-          </a:bodyPr>
-          <a:lstStyle/>
-          <a:p>
-            <a:r>
-              <a:rPr lang="en-US" sz="2800" dirty="0"/>
-              <a:t>Possible Architecture</a:t>
-            </a:r>
-          </a:p>
-        </p:txBody>
-      </p:sp>
-    </p:spTree>
-    <p:extLst>
-      <p:ext uri="{BB962C8B-B14F-4D97-AF65-F5344CB8AC3E}">
-        <p14:creationId xmlns:p14="http://schemas.microsoft.com/office/powerpoint/2010/main" val="2627349086"/>
-      </p:ext>
-    </p:extLst>
-  </p:cSld>
-  <p:clrMapOvr>
-    <a:masterClrMapping/>
-  </p:clrMapOvr>
 </p:sld>
 </file>
 
@@ -16551,9 +12102,12 @@
 </file>
 
 <file path=customXml/item1.xml><?xml version="1.0" encoding="utf-8"?>
-<p:properties xmlns:p="http://schemas.microsoft.com/office/2006/metadata/properties" xmlns:xsi="http://www.w3.org/2001/XMLSchema-instance" xmlns:pc="http://schemas.microsoft.com/office/infopath/2007/PartnerControls">
-  <documentManagement/>
-</p:properties>
+<?mso-contentType ?>
+<FormTemplates xmlns="http://schemas.microsoft.com/sharepoint/v3/contenttype/forms">
+  <Display>DocumentLibraryForm</Display>
+  <Edit>DocumentLibraryForm</Edit>
+  <New>DocumentLibraryForm</New>
+</FormTemplates>
 </file>
 
 <file path=customXml/item2.xml><?xml version="1.0" encoding="utf-8"?>
@@ -16707,26 +12261,15 @@
 </file>
 
 <file path=customXml/item3.xml><?xml version="1.0" encoding="utf-8"?>
-<?mso-contentType ?>
-<FormTemplates xmlns="http://schemas.microsoft.com/sharepoint/v3/contenttype/forms">
-  <Display>DocumentLibraryForm</Display>
-  <Edit>DocumentLibraryForm</Edit>
-  <New>DocumentLibraryForm</New>
-</FormTemplates>
+<p:properties xmlns:p="http://schemas.microsoft.com/office/2006/metadata/properties" xmlns:xsi="http://www.w3.org/2001/XMLSchema-instance" xmlns:pc="http://schemas.microsoft.com/office/infopath/2007/PartnerControls">
+  <documentManagement/>
+</p:properties>
 </file>
 
 <file path=customXml/itemProps1.xml><?xml version="1.0" encoding="utf-8"?>
-<ds:datastoreItem xmlns:ds="http://schemas.openxmlformats.org/officeDocument/2006/customXml" ds:itemID="{18A72D78-ED71-4D78-B376-C7DF0E32C162}">
+<ds:datastoreItem xmlns:ds="http://schemas.openxmlformats.org/officeDocument/2006/customXml" ds:itemID="{C7ED26B3-1852-4382-93C0-9E66BE1A2289}">
   <ds:schemaRefs>
-    <ds:schemaRef ds:uri="http://schemas.openxmlformats.org/package/2006/metadata/core-properties"/>
-    <ds:schemaRef ds:uri="fac12304-a514-4bf9-8a9b-59948ddf2c1c"/>
-    <ds:schemaRef ds:uri="http://schemas.microsoft.com/office/2006/documentManagement/types"/>
-    <ds:schemaRef ds:uri="http://schemas.microsoft.com/office/infopath/2007/PartnerControls"/>
-    <ds:schemaRef ds:uri="http://purl.org/dc/elements/1.1/"/>
-    <ds:schemaRef ds:uri="http://schemas.microsoft.com/office/2006/metadata/properties"/>
-    <ds:schemaRef ds:uri="http://purl.org/dc/terms/"/>
-    <ds:schemaRef ds:uri="http://www.w3.org/XML/1998/namespace"/>
-    <ds:schemaRef ds:uri="http://purl.org/dc/dcmitype/"/>
+    <ds:schemaRef ds:uri="http://schemas.microsoft.com/sharepoint/v3/contenttype/forms"/>
   </ds:schemaRefs>
 </ds:datastoreItem>
 </file>
@@ -16750,9 +12293,17 @@
 </file>
 
 <file path=customXml/itemProps3.xml><?xml version="1.0" encoding="utf-8"?>
-<ds:datastoreItem xmlns:ds="http://schemas.openxmlformats.org/officeDocument/2006/customXml" ds:itemID="{C7ED26B3-1852-4382-93C0-9E66BE1A2289}">
+<ds:datastoreItem xmlns:ds="http://schemas.openxmlformats.org/officeDocument/2006/customXml" ds:itemID="{18A72D78-ED71-4D78-B376-C7DF0E32C162}">
   <ds:schemaRefs>
-    <ds:schemaRef ds:uri="http://schemas.microsoft.com/sharepoint/v3/contenttype/forms"/>
+    <ds:schemaRef ds:uri="http://schemas.openxmlformats.org/package/2006/metadata/core-properties"/>
+    <ds:schemaRef ds:uri="fac12304-a514-4bf9-8a9b-59948ddf2c1c"/>
+    <ds:schemaRef ds:uri="http://schemas.microsoft.com/office/2006/documentManagement/types"/>
+    <ds:schemaRef ds:uri="http://schemas.microsoft.com/office/infopath/2007/PartnerControls"/>
+    <ds:schemaRef ds:uri="http://purl.org/dc/elements/1.1/"/>
+    <ds:schemaRef ds:uri="http://schemas.microsoft.com/office/2006/metadata/properties"/>
+    <ds:schemaRef ds:uri="http://purl.org/dc/terms/"/>
+    <ds:schemaRef ds:uri="http://www.w3.org/XML/1998/namespace"/>
+    <ds:schemaRef ds:uri="http://purl.org/dc/dcmitype/"/>
   </ds:schemaRefs>
 </ds:datastoreItem>
 </file>
</xml_diff>